<commit_message>
SQL Day1 Northwind db script
</commit_message>
<xml_diff>
--- a/SQL/DBMS Concepts and SQL.pptx
+++ b/SQL/DBMS Concepts and SQL.pptx
@@ -146,10 +146,10 @@
   </p:defaultTextStyle>
   <p:extLst>
     <p:ext uri="{EFAFB233-063F-42B5-8137-9DF3F51BA10A}">
-      <p15:sldGuideLst xmlns:p15="http://schemas.microsoft.com/office/powerpoint/2012/main" xmlns=""/>
+      <p15:sldGuideLst xmlns="" xmlns:p15="http://schemas.microsoft.com/office/powerpoint/2012/main"/>
     </p:ext>
     <p:ext uri="{2D200454-40CA-4A62-9FC3-DE9A4176ACB9}">
-      <p15:notesGuideLst xmlns:p15="http://schemas.microsoft.com/office/powerpoint/2012/main" xmlns=""/>
+      <p15:notesGuideLst xmlns="" xmlns:p15="http://schemas.microsoft.com/office/powerpoint/2012/main"/>
     </p:ext>
   </p:extLst>
 </p:presentation>
@@ -182,7 +182,7 @@
           <p:cNvPr id="2" name="Header Placeholder 1">
             <a:extLst>
               <a:ext uri="{FF2B5EF4-FFF2-40B4-BE49-F238E27FC236}">
-                <a16:creationId xmlns:a16="http://schemas.microsoft.com/office/drawing/2014/main" xmlns="" id="{CB964A62-5C0A-4ED3-A4B8-8F329BFD6ACB}"/>
+                <a16:creationId xmlns="" xmlns:a16="http://schemas.microsoft.com/office/drawing/2014/main" id="{CB964A62-5C0A-4ED3-A4B8-8F329BFD6ACB}"/>
               </a:ext>
             </a:extLst>
           </p:cNvPr>
@@ -219,7 +219,7 @@
           <p:cNvPr id="3" name="Date Placeholder 2">
             <a:extLst>
               <a:ext uri="{FF2B5EF4-FFF2-40B4-BE49-F238E27FC236}">
-                <a16:creationId xmlns:a16="http://schemas.microsoft.com/office/drawing/2014/main" xmlns="" id="{721B07B6-54BF-4E5E-BE9D-E521BA1F09E0}"/>
+                <a16:creationId xmlns="" xmlns:a16="http://schemas.microsoft.com/office/drawing/2014/main" id="{721B07B6-54BF-4E5E-BE9D-E521BA1F09E0}"/>
               </a:ext>
             </a:extLst>
           </p:cNvPr>
@@ -260,7 +260,7 @@
           <p:cNvPr id="4" name="Footer Placeholder 3">
             <a:extLst>
               <a:ext uri="{FF2B5EF4-FFF2-40B4-BE49-F238E27FC236}">
-                <a16:creationId xmlns:a16="http://schemas.microsoft.com/office/drawing/2014/main" xmlns="" id="{43BDACF3-443E-41ED-99EB-90F1A93F5044}"/>
+                <a16:creationId xmlns="" xmlns:a16="http://schemas.microsoft.com/office/drawing/2014/main" id="{43BDACF3-443E-41ED-99EB-90F1A93F5044}"/>
               </a:ext>
             </a:extLst>
           </p:cNvPr>
@@ -297,7 +297,7 @@
           <p:cNvPr id="5" name="Slide Number Placeholder 4">
             <a:extLst>
               <a:ext uri="{FF2B5EF4-FFF2-40B4-BE49-F238E27FC236}">
-                <a16:creationId xmlns:a16="http://schemas.microsoft.com/office/drawing/2014/main" xmlns="" id="{761E2AF7-E135-47C3-924A-020D72C5A1F0}"/>
+                <a16:creationId xmlns="" xmlns:a16="http://schemas.microsoft.com/office/drawing/2014/main" id="{761E2AF7-E135-47C3-924A-020D72C5A1F0}"/>
               </a:ext>
             </a:extLst>
           </p:cNvPr>
@@ -1517,36 +1517,6 @@
       </p:sp>
       <p:sp>
         <p:nvSpPr>
-          <p:cNvPr id="5" name="Footer Placeholder 4"/>
-          <p:cNvSpPr>
-            <a:spLocks noGrp="1"/>
-          </p:cNvSpPr>
-          <p:nvPr>
-            <p:ph type="ftr" sz="quarter" idx="11"/>
-          </p:nvPr>
-        </p:nvSpPr>
-        <p:spPr>
-          <a:xfrm>
-            <a:off x="1088136" y="6272784"/>
-            <a:ext cx="6327648" cy="365125"/>
-          </a:xfrm>
-          <a:prstGeom prst="rect">
-            <a:avLst/>
-          </a:prstGeom>
-        </p:spPr>
-        <p:txBody>
-          <a:bodyPr/>
-          <a:lstStyle/>
-          <a:p>
-            <a:r>
-              <a:rPr lang="en-IN"/>
-              <a:t>LTI</a:t>
-            </a:r>
-          </a:p>
-        </p:txBody>
-      </p:sp>
-      <p:sp>
-        <p:nvSpPr>
           <p:cNvPr id="6" name="Slide Number Placeholder 5"/>
           <p:cNvSpPr>
             <a:spLocks noGrp="1"/>
@@ -1708,36 +1678,6 @@
       </p:sp>
       <p:sp>
         <p:nvSpPr>
-          <p:cNvPr id="5" name="Footer Placeholder 4"/>
-          <p:cNvSpPr>
-            <a:spLocks noGrp="1"/>
-          </p:cNvSpPr>
-          <p:nvPr>
-            <p:ph type="ftr" sz="quarter" idx="11"/>
-          </p:nvPr>
-        </p:nvSpPr>
-        <p:spPr>
-          <a:xfrm>
-            <a:off x="1088136" y="6272784"/>
-            <a:ext cx="6327648" cy="365125"/>
-          </a:xfrm>
-          <a:prstGeom prst="rect">
-            <a:avLst/>
-          </a:prstGeom>
-        </p:spPr>
-        <p:txBody>
-          <a:bodyPr/>
-          <a:lstStyle/>
-          <a:p>
-            <a:r>
-              <a:rPr lang="en-IN"/>
-              <a:t>LTI</a:t>
-            </a:r>
-          </a:p>
-        </p:txBody>
-      </p:sp>
-      <p:sp>
-        <p:nvSpPr>
           <p:cNvPr id="6" name="Slide Number Placeholder 5"/>
           <p:cNvSpPr>
             <a:spLocks noGrp="1"/>
@@ -1884,33 +1824,6 @@
               <a:t>08-04-2021</a:t>
             </a:fld>
             <a:endParaRPr lang="en-IN"/>
-          </a:p>
-        </p:txBody>
-      </p:sp>
-      <p:sp>
-        <p:nvSpPr>
-          <p:cNvPr id="5" name="Footer Placeholder 4"/>
-          <p:cNvSpPr>
-            <a:spLocks noGrp="1"/>
-          </p:cNvSpPr>
-          <p:nvPr>
-            <p:ph type="ftr" sz="quarter" idx="11"/>
-          </p:nvPr>
-        </p:nvSpPr>
-        <p:spPr>
-          <a:xfrm>
-            <a:off x="1088136" y="6272784"/>
-            <a:ext cx="6327648" cy="365125"/>
-          </a:xfrm>
-          <a:prstGeom prst="rect">
-            <a:avLst/>
-          </a:prstGeom>
-        </p:spPr>
-        <p:txBody>
-          <a:bodyPr/>
-          <a:lstStyle/>
-          <a:p>
-            <a:endParaRPr lang="en-IN" dirty="0"/>
           </a:p>
         </p:txBody>
       </p:sp>
@@ -2208,36 +2121,6 @@
           </a:p>
         </p:txBody>
       </p:sp>
-      <p:sp>
-        <p:nvSpPr>
-          <p:cNvPr id="5" name="Footer Placeholder 4"/>
-          <p:cNvSpPr>
-            <a:spLocks noGrp="1"/>
-          </p:cNvSpPr>
-          <p:nvPr>
-            <p:ph type="ftr" sz="quarter" idx="11"/>
-          </p:nvPr>
-        </p:nvSpPr>
-        <p:spPr>
-          <a:xfrm>
-            <a:off x="2182708" y="6272784"/>
-            <a:ext cx="6327648" cy="365125"/>
-          </a:xfrm>
-          <a:prstGeom prst="rect">
-            <a:avLst/>
-          </a:prstGeom>
-        </p:spPr>
-        <p:txBody>
-          <a:bodyPr/>
-          <a:lstStyle/>
-          <a:p>
-            <a:r>
-              <a:rPr lang="en-IN"/>
-              <a:t>LTI</a:t>
-            </a:r>
-          </a:p>
-        </p:txBody>
-      </p:sp>
       <p:grpSp>
         <p:nvGrpSpPr>
           <p:cNvPr id="8" name="Group 7"/>
@@ -2602,36 +2485,6 @@
       </p:sp>
       <p:sp>
         <p:nvSpPr>
-          <p:cNvPr id="6" name="Footer Placeholder 5"/>
-          <p:cNvSpPr>
-            <a:spLocks noGrp="1"/>
-          </p:cNvSpPr>
-          <p:nvPr>
-            <p:ph type="ftr" sz="quarter" idx="11"/>
-          </p:nvPr>
-        </p:nvSpPr>
-        <p:spPr>
-          <a:xfrm>
-            <a:off x="1088136" y="6272784"/>
-            <a:ext cx="6327648" cy="365125"/>
-          </a:xfrm>
-          <a:prstGeom prst="rect">
-            <a:avLst/>
-          </a:prstGeom>
-        </p:spPr>
-        <p:txBody>
-          <a:bodyPr/>
-          <a:lstStyle/>
-          <a:p>
-            <a:r>
-              <a:rPr lang="en-IN"/>
-              <a:t>LTI</a:t>
-            </a:r>
-          </a:p>
-        </p:txBody>
-      </p:sp>
-      <p:sp>
-        <p:nvSpPr>
           <p:cNvPr id="7" name="Slide Number Placeholder 6"/>
           <p:cNvSpPr>
             <a:spLocks noGrp="1"/>
@@ -3068,10 +2921,7 @@
           <a:bodyPr/>
           <a:lstStyle/>
           <a:p>
-            <a:r>
-              <a:rPr lang="en-IN"/>
-              <a:t>LTI</a:t>
-            </a:r>
+            <a:endParaRPr lang="en-IN" dirty="0"/>
           </a:p>
         </p:txBody>
       </p:sp>
@@ -3176,36 +3026,6 @@
       </p:sp>
       <p:sp>
         <p:nvSpPr>
-          <p:cNvPr id="4" name="Footer Placeholder 3"/>
-          <p:cNvSpPr>
-            <a:spLocks noGrp="1"/>
-          </p:cNvSpPr>
-          <p:nvPr>
-            <p:ph type="ftr" sz="quarter" idx="11"/>
-          </p:nvPr>
-        </p:nvSpPr>
-        <p:spPr>
-          <a:xfrm>
-            <a:off x="1088136" y="6272784"/>
-            <a:ext cx="6327648" cy="365125"/>
-          </a:xfrm>
-          <a:prstGeom prst="rect">
-            <a:avLst/>
-          </a:prstGeom>
-        </p:spPr>
-        <p:txBody>
-          <a:bodyPr/>
-          <a:lstStyle/>
-          <a:p>
-            <a:r>
-              <a:rPr lang="en-IN"/>
-              <a:t>LTI</a:t>
-            </a:r>
-          </a:p>
-        </p:txBody>
-      </p:sp>
-      <p:sp>
-        <p:nvSpPr>
           <p:cNvPr id="5" name="Slide Number Placeholder 4"/>
           <p:cNvSpPr>
             <a:spLocks noGrp="1"/>
@@ -3277,36 +3097,6 @@
               <a:t>08-04-2021</a:t>
             </a:fld>
             <a:endParaRPr lang="en-IN"/>
-          </a:p>
-        </p:txBody>
-      </p:sp>
-      <p:sp>
-        <p:nvSpPr>
-          <p:cNvPr id="3" name="Footer Placeholder 2"/>
-          <p:cNvSpPr>
-            <a:spLocks noGrp="1"/>
-          </p:cNvSpPr>
-          <p:nvPr>
-            <p:ph type="ftr" sz="quarter" idx="11"/>
-          </p:nvPr>
-        </p:nvSpPr>
-        <p:spPr>
-          <a:xfrm>
-            <a:off x="1088136" y="6272784"/>
-            <a:ext cx="6327648" cy="365125"/>
-          </a:xfrm>
-          <a:prstGeom prst="rect">
-            <a:avLst/>
-          </a:prstGeom>
-        </p:spPr>
-        <p:txBody>
-          <a:bodyPr/>
-          <a:lstStyle/>
-          <a:p>
-            <a:r>
-              <a:rPr lang="en-IN"/>
-              <a:t>LTI</a:t>
-            </a:r>
           </a:p>
         </p:txBody>
       </p:sp>
@@ -3638,36 +3428,6 @@
               <a:t>08-04-2021</a:t>
             </a:fld>
             <a:endParaRPr lang="en-IN"/>
-          </a:p>
-        </p:txBody>
-      </p:sp>
-      <p:sp>
-        <p:nvSpPr>
-          <p:cNvPr id="6" name="Footer Placeholder 5"/>
-          <p:cNvSpPr>
-            <a:spLocks noGrp="1"/>
-          </p:cNvSpPr>
-          <p:nvPr>
-            <p:ph type="ftr" sz="quarter" idx="11"/>
-          </p:nvPr>
-        </p:nvSpPr>
-        <p:spPr>
-          <a:xfrm>
-            <a:off x="1088136" y="6272784"/>
-            <a:ext cx="6327648" cy="365125"/>
-          </a:xfrm>
-          <a:prstGeom prst="rect">
-            <a:avLst/>
-          </a:prstGeom>
-        </p:spPr>
-        <p:txBody>
-          <a:bodyPr/>
-          <a:lstStyle/>
-          <a:p>
-            <a:r>
-              <a:rPr lang="en-IN"/>
-              <a:t>LTI</a:t>
-            </a:r>
           </a:p>
         </p:txBody>
       </p:sp>
@@ -4899,7 +4659,7 @@
           <p:cNvPr id="6" name="Picture 5">
             <a:extLst>
               <a:ext uri="{FF2B5EF4-FFF2-40B4-BE49-F238E27FC236}">
-                <a16:creationId xmlns:a16="http://schemas.microsoft.com/office/drawing/2014/main" xmlns="" id="{8FEA9880-6788-4061-BAE2-5443DAA42C8E}"/>
+                <a16:creationId xmlns="" xmlns:a16="http://schemas.microsoft.com/office/drawing/2014/main" id="{8FEA9880-6788-4061-BAE2-5443DAA42C8E}"/>
               </a:ext>
             </a:extLst>
           </p:cNvPr>
@@ -4929,7 +4689,7 @@
           <p:cNvPr id="2" name="Title 1">
             <a:extLst>
               <a:ext uri="{FF2B5EF4-FFF2-40B4-BE49-F238E27FC236}">
-                <a16:creationId xmlns:a16="http://schemas.microsoft.com/office/drawing/2014/main" xmlns="" id="{B004FECF-7B01-4BD6-AC14-B4AEA8B15CC6}"/>
+                <a16:creationId xmlns="" xmlns:a16="http://schemas.microsoft.com/office/drawing/2014/main" id="{B004FECF-7B01-4BD6-AC14-B4AEA8B15CC6}"/>
               </a:ext>
             </a:extLst>
           </p:cNvPr>
@@ -4954,7 +4714,7 @@
           <p:cNvPr id="3" name="Subtitle 2">
             <a:extLst>
               <a:ext uri="{FF2B5EF4-FFF2-40B4-BE49-F238E27FC236}">
-                <a16:creationId xmlns:a16="http://schemas.microsoft.com/office/drawing/2014/main" xmlns="" id="{301CFC06-D255-4A7F-8CAC-9D511DC742D8}"/>
+                <a16:creationId xmlns="" xmlns:a16="http://schemas.microsoft.com/office/drawing/2014/main" id="{301CFC06-D255-4A7F-8CAC-9D511DC742D8}"/>
               </a:ext>
             </a:extLst>
           </p:cNvPr>
@@ -4976,46 +4736,10 @@
       </p:sp>
       <p:sp>
         <p:nvSpPr>
-          <p:cNvPr id="4" name="Footer Placeholder 3">
-            <a:extLst>
-              <a:ext uri="{FF2B5EF4-FFF2-40B4-BE49-F238E27FC236}">
-                <a16:creationId xmlns:a16="http://schemas.microsoft.com/office/drawing/2014/main" xmlns="" id="{F03A1FE9-31EA-49CA-91E5-430DB96AFD20}"/>
-              </a:ext>
-            </a:extLst>
-          </p:cNvPr>
-          <p:cNvSpPr>
-            <a:spLocks noGrp="1"/>
-          </p:cNvSpPr>
-          <p:nvPr>
-            <p:ph type="ftr" sz="quarter" idx="4294967295"/>
-          </p:nvPr>
-        </p:nvSpPr>
-        <p:spPr>
-          <a:xfrm>
-            <a:off x="1088136" y="6272784"/>
-            <a:ext cx="6327648" cy="365125"/>
-          </a:xfrm>
-          <a:prstGeom prst="rect">
-            <a:avLst/>
-          </a:prstGeom>
-        </p:spPr>
-        <p:txBody>
-          <a:bodyPr/>
-          <a:lstStyle/>
-          <a:p>
-            <a:r>
-              <a:rPr lang="en-IN"/>
-              <a:t>LTI</a:t>
-            </a:r>
-          </a:p>
-        </p:txBody>
-      </p:sp>
-      <p:sp>
-        <p:nvSpPr>
           <p:cNvPr id="5" name="Slide Number Placeholder 4">
             <a:extLst>
               <a:ext uri="{FF2B5EF4-FFF2-40B4-BE49-F238E27FC236}">
-                <a16:creationId xmlns:a16="http://schemas.microsoft.com/office/drawing/2014/main" xmlns="" id="{37AEE9CC-76EB-4BBA-B38C-F67372989389}"/>
+                <a16:creationId xmlns="" xmlns:a16="http://schemas.microsoft.com/office/drawing/2014/main" id="{37AEE9CC-76EB-4BBA-B38C-F67372989389}"/>
               </a:ext>
             </a:extLst>
           </p:cNvPr>
@@ -5081,7 +4805,7 @@
           <p:cNvPr id="2" name="Title 1">
             <a:extLst>
               <a:ext uri="{FF2B5EF4-FFF2-40B4-BE49-F238E27FC236}">
-                <a16:creationId xmlns:a16="http://schemas.microsoft.com/office/drawing/2014/main" xmlns="" id="{D30CFDCD-8BA0-4B40-A0BA-09DC9206F686}"/>
+                <a16:creationId xmlns="" xmlns:a16="http://schemas.microsoft.com/office/drawing/2014/main" id="{D30CFDCD-8BA0-4B40-A0BA-09DC9206F686}"/>
               </a:ext>
             </a:extLst>
           </p:cNvPr>
@@ -5114,7 +4838,7 @@
           <p:cNvPr id="10" name="Table 10">
             <a:extLst>
               <a:ext uri="{FF2B5EF4-FFF2-40B4-BE49-F238E27FC236}">
-                <a16:creationId xmlns:a16="http://schemas.microsoft.com/office/drawing/2014/main" xmlns="" id="{D5A6AAD7-30F7-400F-8014-1E4EAF061F25}"/>
+                <a16:creationId xmlns="" xmlns:a16="http://schemas.microsoft.com/office/drawing/2014/main" id="{D5A6AAD7-30F7-400F-8014-1E4EAF061F25}"/>
               </a:ext>
             </a:extLst>
           </p:cNvPr>
@@ -5144,28 +4868,28 @@
                 <a:gridCol w="964545">
                   <a:extLst>
                     <a:ext uri="{9D8B030D-6E8A-4147-A177-3AD203B41FA5}">
-                      <a16:colId xmlns:a16="http://schemas.microsoft.com/office/drawing/2014/main" xmlns="" val="3940079262"/>
+                      <a16:colId xmlns="" xmlns:a16="http://schemas.microsoft.com/office/drawing/2014/main" val="3940079262"/>
                     </a:ext>
                   </a:extLst>
                 </a:gridCol>
                 <a:gridCol w="1107423">
                   <a:extLst>
                     <a:ext uri="{9D8B030D-6E8A-4147-A177-3AD203B41FA5}">
-                      <a16:colId xmlns:a16="http://schemas.microsoft.com/office/drawing/2014/main" xmlns="" val="4264271168"/>
+                      <a16:colId xmlns="" xmlns:a16="http://schemas.microsoft.com/office/drawing/2014/main" val="4264271168"/>
                     </a:ext>
                   </a:extLst>
                 </a:gridCol>
                 <a:gridCol w="1205701">
                   <a:extLst>
                     <a:ext uri="{9D8B030D-6E8A-4147-A177-3AD203B41FA5}">
-                      <a16:colId xmlns:a16="http://schemas.microsoft.com/office/drawing/2014/main" xmlns="" val="2865022530"/>
+                      <a16:colId xmlns="" xmlns:a16="http://schemas.microsoft.com/office/drawing/2014/main" val="2865022530"/>
                     </a:ext>
                   </a:extLst>
                 </a:gridCol>
                 <a:gridCol w="1205701">
                   <a:extLst>
                     <a:ext uri="{9D8B030D-6E8A-4147-A177-3AD203B41FA5}">
-                      <a16:colId xmlns:a16="http://schemas.microsoft.com/office/drawing/2014/main" xmlns="" val="1957130148"/>
+                      <a16:colId xmlns="" xmlns:a16="http://schemas.microsoft.com/office/drawing/2014/main" val="1957130148"/>
                     </a:ext>
                   </a:extLst>
                 </a:gridCol>
@@ -5230,7 +4954,7 @@
                 </a:tc>
                 <a:extLst>
                   <a:ext uri="{0D108BD9-81ED-4DB2-BD59-A6C34878D82A}">
-                    <a16:rowId xmlns:a16="http://schemas.microsoft.com/office/drawing/2014/main" xmlns="" val="2289267193"/>
+                    <a16:rowId xmlns="" xmlns:a16="http://schemas.microsoft.com/office/drawing/2014/main" val="2289267193"/>
                   </a:ext>
                 </a:extLst>
               </a:tr>
@@ -5293,7 +5017,7 @@
                 </a:tc>
                 <a:extLst>
                   <a:ext uri="{0D108BD9-81ED-4DB2-BD59-A6C34878D82A}">
-                    <a16:rowId xmlns:a16="http://schemas.microsoft.com/office/drawing/2014/main" xmlns="" val="1292424287"/>
+                    <a16:rowId xmlns="" xmlns:a16="http://schemas.microsoft.com/office/drawing/2014/main" val="1292424287"/>
                   </a:ext>
                 </a:extLst>
               </a:tr>
@@ -5356,7 +5080,7 @@
                 </a:tc>
                 <a:extLst>
                   <a:ext uri="{0D108BD9-81ED-4DB2-BD59-A6C34878D82A}">
-                    <a16:rowId xmlns:a16="http://schemas.microsoft.com/office/drawing/2014/main" xmlns="" val="669336296"/>
+                    <a16:rowId xmlns="" xmlns:a16="http://schemas.microsoft.com/office/drawing/2014/main" val="669336296"/>
                   </a:ext>
                 </a:extLst>
               </a:tr>
@@ -5419,7 +5143,7 @@
                 </a:tc>
                 <a:extLst>
                   <a:ext uri="{0D108BD9-81ED-4DB2-BD59-A6C34878D82A}">
-                    <a16:rowId xmlns:a16="http://schemas.microsoft.com/office/drawing/2014/main" xmlns="" val="3693334737"/>
+                    <a16:rowId xmlns="" xmlns:a16="http://schemas.microsoft.com/office/drawing/2014/main" val="3693334737"/>
                   </a:ext>
                 </a:extLst>
               </a:tr>
@@ -5470,7 +5194,7 @@
                 </a:tc>
                 <a:extLst>
                   <a:ext uri="{0D108BD9-81ED-4DB2-BD59-A6C34878D82A}">
-                    <a16:rowId xmlns:a16="http://schemas.microsoft.com/office/drawing/2014/main" xmlns="" val="2811319940"/>
+                    <a16:rowId xmlns="" xmlns:a16="http://schemas.microsoft.com/office/drawing/2014/main" val="2811319940"/>
                   </a:ext>
                 </a:extLst>
               </a:tr>
@@ -5480,38 +5204,10 @@
       </p:graphicFrame>
       <p:sp>
         <p:nvSpPr>
-          <p:cNvPr id="4" name="Footer Placeholder 3">
-            <a:extLst>
-              <a:ext uri="{FF2B5EF4-FFF2-40B4-BE49-F238E27FC236}">
-                <a16:creationId xmlns:a16="http://schemas.microsoft.com/office/drawing/2014/main" xmlns="" id="{91A57C16-5496-4DE9-8B96-3839EAD0C72F}"/>
-              </a:ext>
-            </a:extLst>
-          </p:cNvPr>
-          <p:cNvSpPr>
-            <a:spLocks noGrp="1"/>
-          </p:cNvSpPr>
-          <p:nvPr>
-            <p:ph type="ftr" sz="quarter" idx="11"/>
-          </p:nvPr>
-        </p:nvSpPr>
-        <p:spPr/>
-        <p:txBody>
-          <a:bodyPr/>
-          <a:lstStyle/>
-          <a:p>
-            <a:r>
-              <a:rPr lang="en-IN"/>
-              <a:t>LTI</a:t>
-            </a:r>
-          </a:p>
-        </p:txBody>
-      </p:sp>
-      <p:sp>
-        <p:nvSpPr>
           <p:cNvPr id="5" name="Slide Number Placeholder 4">
             <a:extLst>
               <a:ext uri="{FF2B5EF4-FFF2-40B4-BE49-F238E27FC236}">
-                <a16:creationId xmlns:a16="http://schemas.microsoft.com/office/drawing/2014/main" xmlns="" id="{24E405AE-2B0D-46DA-87E6-21469F325565}"/>
+                <a16:creationId xmlns="" xmlns:a16="http://schemas.microsoft.com/office/drawing/2014/main" id="{24E405AE-2B0D-46DA-87E6-21469F325565}"/>
               </a:ext>
             </a:extLst>
           </p:cNvPr>
@@ -5540,7 +5236,7 @@
           <p:cNvPr id="12" name="TextBox 11">
             <a:extLst>
               <a:ext uri="{FF2B5EF4-FFF2-40B4-BE49-F238E27FC236}">
-                <a16:creationId xmlns:a16="http://schemas.microsoft.com/office/drawing/2014/main" xmlns="" id="{910442FB-58A3-4E57-BE15-BB5018BC0A38}"/>
+                <a16:creationId xmlns="" xmlns:a16="http://schemas.microsoft.com/office/drawing/2014/main" id="{910442FB-58A3-4E57-BE15-BB5018BC0A38}"/>
               </a:ext>
             </a:extLst>
           </p:cNvPr>
@@ -5572,7 +5268,7 @@
           <p:cNvPr id="14" name="TextBox 13">
             <a:extLst>
               <a:ext uri="{FF2B5EF4-FFF2-40B4-BE49-F238E27FC236}">
-                <a16:creationId xmlns:a16="http://schemas.microsoft.com/office/drawing/2014/main" xmlns="" id="{41EB6224-7EC5-43B4-909E-FBC06BFC0332}"/>
+                <a16:creationId xmlns="" xmlns:a16="http://schemas.microsoft.com/office/drawing/2014/main" id="{41EB6224-7EC5-43B4-909E-FBC06BFC0332}"/>
               </a:ext>
             </a:extLst>
           </p:cNvPr>
@@ -5607,7 +5303,7 @@
           <p:cNvPr id="15" name="TextBox 14">
             <a:extLst>
               <a:ext uri="{FF2B5EF4-FFF2-40B4-BE49-F238E27FC236}">
-                <a16:creationId xmlns:a16="http://schemas.microsoft.com/office/drawing/2014/main" xmlns="" id="{92444047-752C-457B-8388-E35AC11D5917}"/>
+                <a16:creationId xmlns="" xmlns:a16="http://schemas.microsoft.com/office/drawing/2014/main" id="{92444047-752C-457B-8388-E35AC11D5917}"/>
               </a:ext>
             </a:extLst>
           </p:cNvPr>
@@ -5643,7 +5339,7 @@
           <p:cNvPr id="16" name="TextBox 15">
             <a:extLst>
               <a:ext uri="{FF2B5EF4-FFF2-40B4-BE49-F238E27FC236}">
-                <a16:creationId xmlns:a16="http://schemas.microsoft.com/office/drawing/2014/main" xmlns="" id="{545923E0-0938-4665-BA8D-41E0AD7DF9E3}"/>
+                <a16:creationId xmlns="" xmlns:a16="http://schemas.microsoft.com/office/drawing/2014/main" id="{545923E0-0938-4665-BA8D-41E0AD7DF9E3}"/>
               </a:ext>
             </a:extLst>
           </p:cNvPr>
@@ -5678,7 +5374,7 @@
           <p:cNvPr id="17" name="Left Brace 16">
             <a:extLst>
               <a:ext uri="{FF2B5EF4-FFF2-40B4-BE49-F238E27FC236}">
-                <a16:creationId xmlns:a16="http://schemas.microsoft.com/office/drawing/2014/main" xmlns="" id="{F732B816-9287-4F35-AED4-2426993A81F7}"/>
+                <a16:creationId xmlns="" xmlns:a16="http://schemas.microsoft.com/office/drawing/2014/main" id="{F732B816-9287-4F35-AED4-2426993A81F7}"/>
               </a:ext>
             </a:extLst>
           </p:cNvPr>
@@ -5722,7 +5418,7 @@
           <p:cNvPr id="19" name="Straight Arrow Connector 18">
             <a:extLst>
               <a:ext uri="{FF2B5EF4-FFF2-40B4-BE49-F238E27FC236}">
-                <a16:creationId xmlns:a16="http://schemas.microsoft.com/office/drawing/2014/main" xmlns="" id="{FE755AC0-E58D-4F5E-9ACC-FC613B4ADC06}"/>
+                <a16:creationId xmlns="" xmlns:a16="http://schemas.microsoft.com/office/drawing/2014/main" id="{FE755AC0-E58D-4F5E-9ACC-FC613B4ADC06}"/>
               </a:ext>
             </a:extLst>
           </p:cNvPr>
@@ -5763,7 +5459,7 @@
           <p:cNvPr id="22" name="Straight Arrow Connector 21">
             <a:extLst>
               <a:ext uri="{FF2B5EF4-FFF2-40B4-BE49-F238E27FC236}">
-                <a16:creationId xmlns:a16="http://schemas.microsoft.com/office/drawing/2014/main" xmlns="" id="{2E11EBAD-914D-4F45-B65A-EF615E4BFA53}"/>
+                <a16:creationId xmlns="" xmlns:a16="http://schemas.microsoft.com/office/drawing/2014/main" id="{2E11EBAD-914D-4F45-B65A-EF615E4BFA53}"/>
               </a:ext>
             </a:extLst>
           </p:cNvPr>
@@ -5802,7 +5498,7 @@
           <p:cNvPr id="23" name="TextBox 22">
             <a:extLst>
               <a:ext uri="{FF2B5EF4-FFF2-40B4-BE49-F238E27FC236}">
-                <a16:creationId xmlns:a16="http://schemas.microsoft.com/office/drawing/2014/main" xmlns="" id="{55AFA919-0512-475A-A7B0-C54C42252364}"/>
+                <a16:creationId xmlns="" xmlns:a16="http://schemas.microsoft.com/office/drawing/2014/main" id="{55AFA919-0512-475A-A7B0-C54C42252364}"/>
               </a:ext>
             </a:extLst>
           </p:cNvPr>
@@ -5854,7 +5550,7 @@
           <p:cNvPr id="3" name="TextBox 2">
             <a:extLst>
               <a:ext uri="{FF2B5EF4-FFF2-40B4-BE49-F238E27FC236}">
-                <a16:creationId xmlns:a16="http://schemas.microsoft.com/office/drawing/2014/main" xmlns="" id="{1FB80E11-5515-4AEC-AE61-EC01199AA5F3}"/>
+                <a16:creationId xmlns="" xmlns:a16="http://schemas.microsoft.com/office/drawing/2014/main" id="{1FB80E11-5515-4AEC-AE61-EC01199AA5F3}"/>
               </a:ext>
             </a:extLst>
           </p:cNvPr>
@@ -6276,7 +5972,7 @@
           <p:cNvPr id="2" name="Title 1">
             <a:extLst>
               <a:ext uri="{FF2B5EF4-FFF2-40B4-BE49-F238E27FC236}">
-                <a16:creationId xmlns:a16="http://schemas.microsoft.com/office/drawing/2014/main" xmlns="" id="{45D0DFE9-0A81-4BD4-8516-A33DACE69A88}"/>
+                <a16:creationId xmlns="" xmlns:a16="http://schemas.microsoft.com/office/drawing/2014/main" id="{45D0DFE9-0A81-4BD4-8516-A33DACE69A88}"/>
               </a:ext>
             </a:extLst>
           </p:cNvPr>
@@ -6309,7 +6005,7 @@
           <p:cNvPr id="3" name="Content Placeholder 2">
             <a:extLst>
               <a:ext uri="{FF2B5EF4-FFF2-40B4-BE49-F238E27FC236}">
-                <a16:creationId xmlns:a16="http://schemas.microsoft.com/office/drawing/2014/main" xmlns="" id="{DADC227C-44EF-46EE-BAC3-70C956C76226}"/>
+                <a16:creationId xmlns="" xmlns:a16="http://schemas.microsoft.com/office/drawing/2014/main" id="{DADC227C-44EF-46EE-BAC3-70C956C76226}"/>
               </a:ext>
             </a:extLst>
           </p:cNvPr>
@@ -6399,7 +6095,7 @@
           <p:cNvPr id="4" name="Footer Placeholder 3">
             <a:extLst>
               <a:ext uri="{FF2B5EF4-FFF2-40B4-BE49-F238E27FC236}">
-                <a16:creationId xmlns:a16="http://schemas.microsoft.com/office/drawing/2014/main" xmlns="" id="{ACDE256B-3C3D-4E7B-8DF2-133F94214B6C}"/>
+                <a16:creationId xmlns="" xmlns:a16="http://schemas.microsoft.com/office/drawing/2014/main" id="{ACDE256B-3C3D-4E7B-8DF2-133F94214B6C}"/>
               </a:ext>
             </a:extLst>
           </p:cNvPr>
@@ -6407,18 +6103,23 @@
             <a:spLocks noGrp="1"/>
           </p:cNvSpPr>
           <p:nvPr>
-            <p:ph type="ftr" sz="quarter" idx="11"/>
+            <p:ph type="ftr" sz="quarter" idx="4294967295"/>
           </p:nvPr>
         </p:nvSpPr>
-        <p:spPr/>
+        <p:spPr>
+          <a:xfrm>
+            <a:off x="1088136" y="6272784"/>
+            <a:ext cx="6327648" cy="365125"/>
+          </a:xfrm>
+          <a:prstGeom prst="rect">
+            <a:avLst/>
+          </a:prstGeom>
+        </p:spPr>
         <p:txBody>
           <a:bodyPr/>
           <a:lstStyle/>
           <a:p>
-            <a:r>
-              <a:rPr lang="en-IN" dirty="0"/>
-              <a:t>LTI</a:t>
-            </a:r>
+            <a:endParaRPr lang="en-IN" dirty="0"/>
           </a:p>
         </p:txBody>
       </p:sp>
@@ -6427,7 +6128,7 @@
           <p:cNvPr id="5" name="Slide Number Placeholder 4">
             <a:extLst>
               <a:ext uri="{FF2B5EF4-FFF2-40B4-BE49-F238E27FC236}">
-                <a16:creationId xmlns:a16="http://schemas.microsoft.com/office/drawing/2014/main" xmlns="" id="{E4757017-9AE3-476E-ADD7-0DFDBF704C20}"/>
+                <a16:creationId xmlns="" xmlns:a16="http://schemas.microsoft.com/office/drawing/2014/main" id="{E4757017-9AE3-476E-ADD7-0DFDBF704C20}"/>
               </a:ext>
             </a:extLst>
           </p:cNvPr>
@@ -6456,7 +6157,7 @@
           <p:cNvPr id="14" name="Picture 13">
             <a:extLst>
               <a:ext uri="{FF2B5EF4-FFF2-40B4-BE49-F238E27FC236}">
-                <a16:creationId xmlns:a16="http://schemas.microsoft.com/office/drawing/2014/main" xmlns="" id="{2015748C-87C5-4FC1-A00F-7A1955526E00}"/>
+                <a16:creationId xmlns="" xmlns:a16="http://schemas.microsoft.com/office/drawing/2014/main" id="{2015748C-87C5-4FC1-A00F-7A1955526E00}"/>
               </a:ext>
             </a:extLst>
           </p:cNvPr>
@@ -6486,7 +6187,7 @@
           <p:cNvPr id="15" name="TextBox 14">
             <a:extLst>
               <a:ext uri="{FF2B5EF4-FFF2-40B4-BE49-F238E27FC236}">
-                <a16:creationId xmlns:a16="http://schemas.microsoft.com/office/drawing/2014/main" xmlns="" id="{4D2E55F6-7983-40D1-92CB-EE59F471CFE3}"/>
+                <a16:creationId xmlns="" xmlns:a16="http://schemas.microsoft.com/office/drawing/2014/main" id="{4D2E55F6-7983-40D1-92CB-EE59F471CFE3}"/>
               </a:ext>
             </a:extLst>
           </p:cNvPr>
@@ -6521,7 +6222,7 @@
           <p:cNvPr id="17" name="Straight Arrow Connector 16">
             <a:extLst>
               <a:ext uri="{FF2B5EF4-FFF2-40B4-BE49-F238E27FC236}">
-                <a16:creationId xmlns:a16="http://schemas.microsoft.com/office/drawing/2014/main" xmlns="" id="{9697C86E-37AB-4DC0-94BE-B43DD6872A8E}"/>
+                <a16:creationId xmlns="" xmlns:a16="http://schemas.microsoft.com/office/drawing/2014/main" id="{9697C86E-37AB-4DC0-94BE-B43DD6872A8E}"/>
               </a:ext>
             </a:extLst>
           </p:cNvPr>
@@ -6560,7 +6261,7 @@
           <p:cNvPr id="19" name="TextBox 18">
             <a:extLst>
               <a:ext uri="{FF2B5EF4-FFF2-40B4-BE49-F238E27FC236}">
-                <a16:creationId xmlns:a16="http://schemas.microsoft.com/office/drawing/2014/main" xmlns="" id="{C142898D-61F9-425F-9422-AF9454BDF212}"/>
+                <a16:creationId xmlns="" xmlns:a16="http://schemas.microsoft.com/office/drawing/2014/main" id="{C142898D-61F9-425F-9422-AF9454BDF212}"/>
               </a:ext>
             </a:extLst>
           </p:cNvPr>
@@ -6595,7 +6296,7 @@
           <p:cNvPr id="20" name="Straight Arrow Connector 19">
             <a:extLst>
               <a:ext uri="{FF2B5EF4-FFF2-40B4-BE49-F238E27FC236}">
-                <a16:creationId xmlns:a16="http://schemas.microsoft.com/office/drawing/2014/main" xmlns="" id="{567DD846-2C72-4B8C-8351-2D5058A56C32}"/>
+                <a16:creationId xmlns="" xmlns:a16="http://schemas.microsoft.com/office/drawing/2014/main" id="{567DD846-2C72-4B8C-8351-2D5058A56C32}"/>
               </a:ext>
             </a:extLst>
           </p:cNvPr>
@@ -6634,7 +6335,7 @@
           <p:cNvPr id="21" name="TextBox 20">
             <a:extLst>
               <a:ext uri="{FF2B5EF4-FFF2-40B4-BE49-F238E27FC236}">
-                <a16:creationId xmlns:a16="http://schemas.microsoft.com/office/drawing/2014/main" xmlns="" id="{AD005C5E-1DA5-44AD-A543-6C91826B4723}"/>
+                <a16:creationId xmlns="" xmlns:a16="http://schemas.microsoft.com/office/drawing/2014/main" id="{AD005C5E-1DA5-44AD-A543-6C91826B4723}"/>
               </a:ext>
             </a:extLst>
           </p:cNvPr>
@@ -6673,7 +6374,7 @@
           <p:cNvPr id="22" name="TextBox 21">
             <a:extLst>
               <a:ext uri="{FF2B5EF4-FFF2-40B4-BE49-F238E27FC236}">
-                <a16:creationId xmlns:a16="http://schemas.microsoft.com/office/drawing/2014/main" xmlns="" id="{A6686732-2554-4363-B35D-EFB4093935C6}"/>
+                <a16:creationId xmlns="" xmlns:a16="http://schemas.microsoft.com/office/drawing/2014/main" id="{A6686732-2554-4363-B35D-EFB4093935C6}"/>
               </a:ext>
             </a:extLst>
           </p:cNvPr>
@@ -6708,7 +6409,7 @@
           <p:cNvPr id="23" name="Straight Arrow Connector 22">
             <a:extLst>
               <a:ext uri="{FF2B5EF4-FFF2-40B4-BE49-F238E27FC236}">
-                <a16:creationId xmlns:a16="http://schemas.microsoft.com/office/drawing/2014/main" xmlns="" id="{65C4ADA5-26C7-459A-B422-EEC5E16A12C8}"/>
+                <a16:creationId xmlns="" xmlns:a16="http://schemas.microsoft.com/office/drawing/2014/main" id="{65C4ADA5-26C7-459A-B422-EEC5E16A12C8}"/>
               </a:ext>
             </a:extLst>
           </p:cNvPr>
@@ -6749,7 +6450,7 @@
           <p:cNvPr id="24" name="TextBox 23">
             <a:extLst>
               <a:ext uri="{FF2B5EF4-FFF2-40B4-BE49-F238E27FC236}">
-                <a16:creationId xmlns:a16="http://schemas.microsoft.com/office/drawing/2014/main" xmlns="" id="{96B02681-6637-4573-95BA-8BDF12EA677D}"/>
+                <a16:creationId xmlns="" xmlns:a16="http://schemas.microsoft.com/office/drawing/2014/main" id="{96B02681-6637-4573-95BA-8BDF12EA677D}"/>
               </a:ext>
             </a:extLst>
           </p:cNvPr>
@@ -6815,7 +6516,7 @@
           <p:cNvPr id="25" name="TextBox 24">
             <a:extLst>
               <a:ext uri="{FF2B5EF4-FFF2-40B4-BE49-F238E27FC236}">
-                <a16:creationId xmlns:a16="http://schemas.microsoft.com/office/drawing/2014/main" xmlns="" id="{97DD1044-5646-4891-BE2B-1AD4ECCA5520}"/>
+                <a16:creationId xmlns="" xmlns:a16="http://schemas.microsoft.com/office/drawing/2014/main" id="{97DD1044-5646-4891-BE2B-1AD4ECCA5520}"/>
               </a:ext>
             </a:extLst>
           </p:cNvPr>
@@ -6850,7 +6551,7 @@
           <p:cNvPr id="27" name="Straight Arrow Connector 26">
             <a:extLst>
               <a:ext uri="{FF2B5EF4-FFF2-40B4-BE49-F238E27FC236}">
-                <a16:creationId xmlns:a16="http://schemas.microsoft.com/office/drawing/2014/main" xmlns="" id="{19C65DCC-06AA-4E9D-9B66-0F3DAF9CA488}"/>
+                <a16:creationId xmlns="" xmlns:a16="http://schemas.microsoft.com/office/drawing/2014/main" id="{19C65DCC-06AA-4E9D-9B66-0F3DAF9CA488}"/>
               </a:ext>
             </a:extLst>
           </p:cNvPr>
@@ -6891,7 +6592,7 @@
           <p:cNvPr id="31" name="TextBox 30">
             <a:extLst>
               <a:ext uri="{FF2B5EF4-FFF2-40B4-BE49-F238E27FC236}">
-                <a16:creationId xmlns:a16="http://schemas.microsoft.com/office/drawing/2014/main" xmlns="" id="{E0A89BB9-6FD7-488A-86DD-4FC3BFBB9009}"/>
+                <a16:creationId xmlns="" xmlns:a16="http://schemas.microsoft.com/office/drawing/2014/main" id="{E0A89BB9-6FD7-488A-86DD-4FC3BFBB9009}"/>
               </a:ext>
             </a:extLst>
           </p:cNvPr>
@@ -7469,7 +7170,7 @@
           <p:cNvPr id="2" name="Title 1">
             <a:extLst>
               <a:ext uri="{FF2B5EF4-FFF2-40B4-BE49-F238E27FC236}">
-                <a16:creationId xmlns:a16="http://schemas.microsoft.com/office/drawing/2014/main" xmlns="" id="{62396CBE-A93E-4C8C-8B03-22575DCB0229}"/>
+                <a16:creationId xmlns="" xmlns:a16="http://schemas.microsoft.com/office/drawing/2014/main" id="{62396CBE-A93E-4C8C-8B03-22575DCB0229}"/>
               </a:ext>
             </a:extLst>
           </p:cNvPr>
@@ -7502,7 +7203,7 @@
           <p:cNvPr id="3" name="Content Placeholder 2">
             <a:extLst>
               <a:ext uri="{FF2B5EF4-FFF2-40B4-BE49-F238E27FC236}">
-                <a16:creationId xmlns:a16="http://schemas.microsoft.com/office/drawing/2014/main" xmlns="" id="{15A4A3BF-7DAA-4D2D-BDD3-88F1C131AF78}"/>
+                <a16:creationId xmlns="" xmlns:a16="http://schemas.microsoft.com/office/drawing/2014/main" id="{15A4A3BF-7DAA-4D2D-BDD3-88F1C131AF78}"/>
               </a:ext>
             </a:extLst>
           </p:cNvPr>
@@ -7578,38 +7279,10 @@
       </p:sp>
       <p:sp>
         <p:nvSpPr>
-          <p:cNvPr id="4" name="Footer Placeholder 3">
-            <a:extLst>
-              <a:ext uri="{FF2B5EF4-FFF2-40B4-BE49-F238E27FC236}">
-                <a16:creationId xmlns:a16="http://schemas.microsoft.com/office/drawing/2014/main" xmlns="" id="{9BD46EF2-0F83-4C27-BBA0-09D1F1D3AD43}"/>
-              </a:ext>
-            </a:extLst>
-          </p:cNvPr>
-          <p:cNvSpPr>
-            <a:spLocks noGrp="1"/>
-          </p:cNvSpPr>
-          <p:nvPr>
-            <p:ph type="ftr" sz="quarter" idx="11"/>
-          </p:nvPr>
-        </p:nvSpPr>
-        <p:spPr/>
-        <p:txBody>
-          <a:bodyPr/>
-          <a:lstStyle/>
-          <a:p>
-            <a:r>
-              <a:rPr lang="en-IN"/>
-              <a:t>LTI</a:t>
-            </a:r>
-          </a:p>
-        </p:txBody>
-      </p:sp>
-      <p:sp>
-        <p:nvSpPr>
           <p:cNvPr id="5" name="Slide Number Placeholder 4">
             <a:extLst>
               <a:ext uri="{FF2B5EF4-FFF2-40B4-BE49-F238E27FC236}">
-                <a16:creationId xmlns:a16="http://schemas.microsoft.com/office/drawing/2014/main" xmlns="" id="{E4FFF4D0-1459-46E5-9FAB-D3CB8C3DF729}"/>
+                <a16:creationId xmlns="" xmlns:a16="http://schemas.microsoft.com/office/drawing/2014/main" id="{E4FFF4D0-1459-46E5-9FAB-D3CB8C3DF729}"/>
               </a:ext>
             </a:extLst>
           </p:cNvPr>
@@ -7638,7 +7311,7 @@
           <p:cNvPr id="6" name="Picture 5">
             <a:extLst>
               <a:ext uri="{FF2B5EF4-FFF2-40B4-BE49-F238E27FC236}">
-                <a16:creationId xmlns:a16="http://schemas.microsoft.com/office/drawing/2014/main" xmlns="" id="{F7270201-3641-419C-9149-78AFAE90952F}"/>
+                <a16:creationId xmlns="" xmlns:a16="http://schemas.microsoft.com/office/drawing/2014/main" id="{F7270201-3641-419C-9149-78AFAE90952F}"/>
               </a:ext>
             </a:extLst>
           </p:cNvPr>
@@ -7668,7 +7341,7 @@
           <p:cNvPr id="10" name="Picture 9">
             <a:extLst>
               <a:ext uri="{FF2B5EF4-FFF2-40B4-BE49-F238E27FC236}">
-                <a16:creationId xmlns:a16="http://schemas.microsoft.com/office/drawing/2014/main" xmlns="" id="{9370CD8F-BAC6-4427-ABE5-089CE62C0CCE}"/>
+                <a16:creationId xmlns="" xmlns:a16="http://schemas.microsoft.com/office/drawing/2014/main" id="{9370CD8F-BAC6-4427-ABE5-089CE62C0CCE}"/>
               </a:ext>
             </a:extLst>
           </p:cNvPr>
@@ -7698,7 +7371,7 @@
           <p:cNvPr id="12" name="Picture 11">
             <a:extLst>
               <a:ext uri="{FF2B5EF4-FFF2-40B4-BE49-F238E27FC236}">
-                <a16:creationId xmlns:a16="http://schemas.microsoft.com/office/drawing/2014/main" xmlns="" id="{80256A22-E347-496E-B6DD-75AC6420442C}"/>
+                <a16:creationId xmlns="" xmlns:a16="http://schemas.microsoft.com/office/drawing/2014/main" id="{80256A22-E347-496E-B6DD-75AC6420442C}"/>
               </a:ext>
             </a:extLst>
           </p:cNvPr>
@@ -7728,7 +7401,7 @@
           <p:cNvPr id="13" name="Picture 12">
             <a:extLst>
               <a:ext uri="{FF2B5EF4-FFF2-40B4-BE49-F238E27FC236}">
-                <a16:creationId xmlns:a16="http://schemas.microsoft.com/office/drawing/2014/main" xmlns="" id="{7C468FE7-6EC2-446E-9C27-8D3C91E5F62B}"/>
+                <a16:creationId xmlns="" xmlns:a16="http://schemas.microsoft.com/office/drawing/2014/main" id="{7C468FE7-6EC2-446E-9C27-8D3C91E5F62B}"/>
               </a:ext>
             </a:extLst>
           </p:cNvPr>
@@ -7924,7 +7597,7 @@
           <p:cNvPr id="2" name="Title 1">
             <a:extLst>
               <a:ext uri="{FF2B5EF4-FFF2-40B4-BE49-F238E27FC236}">
-                <a16:creationId xmlns:a16="http://schemas.microsoft.com/office/drawing/2014/main" xmlns="" id="{2448DDA2-9FDF-41AB-8AD4-3BD81C6C979A}"/>
+                <a16:creationId xmlns="" xmlns:a16="http://schemas.microsoft.com/office/drawing/2014/main" id="{2448DDA2-9FDF-41AB-8AD4-3BD81C6C979A}"/>
               </a:ext>
             </a:extLst>
           </p:cNvPr>
@@ -7957,7 +7630,7 @@
           <p:cNvPr id="3" name="Content Placeholder 2">
             <a:extLst>
               <a:ext uri="{FF2B5EF4-FFF2-40B4-BE49-F238E27FC236}">
-                <a16:creationId xmlns:a16="http://schemas.microsoft.com/office/drawing/2014/main" xmlns="" id="{E55E3661-3B05-49FA-A163-482C5502E872}"/>
+                <a16:creationId xmlns="" xmlns:a16="http://schemas.microsoft.com/office/drawing/2014/main" id="{E55E3661-3B05-49FA-A163-482C5502E872}"/>
               </a:ext>
             </a:extLst>
           </p:cNvPr>
@@ -8008,38 +7681,10 @@
       </p:sp>
       <p:sp>
         <p:nvSpPr>
-          <p:cNvPr id="4" name="Footer Placeholder 3">
-            <a:extLst>
-              <a:ext uri="{FF2B5EF4-FFF2-40B4-BE49-F238E27FC236}">
-                <a16:creationId xmlns:a16="http://schemas.microsoft.com/office/drawing/2014/main" xmlns="" id="{222F2A57-18F7-4FD0-B87F-3BD1D8A24A63}"/>
-              </a:ext>
-            </a:extLst>
-          </p:cNvPr>
-          <p:cNvSpPr>
-            <a:spLocks noGrp="1"/>
-          </p:cNvSpPr>
-          <p:nvPr>
-            <p:ph type="ftr" sz="quarter" idx="11"/>
-          </p:nvPr>
-        </p:nvSpPr>
-        <p:spPr/>
-        <p:txBody>
-          <a:bodyPr/>
-          <a:lstStyle/>
-          <a:p>
-            <a:r>
-              <a:rPr lang="en-IN"/>
-              <a:t>LTI</a:t>
-            </a:r>
-          </a:p>
-        </p:txBody>
-      </p:sp>
-      <p:sp>
-        <p:nvSpPr>
           <p:cNvPr id="5" name="Slide Number Placeholder 4">
             <a:extLst>
               <a:ext uri="{FF2B5EF4-FFF2-40B4-BE49-F238E27FC236}">
-                <a16:creationId xmlns:a16="http://schemas.microsoft.com/office/drawing/2014/main" xmlns="" id="{6A028F76-4770-4D90-BA33-4E7F360AB234}"/>
+                <a16:creationId xmlns="" xmlns:a16="http://schemas.microsoft.com/office/drawing/2014/main" id="{6A028F76-4770-4D90-BA33-4E7F360AB234}"/>
               </a:ext>
             </a:extLst>
           </p:cNvPr>
@@ -8068,7 +7713,7 @@
           <p:cNvPr id="6" name="Picture 5">
             <a:extLst>
               <a:ext uri="{FF2B5EF4-FFF2-40B4-BE49-F238E27FC236}">
-                <a16:creationId xmlns:a16="http://schemas.microsoft.com/office/drawing/2014/main" xmlns="" id="{F9D68BCD-3206-41DB-9A74-4411EE712615}"/>
+                <a16:creationId xmlns="" xmlns:a16="http://schemas.microsoft.com/office/drawing/2014/main" id="{F9D68BCD-3206-41DB-9A74-4411EE712615}"/>
               </a:ext>
             </a:extLst>
           </p:cNvPr>
@@ -8098,7 +7743,7 @@
           <p:cNvPr id="8" name="Picture 7">
             <a:extLst>
               <a:ext uri="{FF2B5EF4-FFF2-40B4-BE49-F238E27FC236}">
-                <a16:creationId xmlns:a16="http://schemas.microsoft.com/office/drawing/2014/main" xmlns="" id="{1C151106-2E06-4112-8A04-15A0756E3E18}"/>
+                <a16:creationId xmlns="" xmlns:a16="http://schemas.microsoft.com/office/drawing/2014/main" id="{1C151106-2E06-4112-8A04-15A0756E3E18}"/>
               </a:ext>
             </a:extLst>
           </p:cNvPr>
@@ -8128,7 +7773,7 @@
           <p:cNvPr id="9" name="Picture 8">
             <a:extLst>
               <a:ext uri="{FF2B5EF4-FFF2-40B4-BE49-F238E27FC236}">
-                <a16:creationId xmlns:a16="http://schemas.microsoft.com/office/drawing/2014/main" xmlns="" id="{F216238D-CBD3-4BA1-B7B7-AB7E8FFCE6B3}"/>
+                <a16:creationId xmlns="" xmlns:a16="http://schemas.microsoft.com/office/drawing/2014/main" id="{F216238D-CBD3-4BA1-B7B7-AB7E8FFCE6B3}"/>
               </a:ext>
             </a:extLst>
           </p:cNvPr>
@@ -8158,7 +7803,7 @@
           <p:cNvPr id="10" name="Picture 9">
             <a:extLst>
               <a:ext uri="{FF2B5EF4-FFF2-40B4-BE49-F238E27FC236}">
-                <a16:creationId xmlns:a16="http://schemas.microsoft.com/office/drawing/2014/main" xmlns="" id="{2E23F57E-4788-45D8-8C7C-4BF3032D1A74}"/>
+                <a16:creationId xmlns="" xmlns:a16="http://schemas.microsoft.com/office/drawing/2014/main" id="{2E23F57E-4788-45D8-8C7C-4BF3032D1A74}"/>
               </a:ext>
             </a:extLst>
           </p:cNvPr>
@@ -8354,7 +7999,7 @@
           <p:cNvPr id="2" name="Title 1">
             <a:extLst>
               <a:ext uri="{FF2B5EF4-FFF2-40B4-BE49-F238E27FC236}">
-                <a16:creationId xmlns:a16="http://schemas.microsoft.com/office/drawing/2014/main" xmlns="" id="{5FBC4EC7-934A-47A1-A27B-EC1C94F31F24}"/>
+                <a16:creationId xmlns="" xmlns:a16="http://schemas.microsoft.com/office/drawing/2014/main" id="{5FBC4EC7-934A-47A1-A27B-EC1C94F31F24}"/>
               </a:ext>
             </a:extLst>
           </p:cNvPr>
@@ -8387,7 +8032,7 @@
           <p:cNvPr id="3" name="Content Placeholder 2">
             <a:extLst>
               <a:ext uri="{FF2B5EF4-FFF2-40B4-BE49-F238E27FC236}">
-                <a16:creationId xmlns:a16="http://schemas.microsoft.com/office/drawing/2014/main" xmlns="" id="{7A0F78E1-C11D-4E96-822F-3F2B93E21380}"/>
+                <a16:creationId xmlns="" xmlns:a16="http://schemas.microsoft.com/office/drawing/2014/main" id="{7A0F78E1-C11D-4E96-822F-3F2B93E21380}"/>
               </a:ext>
             </a:extLst>
           </p:cNvPr>
@@ -8468,38 +8113,10 @@
       </p:sp>
       <p:sp>
         <p:nvSpPr>
-          <p:cNvPr id="4" name="Footer Placeholder 3">
-            <a:extLst>
-              <a:ext uri="{FF2B5EF4-FFF2-40B4-BE49-F238E27FC236}">
-                <a16:creationId xmlns:a16="http://schemas.microsoft.com/office/drawing/2014/main" xmlns="" id="{96E074D6-500A-44ED-8DE3-D221643B0AD0}"/>
-              </a:ext>
-            </a:extLst>
-          </p:cNvPr>
-          <p:cNvSpPr>
-            <a:spLocks noGrp="1"/>
-          </p:cNvSpPr>
-          <p:nvPr>
-            <p:ph type="ftr" sz="quarter" idx="11"/>
-          </p:nvPr>
-        </p:nvSpPr>
-        <p:spPr/>
-        <p:txBody>
-          <a:bodyPr/>
-          <a:lstStyle/>
-          <a:p>
-            <a:r>
-              <a:rPr lang="en-IN"/>
-              <a:t>LTI</a:t>
-            </a:r>
-          </a:p>
-        </p:txBody>
-      </p:sp>
-      <p:sp>
-        <p:nvSpPr>
           <p:cNvPr id="5" name="Slide Number Placeholder 4">
             <a:extLst>
               <a:ext uri="{FF2B5EF4-FFF2-40B4-BE49-F238E27FC236}">
-                <a16:creationId xmlns:a16="http://schemas.microsoft.com/office/drawing/2014/main" xmlns="" id="{ECDF238A-F6B6-462F-9DE9-FF0DDDB163A7}"/>
+                <a16:creationId xmlns="" xmlns:a16="http://schemas.microsoft.com/office/drawing/2014/main" id="{ECDF238A-F6B6-462F-9DE9-FF0DDDB163A7}"/>
               </a:ext>
             </a:extLst>
           </p:cNvPr>
@@ -8528,7 +8145,7 @@
           <p:cNvPr id="6" name="Table 6">
             <a:extLst>
               <a:ext uri="{FF2B5EF4-FFF2-40B4-BE49-F238E27FC236}">
-                <a16:creationId xmlns:a16="http://schemas.microsoft.com/office/drawing/2014/main" xmlns="" id="{82688749-824C-4D7B-8316-FB14E32CB07A}"/>
+                <a16:creationId xmlns="" xmlns:a16="http://schemas.microsoft.com/office/drawing/2014/main" id="{82688749-824C-4D7B-8316-FB14E32CB07A}"/>
               </a:ext>
             </a:extLst>
           </p:cNvPr>
@@ -8557,28 +8174,28 @@
                 <a:gridCol w="2032000">
                   <a:extLst>
                     <a:ext uri="{9D8B030D-6E8A-4147-A177-3AD203B41FA5}">
-                      <a16:colId xmlns:a16="http://schemas.microsoft.com/office/drawing/2014/main" xmlns="" val="4204760950"/>
+                      <a16:colId xmlns="" xmlns:a16="http://schemas.microsoft.com/office/drawing/2014/main" val="4204760950"/>
                     </a:ext>
                   </a:extLst>
                 </a:gridCol>
                 <a:gridCol w="2032000">
                   <a:extLst>
                     <a:ext uri="{9D8B030D-6E8A-4147-A177-3AD203B41FA5}">
-                      <a16:colId xmlns:a16="http://schemas.microsoft.com/office/drawing/2014/main" xmlns="" val="1015379676"/>
+                      <a16:colId xmlns="" xmlns:a16="http://schemas.microsoft.com/office/drawing/2014/main" val="1015379676"/>
                     </a:ext>
                   </a:extLst>
                 </a:gridCol>
                 <a:gridCol w="2032000">
                   <a:extLst>
                     <a:ext uri="{9D8B030D-6E8A-4147-A177-3AD203B41FA5}">
-                      <a16:colId xmlns:a16="http://schemas.microsoft.com/office/drawing/2014/main" xmlns="" val="3739684155"/>
+                      <a16:colId xmlns="" xmlns:a16="http://schemas.microsoft.com/office/drawing/2014/main" val="3739684155"/>
                     </a:ext>
                   </a:extLst>
                 </a:gridCol>
                 <a:gridCol w="2032000">
                   <a:extLst>
                     <a:ext uri="{9D8B030D-6E8A-4147-A177-3AD203B41FA5}">
-                      <a16:colId xmlns:a16="http://schemas.microsoft.com/office/drawing/2014/main" xmlns="" val="3859826423"/>
+                      <a16:colId xmlns="" xmlns:a16="http://schemas.microsoft.com/office/drawing/2014/main" val="3859826423"/>
                     </a:ext>
                   </a:extLst>
                 </a:gridCol>
@@ -8650,7 +8267,7 @@
                 </a:tc>
                 <a:extLst>
                   <a:ext uri="{0D108BD9-81ED-4DB2-BD59-A6C34878D82A}">
-                    <a16:rowId xmlns:a16="http://schemas.microsoft.com/office/drawing/2014/main" xmlns="" val="1072673672"/>
+                    <a16:rowId xmlns="" xmlns:a16="http://schemas.microsoft.com/office/drawing/2014/main" val="1072673672"/>
                   </a:ext>
                 </a:extLst>
               </a:tr>
@@ -8721,7 +8338,7 @@
                 </a:tc>
                 <a:extLst>
                   <a:ext uri="{0D108BD9-81ED-4DB2-BD59-A6C34878D82A}">
-                    <a16:rowId xmlns:a16="http://schemas.microsoft.com/office/drawing/2014/main" xmlns="" val="1998969211"/>
+                    <a16:rowId xmlns="" xmlns:a16="http://schemas.microsoft.com/office/drawing/2014/main" val="1998969211"/>
                   </a:ext>
                 </a:extLst>
               </a:tr>
@@ -8792,7 +8409,7 @@
                 </a:tc>
                 <a:extLst>
                   <a:ext uri="{0D108BD9-81ED-4DB2-BD59-A6C34878D82A}">
-                    <a16:rowId xmlns:a16="http://schemas.microsoft.com/office/drawing/2014/main" xmlns="" val="2255061967"/>
+                    <a16:rowId xmlns="" xmlns:a16="http://schemas.microsoft.com/office/drawing/2014/main" val="2255061967"/>
                   </a:ext>
                 </a:extLst>
               </a:tr>
@@ -8863,7 +8480,7 @@
                 </a:tc>
                 <a:extLst>
                   <a:ext uri="{0D108BD9-81ED-4DB2-BD59-A6C34878D82A}">
-                    <a16:rowId xmlns:a16="http://schemas.microsoft.com/office/drawing/2014/main" xmlns="" val="1899943072"/>
+                    <a16:rowId xmlns="" xmlns:a16="http://schemas.microsoft.com/office/drawing/2014/main" val="1899943072"/>
                   </a:ext>
                 </a:extLst>
               </a:tr>
@@ -8934,7 +8551,7 @@
                 </a:tc>
                 <a:extLst>
                   <a:ext uri="{0D108BD9-81ED-4DB2-BD59-A6C34878D82A}">
-                    <a16:rowId xmlns:a16="http://schemas.microsoft.com/office/drawing/2014/main" xmlns="" val="153649044"/>
+                    <a16:rowId xmlns="" xmlns:a16="http://schemas.microsoft.com/office/drawing/2014/main" val="153649044"/>
                   </a:ext>
                 </a:extLst>
               </a:tr>
@@ -9005,7 +8622,7 @@
                 </a:tc>
                 <a:extLst>
                   <a:ext uri="{0D108BD9-81ED-4DB2-BD59-A6C34878D82A}">
-                    <a16:rowId xmlns:a16="http://schemas.microsoft.com/office/drawing/2014/main" xmlns="" val="1041120302"/>
+                    <a16:rowId xmlns="" xmlns:a16="http://schemas.microsoft.com/office/drawing/2014/main" val="1041120302"/>
                   </a:ext>
                 </a:extLst>
               </a:tr>
@@ -9055,7 +8672,7 @@
           <p:cNvPr id="2" name="Title 1">
             <a:extLst>
               <a:ext uri="{FF2B5EF4-FFF2-40B4-BE49-F238E27FC236}">
-                <a16:creationId xmlns:a16="http://schemas.microsoft.com/office/drawing/2014/main" xmlns="" id="{2E091D72-49B6-4D39-BCBB-E6B6C09B7D02}"/>
+                <a16:creationId xmlns="" xmlns:a16="http://schemas.microsoft.com/office/drawing/2014/main" id="{2E091D72-49B6-4D39-BCBB-E6B6C09B7D02}"/>
               </a:ext>
             </a:extLst>
           </p:cNvPr>
@@ -9090,7 +8707,7 @@
           <p:cNvPr id="3" name="Content Placeholder 2">
             <a:extLst>
               <a:ext uri="{FF2B5EF4-FFF2-40B4-BE49-F238E27FC236}">
-                <a16:creationId xmlns:a16="http://schemas.microsoft.com/office/drawing/2014/main" xmlns="" id="{B3BE4A43-D63B-48DD-AF70-F86C24A4B706}"/>
+                <a16:creationId xmlns="" xmlns:a16="http://schemas.microsoft.com/office/drawing/2014/main" id="{B3BE4A43-D63B-48DD-AF70-F86C24A4B706}"/>
               </a:ext>
             </a:extLst>
           </p:cNvPr>
@@ -9128,38 +8745,10 @@
       </p:sp>
       <p:sp>
         <p:nvSpPr>
-          <p:cNvPr id="4" name="Footer Placeholder 3">
-            <a:extLst>
-              <a:ext uri="{FF2B5EF4-FFF2-40B4-BE49-F238E27FC236}">
-                <a16:creationId xmlns:a16="http://schemas.microsoft.com/office/drawing/2014/main" xmlns="" id="{FFE10244-5DE7-47C5-A026-712DA7677C88}"/>
-              </a:ext>
-            </a:extLst>
-          </p:cNvPr>
-          <p:cNvSpPr>
-            <a:spLocks noGrp="1"/>
-          </p:cNvSpPr>
-          <p:nvPr>
-            <p:ph type="ftr" sz="quarter" idx="11"/>
-          </p:nvPr>
-        </p:nvSpPr>
-        <p:spPr/>
-        <p:txBody>
-          <a:bodyPr/>
-          <a:lstStyle/>
-          <a:p>
-            <a:r>
-              <a:rPr lang="en-IN"/>
-              <a:t>LTI</a:t>
-            </a:r>
-          </a:p>
-        </p:txBody>
-      </p:sp>
-      <p:sp>
-        <p:nvSpPr>
           <p:cNvPr id="5" name="Slide Number Placeholder 4">
             <a:extLst>
               <a:ext uri="{FF2B5EF4-FFF2-40B4-BE49-F238E27FC236}">
-                <a16:creationId xmlns:a16="http://schemas.microsoft.com/office/drawing/2014/main" xmlns="" id="{DBBDF11A-E31A-47B7-AE83-6664657C9C4D}"/>
+                <a16:creationId xmlns="" xmlns:a16="http://schemas.microsoft.com/office/drawing/2014/main" id="{DBBDF11A-E31A-47B7-AE83-6664657C9C4D}"/>
               </a:ext>
             </a:extLst>
           </p:cNvPr>
@@ -9188,7 +8777,7 @@
           <p:cNvPr id="6" name="Picture 5">
             <a:extLst>
               <a:ext uri="{FF2B5EF4-FFF2-40B4-BE49-F238E27FC236}">
-                <a16:creationId xmlns:a16="http://schemas.microsoft.com/office/drawing/2014/main" xmlns="" id="{02128FC5-7C4D-4D61-B305-B4DC752C737E}"/>
+                <a16:creationId xmlns="" xmlns:a16="http://schemas.microsoft.com/office/drawing/2014/main" id="{02128FC5-7C4D-4D61-B305-B4DC752C737E}"/>
               </a:ext>
             </a:extLst>
           </p:cNvPr>
@@ -9255,7 +8844,7 @@
           <p:cNvPr id="2" name="Title 1">
             <a:extLst>
               <a:ext uri="{FF2B5EF4-FFF2-40B4-BE49-F238E27FC236}">
-                <a16:creationId xmlns:a16="http://schemas.microsoft.com/office/drawing/2014/main" xmlns="" id="{204073CA-02A0-4452-B64B-1216F3C4B544}"/>
+                <a16:creationId xmlns="" xmlns:a16="http://schemas.microsoft.com/office/drawing/2014/main" id="{204073CA-02A0-4452-B64B-1216F3C4B544}"/>
               </a:ext>
             </a:extLst>
           </p:cNvPr>
@@ -9283,7 +8872,7 @@
           <p:cNvPr id="3" name="Content Placeholder 2">
             <a:extLst>
               <a:ext uri="{FF2B5EF4-FFF2-40B4-BE49-F238E27FC236}">
-                <a16:creationId xmlns:a16="http://schemas.microsoft.com/office/drawing/2014/main" xmlns="" id="{CFF5027E-2A4C-4DEF-B6ED-65567BAC1619}"/>
+                <a16:creationId xmlns="" xmlns:a16="http://schemas.microsoft.com/office/drawing/2014/main" id="{CFF5027E-2A4C-4DEF-B6ED-65567BAC1619}"/>
               </a:ext>
             </a:extLst>
           </p:cNvPr>
@@ -9311,38 +8900,10 @@
       </p:sp>
       <p:sp>
         <p:nvSpPr>
-          <p:cNvPr id="4" name="Footer Placeholder 3">
-            <a:extLst>
-              <a:ext uri="{FF2B5EF4-FFF2-40B4-BE49-F238E27FC236}">
-                <a16:creationId xmlns:a16="http://schemas.microsoft.com/office/drawing/2014/main" xmlns="" id="{C2E596C1-2169-413E-9E72-7D28713B4A5A}"/>
-              </a:ext>
-            </a:extLst>
-          </p:cNvPr>
-          <p:cNvSpPr>
-            <a:spLocks noGrp="1"/>
-          </p:cNvSpPr>
-          <p:nvPr>
-            <p:ph type="ftr" sz="quarter" idx="11"/>
-          </p:nvPr>
-        </p:nvSpPr>
-        <p:spPr/>
-        <p:txBody>
-          <a:bodyPr/>
-          <a:lstStyle/>
-          <a:p>
-            <a:r>
-              <a:rPr lang="en-IN"/>
-              <a:t>LTI</a:t>
-            </a:r>
-          </a:p>
-        </p:txBody>
-      </p:sp>
-      <p:sp>
-        <p:nvSpPr>
           <p:cNvPr id="5" name="Slide Number Placeholder 4">
             <a:extLst>
               <a:ext uri="{FF2B5EF4-FFF2-40B4-BE49-F238E27FC236}">
-                <a16:creationId xmlns:a16="http://schemas.microsoft.com/office/drawing/2014/main" xmlns="" id="{F4EAA8BF-0FBB-41AD-8D7D-DC30D0B18064}"/>
+                <a16:creationId xmlns="" xmlns:a16="http://schemas.microsoft.com/office/drawing/2014/main" id="{F4EAA8BF-0FBB-41AD-8D7D-DC30D0B18064}"/>
               </a:ext>
             </a:extLst>
           </p:cNvPr>
@@ -9371,7 +8932,7 @@
           <p:cNvPr id="8" name="Table 8">
             <a:extLst>
               <a:ext uri="{FF2B5EF4-FFF2-40B4-BE49-F238E27FC236}">
-                <a16:creationId xmlns:a16="http://schemas.microsoft.com/office/drawing/2014/main" xmlns="" id="{047A66A3-F47F-431E-A784-A4DABCA03C72}"/>
+                <a16:creationId xmlns="" xmlns:a16="http://schemas.microsoft.com/office/drawing/2014/main" id="{047A66A3-F47F-431E-A784-A4DABCA03C72}"/>
               </a:ext>
             </a:extLst>
           </p:cNvPr>
@@ -9400,49 +8961,49 @@
                 <a:gridCol w="1035050">
                   <a:extLst>
                     <a:ext uri="{9D8B030D-6E8A-4147-A177-3AD203B41FA5}">
-                      <a16:colId xmlns:a16="http://schemas.microsoft.com/office/drawing/2014/main" xmlns="" val="1116845725"/>
+                      <a16:colId xmlns="" xmlns:a16="http://schemas.microsoft.com/office/drawing/2014/main" val="1116845725"/>
                     </a:ext>
                   </a:extLst>
                 </a:gridCol>
                 <a:gridCol w="1228725">
                   <a:extLst>
                     <a:ext uri="{9D8B030D-6E8A-4147-A177-3AD203B41FA5}">
-                      <a16:colId xmlns:a16="http://schemas.microsoft.com/office/drawing/2014/main" xmlns="" val="358508330"/>
+                      <a16:colId xmlns="" xmlns:a16="http://schemas.microsoft.com/office/drawing/2014/main" val="358508330"/>
                     </a:ext>
                   </a:extLst>
                 </a:gridCol>
                 <a:gridCol w="1571625">
                   <a:extLst>
                     <a:ext uri="{9D8B030D-6E8A-4147-A177-3AD203B41FA5}">
-                      <a16:colId xmlns:a16="http://schemas.microsoft.com/office/drawing/2014/main" xmlns="" val="3124045716"/>
+                      <a16:colId xmlns="" xmlns:a16="http://schemas.microsoft.com/office/drawing/2014/main" val="3124045716"/>
                     </a:ext>
                   </a:extLst>
                 </a:gridCol>
                 <a:gridCol w="1209675">
                   <a:extLst>
                     <a:ext uri="{9D8B030D-6E8A-4147-A177-3AD203B41FA5}">
-                      <a16:colId xmlns:a16="http://schemas.microsoft.com/office/drawing/2014/main" xmlns="" val="2887243055"/>
+                      <a16:colId xmlns="" xmlns:a16="http://schemas.microsoft.com/office/drawing/2014/main" val="2887243055"/>
                     </a:ext>
                   </a:extLst>
                 </a:gridCol>
                 <a:gridCol w="1981200">
                   <a:extLst>
                     <a:ext uri="{9D8B030D-6E8A-4147-A177-3AD203B41FA5}">
-                      <a16:colId xmlns:a16="http://schemas.microsoft.com/office/drawing/2014/main" xmlns="" val="3102722189"/>
+                      <a16:colId xmlns="" xmlns:a16="http://schemas.microsoft.com/office/drawing/2014/main" val="3102722189"/>
                     </a:ext>
                   </a:extLst>
                 </a:gridCol>
                 <a:gridCol w="1400175">
                   <a:extLst>
                     <a:ext uri="{9D8B030D-6E8A-4147-A177-3AD203B41FA5}">
-                      <a16:colId xmlns:a16="http://schemas.microsoft.com/office/drawing/2014/main" xmlns="" val="2191452153"/>
+                      <a16:colId xmlns="" xmlns:a16="http://schemas.microsoft.com/office/drawing/2014/main" val="2191452153"/>
                     </a:ext>
                   </a:extLst>
                 </a:gridCol>
                 <a:gridCol w="2057401">
                   <a:extLst>
                     <a:ext uri="{9D8B030D-6E8A-4147-A177-3AD203B41FA5}">
-                      <a16:colId xmlns:a16="http://schemas.microsoft.com/office/drawing/2014/main" xmlns="" val="368361560"/>
+                      <a16:colId xmlns="" xmlns:a16="http://schemas.microsoft.com/office/drawing/2014/main" val="368361560"/>
                     </a:ext>
                   </a:extLst>
                 </a:gridCol>
@@ -9545,7 +9106,7 @@
                 </a:tc>
                 <a:extLst>
                   <a:ext uri="{0D108BD9-81ED-4DB2-BD59-A6C34878D82A}">
-                    <a16:rowId xmlns:a16="http://schemas.microsoft.com/office/drawing/2014/main" xmlns="" val="954603179"/>
+                    <a16:rowId xmlns="" xmlns:a16="http://schemas.microsoft.com/office/drawing/2014/main" val="954603179"/>
                   </a:ext>
                 </a:extLst>
               </a:tr>
@@ -9649,7 +9210,7 @@
                 </a:tc>
                 <a:extLst>
                   <a:ext uri="{0D108BD9-81ED-4DB2-BD59-A6C34878D82A}">
-                    <a16:rowId xmlns:a16="http://schemas.microsoft.com/office/drawing/2014/main" xmlns="" val="156053692"/>
+                    <a16:rowId xmlns="" xmlns:a16="http://schemas.microsoft.com/office/drawing/2014/main" val="156053692"/>
                   </a:ext>
                 </a:extLst>
               </a:tr>
@@ -9747,7 +9308,7 @@
                 </a:tc>
                 <a:extLst>
                   <a:ext uri="{0D108BD9-81ED-4DB2-BD59-A6C34878D82A}">
-                    <a16:rowId xmlns:a16="http://schemas.microsoft.com/office/drawing/2014/main" xmlns="" val="1669048561"/>
+                    <a16:rowId xmlns="" xmlns:a16="http://schemas.microsoft.com/office/drawing/2014/main" val="1669048561"/>
                   </a:ext>
                 </a:extLst>
               </a:tr>
@@ -9851,7 +9412,7 @@
                 </a:tc>
                 <a:extLst>
                   <a:ext uri="{0D108BD9-81ED-4DB2-BD59-A6C34878D82A}">
-                    <a16:rowId xmlns:a16="http://schemas.microsoft.com/office/drawing/2014/main" xmlns="" val="1557801872"/>
+                    <a16:rowId xmlns="" xmlns:a16="http://schemas.microsoft.com/office/drawing/2014/main" val="1557801872"/>
                   </a:ext>
                 </a:extLst>
               </a:tr>
@@ -9864,7 +9425,7 @@
           <p:cNvPr id="10" name="TextBox 9">
             <a:extLst>
               <a:ext uri="{FF2B5EF4-FFF2-40B4-BE49-F238E27FC236}">
-                <a16:creationId xmlns:a16="http://schemas.microsoft.com/office/drawing/2014/main" xmlns="" id="{5033102E-688F-436B-B64F-537D47E6624A}"/>
+                <a16:creationId xmlns="" xmlns:a16="http://schemas.microsoft.com/office/drawing/2014/main" id="{5033102E-688F-436B-B64F-537D47E6624A}"/>
               </a:ext>
             </a:extLst>
           </p:cNvPr>
@@ -9936,7 +9497,7 @@
           <p:cNvPr id="2" name="Title 1">
             <a:extLst>
               <a:ext uri="{FF2B5EF4-FFF2-40B4-BE49-F238E27FC236}">
-                <a16:creationId xmlns:a16="http://schemas.microsoft.com/office/drawing/2014/main" xmlns="" id="{CDCC2682-4F0B-4FBD-BC33-249B1242818B}"/>
+                <a16:creationId xmlns="" xmlns:a16="http://schemas.microsoft.com/office/drawing/2014/main" id="{CDCC2682-4F0B-4FBD-BC33-249B1242818B}"/>
               </a:ext>
             </a:extLst>
           </p:cNvPr>
@@ -9971,7 +9532,7 @@
           <p:cNvPr id="3" name="Content Placeholder 2">
             <a:extLst>
               <a:ext uri="{FF2B5EF4-FFF2-40B4-BE49-F238E27FC236}">
-                <a16:creationId xmlns:a16="http://schemas.microsoft.com/office/drawing/2014/main" xmlns="" id="{710A37D6-94D1-4B80-8867-C70A626DA648}"/>
+                <a16:creationId xmlns="" xmlns:a16="http://schemas.microsoft.com/office/drawing/2014/main" id="{710A37D6-94D1-4B80-8867-C70A626DA648}"/>
               </a:ext>
             </a:extLst>
           </p:cNvPr>
@@ -10028,38 +9589,10 @@
       </p:sp>
       <p:sp>
         <p:nvSpPr>
-          <p:cNvPr id="4" name="Footer Placeholder 3">
-            <a:extLst>
-              <a:ext uri="{FF2B5EF4-FFF2-40B4-BE49-F238E27FC236}">
-                <a16:creationId xmlns:a16="http://schemas.microsoft.com/office/drawing/2014/main" xmlns="" id="{04D3BDEB-6050-4AA2-ADE7-9CBBBD65A89E}"/>
-              </a:ext>
-            </a:extLst>
-          </p:cNvPr>
-          <p:cNvSpPr>
-            <a:spLocks noGrp="1"/>
-          </p:cNvSpPr>
-          <p:nvPr>
-            <p:ph type="ftr" sz="quarter" idx="11"/>
-          </p:nvPr>
-        </p:nvSpPr>
-        <p:spPr/>
-        <p:txBody>
-          <a:bodyPr/>
-          <a:lstStyle/>
-          <a:p>
-            <a:r>
-              <a:rPr lang="en-IN"/>
-              <a:t>LTI</a:t>
-            </a:r>
-          </a:p>
-        </p:txBody>
-      </p:sp>
-      <p:sp>
-        <p:nvSpPr>
           <p:cNvPr id="5" name="Slide Number Placeholder 4">
             <a:extLst>
               <a:ext uri="{FF2B5EF4-FFF2-40B4-BE49-F238E27FC236}">
-                <a16:creationId xmlns:a16="http://schemas.microsoft.com/office/drawing/2014/main" xmlns="" id="{377F83D2-4729-4594-8EC0-5D3678EA3CA4}"/>
+                <a16:creationId xmlns="" xmlns:a16="http://schemas.microsoft.com/office/drawing/2014/main" id="{377F83D2-4729-4594-8EC0-5D3678EA3CA4}"/>
               </a:ext>
             </a:extLst>
           </p:cNvPr>
@@ -10088,7 +9621,7 @@
           <p:cNvPr id="8" name="Table 8">
             <a:extLst>
               <a:ext uri="{FF2B5EF4-FFF2-40B4-BE49-F238E27FC236}">
-                <a16:creationId xmlns:a16="http://schemas.microsoft.com/office/drawing/2014/main" xmlns="" id="{0E4C1ACD-F01A-4875-988E-92BBB7857BFD}"/>
+                <a16:creationId xmlns="" xmlns:a16="http://schemas.microsoft.com/office/drawing/2014/main" id="{0E4C1ACD-F01A-4875-988E-92BBB7857BFD}"/>
               </a:ext>
             </a:extLst>
           </p:cNvPr>
@@ -10117,56 +9650,56 @@
                 <a:gridCol w="712089">
                   <a:extLst>
                     <a:ext uri="{9D8B030D-6E8A-4147-A177-3AD203B41FA5}">
-                      <a16:colId xmlns:a16="http://schemas.microsoft.com/office/drawing/2014/main" xmlns="" val="3262146725"/>
+                      <a16:colId xmlns="" xmlns:a16="http://schemas.microsoft.com/office/drawing/2014/main" val="3262146725"/>
                     </a:ext>
                   </a:extLst>
                 </a:gridCol>
                 <a:gridCol w="1247775">
                   <a:extLst>
                     <a:ext uri="{9D8B030D-6E8A-4147-A177-3AD203B41FA5}">
-                      <a16:colId xmlns:a16="http://schemas.microsoft.com/office/drawing/2014/main" xmlns="" val="2208200347"/>
+                      <a16:colId xmlns="" xmlns:a16="http://schemas.microsoft.com/office/drawing/2014/main" val="2208200347"/>
                     </a:ext>
                   </a:extLst>
                 </a:gridCol>
                 <a:gridCol w="1524000">
                   <a:extLst>
                     <a:ext uri="{9D8B030D-6E8A-4147-A177-3AD203B41FA5}">
-                      <a16:colId xmlns:a16="http://schemas.microsoft.com/office/drawing/2014/main" xmlns="" val="1164974847"/>
+                      <a16:colId xmlns="" xmlns:a16="http://schemas.microsoft.com/office/drawing/2014/main" val="1164974847"/>
                     </a:ext>
                   </a:extLst>
                 </a:gridCol>
                 <a:gridCol w="1533525">
                   <a:extLst>
                     <a:ext uri="{9D8B030D-6E8A-4147-A177-3AD203B41FA5}">
-                      <a16:colId xmlns:a16="http://schemas.microsoft.com/office/drawing/2014/main" xmlns="" val="3652978739"/>
+                      <a16:colId xmlns="" xmlns:a16="http://schemas.microsoft.com/office/drawing/2014/main" val="3652978739"/>
                     </a:ext>
                   </a:extLst>
                 </a:gridCol>
                 <a:gridCol w="1143000">
                   <a:extLst>
                     <a:ext uri="{9D8B030D-6E8A-4147-A177-3AD203B41FA5}">
-                      <a16:colId xmlns:a16="http://schemas.microsoft.com/office/drawing/2014/main" xmlns="" val="479335682"/>
+                      <a16:colId xmlns="" xmlns:a16="http://schemas.microsoft.com/office/drawing/2014/main" val="479335682"/>
                     </a:ext>
                   </a:extLst>
                 </a:gridCol>
                 <a:gridCol w="1824609">
                   <a:extLst>
                     <a:ext uri="{9D8B030D-6E8A-4147-A177-3AD203B41FA5}">
-                      <a16:colId xmlns:a16="http://schemas.microsoft.com/office/drawing/2014/main" xmlns="" val="3600493616"/>
+                      <a16:colId xmlns="" xmlns:a16="http://schemas.microsoft.com/office/drawing/2014/main" val="3600493616"/>
                     </a:ext>
                   </a:extLst>
                 </a:gridCol>
                 <a:gridCol w="994791">
                   <a:extLst>
                     <a:ext uri="{9D8B030D-6E8A-4147-A177-3AD203B41FA5}">
-                      <a16:colId xmlns:a16="http://schemas.microsoft.com/office/drawing/2014/main" xmlns="" val="1849792911"/>
+                      <a16:colId xmlns="" xmlns:a16="http://schemas.microsoft.com/office/drawing/2014/main" val="1849792911"/>
                     </a:ext>
                   </a:extLst>
                 </a:gridCol>
                 <a:gridCol w="1666875">
                   <a:extLst>
                     <a:ext uri="{9D8B030D-6E8A-4147-A177-3AD203B41FA5}">
-                      <a16:colId xmlns:a16="http://schemas.microsoft.com/office/drawing/2014/main" xmlns="" val="3466772035"/>
+                      <a16:colId xmlns="" xmlns:a16="http://schemas.microsoft.com/office/drawing/2014/main" val="3466772035"/>
                     </a:ext>
                   </a:extLst>
                 </a:gridCol>
@@ -10286,7 +9819,7 @@
                 </a:tc>
                 <a:extLst>
                   <a:ext uri="{0D108BD9-81ED-4DB2-BD59-A6C34878D82A}">
-                    <a16:rowId xmlns:a16="http://schemas.microsoft.com/office/drawing/2014/main" xmlns="" val="2496340709"/>
+                    <a16:rowId xmlns="" xmlns:a16="http://schemas.microsoft.com/office/drawing/2014/main" val="2496340709"/>
                   </a:ext>
                 </a:extLst>
               </a:tr>
@@ -10417,7 +9950,7 @@
                 </a:tc>
                 <a:extLst>
                   <a:ext uri="{0D108BD9-81ED-4DB2-BD59-A6C34878D82A}">
-                    <a16:rowId xmlns:a16="http://schemas.microsoft.com/office/drawing/2014/main" xmlns="" val="455309519"/>
+                    <a16:rowId xmlns="" xmlns:a16="http://schemas.microsoft.com/office/drawing/2014/main" val="455309519"/>
                   </a:ext>
                 </a:extLst>
               </a:tr>
@@ -10548,7 +10081,7 @@
                 </a:tc>
                 <a:extLst>
                   <a:ext uri="{0D108BD9-81ED-4DB2-BD59-A6C34878D82A}">
-                    <a16:rowId xmlns:a16="http://schemas.microsoft.com/office/drawing/2014/main" xmlns="" val="339722082"/>
+                    <a16:rowId xmlns="" xmlns:a16="http://schemas.microsoft.com/office/drawing/2014/main" val="339722082"/>
                   </a:ext>
                 </a:extLst>
               </a:tr>
@@ -10679,7 +10212,7 @@
                 </a:tc>
                 <a:extLst>
                   <a:ext uri="{0D108BD9-81ED-4DB2-BD59-A6C34878D82A}">
-                    <a16:rowId xmlns:a16="http://schemas.microsoft.com/office/drawing/2014/main" xmlns="" val="1971044218"/>
+                    <a16:rowId xmlns="" xmlns:a16="http://schemas.microsoft.com/office/drawing/2014/main" val="1971044218"/>
                   </a:ext>
                 </a:extLst>
               </a:tr>
@@ -10692,7 +10225,7 @@
           <p:cNvPr id="12" name="TextBox 11">
             <a:extLst>
               <a:ext uri="{FF2B5EF4-FFF2-40B4-BE49-F238E27FC236}">
-                <a16:creationId xmlns:a16="http://schemas.microsoft.com/office/drawing/2014/main" xmlns="" id="{929820AA-ECF6-42FC-B348-4E3D0FB323F7}"/>
+                <a16:creationId xmlns="" xmlns:a16="http://schemas.microsoft.com/office/drawing/2014/main" id="{929820AA-ECF6-42FC-B348-4E3D0FB323F7}"/>
               </a:ext>
             </a:extLst>
           </p:cNvPr>
@@ -10840,7 +10373,7 @@
           <p:cNvPr id="2" name="Title 1">
             <a:extLst>
               <a:ext uri="{FF2B5EF4-FFF2-40B4-BE49-F238E27FC236}">
-                <a16:creationId xmlns:a16="http://schemas.microsoft.com/office/drawing/2014/main" xmlns="" id="{D6F6D18E-1A3A-4B23-A524-5AB9303CAE7C}"/>
+                <a16:creationId xmlns="" xmlns:a16="http://schemas.microsoft.com/office/drawing/2014/main" id="{D6F6D18E-1A3A-4B23-A524-5AB9303CAE7C}"/>
               </a:ext>
             </a:extLst>
           </p:cNvPr>
@@ -10875,7 +10408,7 @@
           <p:cNvPr id="3" name="Content Placeholder 2">
             <a:extLst>
               <a:ext uri="{FF2B5EF4-FFF2-40B4-BE49-F238E27FC236}">
-                <a16:creationId xmlns:a16="http://schemas.microsoft.com/office/drawing/2014/main" xmlns="" id="{2666F709-C9BC-45ED-BDB8-DAB5BA69FB30}"/>
+                <a16:creationId xmlns="" xmlns:a16="http://schemas.microsoft.com/office/drawing/2014/main" id="{2666F709-C9BC-45ED-BDB8-DAB5BA69FB30}"/>
               </a:ext>
             </a:extLst>
           </p:cNvPr>
@@ -10934,38 +10467,10 @@
       </p:sp>
       <p:sp>
         <p:nvSpPr>
-          <p:cNvPr id="4" name="Footer Placeholder 3">
-            <a:extLst>
-              <a:ext uri="{FF2B5EF4-FFF2-40B4-BE49-F238E27FC236}">
-                <a16:creationId xmlns:a16="http://schemas.microsoft.com/office/drawing/2014/main" xmlns="" id="{36E5CC7B-EAD5-4FC4-99C6-D7FB7D284E5F}"/>
-              </a:ext>
-            </a:extLst>
-          </p:cNvPr>
-          <p:cNvSpPr>
-            <a:spLocks noGrp="1"/>
-          </p:cNvSpPr>
-          <p:nvPr>
-            <p:ph type="ftr" sz="quarter" idx="11"/>
-          </p:nvPr>
-        </p:nvSpPr>
-        <p:spPr/>
-        <p:txBody>
-          <a:bodyPr/>
-          <a:lstStyle/>
-          <a:p>
-            <a:r>
-              <a:rPr lang="en-IN"/>
-              <a:t>LTI</a:t>
-            </a:r>
-          </a:p>
-        </p:txBody>
-      </p:sp>
-      <p:sp>
-        <p:nvSpPr>
           <p:cNvPr id="5" name="Slide Number Placeholder 4">
             <a:extLst>
               <a:ext uri="{FF2B5EF4-FFF2-40B4-BE49-F238E27FC236}">
-                <a16:creationId xmlns:a16="http://schemas.microsoft.com/office/drawing/2014/main" xmlns="" id="{A2F5670D-E0F2-4602-BD29-E08F9BEC7A57}"/>
+                <a16:creationId xmlns="" xmlns:a16="http://schemas.microsoft.com/office/drawing/2014/main" id="{A2F5670D-E0F2-4602-BD29-E08F9BEC7A57}"/>
               </a:ext>
             </a:extLst>
           </p:cNvPr>
@@ -10994,7 +10499,7 @@
           <p:cNvPr id="6" name="Table 6">
             <a:extLst>
               <a:ext uri="{FF2B5EF4-FFF2-40B4-BE49-F238E27FC236}">
-                <a16:creationId xmlns:a16="http://schemas.microsoft.com/office/drawing/2014/main" xmlns="" id="{94A0744C-BE5B-45D6-9ECC-45512E68043C}"/>
+                <a16:creationId xmlns="" xmlns:a16="http://schemas.microsoft.com/office/drawing/2014/main" id="{94A0744C-BE5B-45D6-9ECC-45512E68043C}"/>
               </a:ext>
             </a:extLst>
           </p:cNvPr>
@@ -11023,42 +10528,42 @@
                 <a:gridCol w="680262">
                   <a:extLst>
                     <a:ext uri="{9D8B030D-6E8A-4147-A177-3AD203B41FA5}">
-                      <a16:colId xmlns:a16="http://schemas.microsoft.com/office/drawing/2014/main" xmlns="" val="841042480"/>
+                      <a16:colId xmlns="" xmlns:a16="http://schemas.microsoft.com/office/drawing/2014/main" val="841042480"/>
                     </a:ext>
                   </a:extLst>
                 </a:gridCol>
                 <a:gridCol w="956044">
                   <a:extLst>
                     <a:ext uri="{9D8B030D-6E8A-4147-A177-3AD203B41FA5}">
-                      <a16:colId xmlns:a16="http://schemas.microsoft.com/office/drawing/2014/main" xmlns="" val="2574030877"/>
+                      <a16:colId xmlns="" xmlns:a16="http://schemas.microsoft.com/office/drawing/2014/main" val="2574030877"/>
                     </a:ext>
                   </a:extLst>
                 </a:gridCol>
                 <a:gridCol w="1581150">
                   <a:extLst>
                     <a:ext uri="{9D8B030D-6E8A-4147-A177-3AD203B41FA5}">
-                      <a16:colId xmlns:a16="http://schemas.microsoft.com/office/drawing/2014/main" xmlns="" val="2808264447"/>
+                      <a16:colId xmlns="" xmlns:a16="http://schemas.microsoft.com/office/drawing/2014/main" val="2808264447"/>
                     </a:ext>
                   </a:extLst>
                 </a:gridCol>
                 <a:gridCol w="1489222">
                   <a:extLst>
                     <a:ext uri="{9D8B030D-6E8A-4147-A177-3AD203B41FA5}">
-                      <a16:colId xmlns:a16="http://schemas.microsoft.com/office/drawing/2014/main" xmlns="" val="4117513985"/>
+                      <a16:colId xmlns="" xmlns:a16="http://schemas.microsoft.com/office/drawing/2014/main" val="4117513985"/>
                     </a:ext>
                   </a:extLst>
                 </a:gridCol>
                 <a:gridCol w="937659">
                   <a:extLst>
                     <a:ext uri="{9D8B030D-6E8A-4147-A177-3AD203B41FA5}">
-                      <a16:colId xmlns:a16="http://schemas.microsoft.com/office/drawing/2014/main" xmlns="" val="887397525"/>
+                      <a16:colId xmlns="" xmlns:a16="http://schemas.microsoft.com/office/drawing/2014/main" val="887397525"/>
                     </a:ext>
                   </a:extLst>
                 </a:gridCol>
                 <a:gridCol w="1089838">
                   <a:extLst>
                     <a:ext uri="{9D8B030D-6E8A-4147-A177-3AD203B41FA5}">
-                      <a16:colId xmlns:a16="http://schemas.microsoft.com/office/drawing/2014/main" xmlns="" val="1341410831"/>
+                      <a16:colId xmlns="" xmlns:a16="http://schemas.microsoft.com/office/drawing/2014/main" val="1341410831"/>
                     </a:ext>
                   </a:extLst>
                 </a:gridCol>
@@ -11150,7 +10655,7 @@
                 </a:tc>
                 <a:extLst>
                   <a:ext uri="{0D108BD9-81ED-4DB2-BD59-A6C34878D82A}">
-                    <a16:rowId xmlns:a16="http://schemas.microsoft.com/office/drawing/2014/main" xmlns="" val="77058110"/>
+                    <a16:rowId xmlns="" xmlns:a16="http://schemas.microsoft.com/office/drawing/2014/main" val="77058110"/>
                   </a:ext>
                 </a:extLst>
               </a:tr>
@@ -11252,7 +10757,7 @@
                 </a:tc>
                 <a:extLst>
                   <a:ext uri="{0D108BD9-81ED-4DB2-BD59-A6C34878D82A}">
-                    <a16:rowId xmlns:a16="http://schemas.microsoft.com/office/drawing/2014/main" xmlns="" val="1743333105"/>
+                    <a16:rowId xmlns="" xmlns:a16="http://schemas.microsoft.com/office/drawing/2014/main" val="1743333105"/>
                   </a:ext>
                 </a:extLst>
               </a:tr>
@@ -11354,7 +10859,7 @@
                 </a:tc>
                 <a:extLst>
                   <a:ext uri="{0D108BD9-81ED-4DB2-BD59-A6C34878D82A}">
-                    <a16:rowId xmlns:a16="http://schemas.microsoft.com/office/drawing/2014/main" xmlns="" val="3581533921"/>
+                    <a16:rowId xmlns="" xmlns:a16="http://schemas.microsoft.com/office/drawing/2014/main" val="3581533921"/>
                   </a:ext>
                 </a:extLst>
               </a:tr>
@@ -11456,7 +10961,7 @@
                 </a:tc>
                 <a:extLst>
                   <a:ext uri="{0D108BD9-81ED-4DB2-BD59-A6C34878D82A}">
-                    <a16:rowId xmlns:a16="http://schemas.microsoft.com/office/drawing/2014/main" xmlns="" val="1689500882"/>
+                    <a16:rowId xmlns="" xmlns:a16="http://schemas.microsoft.com/office/drawing/2014/main" val="1689500882"/>
                   </a:ext>
                 </a:extLst>
               </a:tr>
@@ -11469,7 +10974,7 @@
           <p:cNvPr id="8" name="TextBox 7">
             <a:extLst>
               <a:ext uri="{FF2B5EF4-FFF2-40B4-BE49-F238E27FC236}">
-                <a16:creationId xmlns:a16="http://schemas.microsoft.com/office/drawing/2014/main" xmlns="" id="{2A3D0DC0-52AC-4C57-B3FF-44761A4184DE}"/>
+                <a16:creationId xmlns="" xmlns:a16="http://schemas.microsoft.com/office/drawing/2014/main" id="{2A3D0DC0-52AC-4C57-B3FF-44761A4184DE}"/>
               </a:ext>
             </a:extLst>
           </p:cNvPr>
@@ -11504,7 +11009,7 @@
           <p:cNvPr id="9" name="Table 9">
             <a:extLst>
               <a:ext uri="{FF2B5EF4-FFF2-40B4-BE49-F238E27FC236}">
-                <a16:creationId xmlns:a16="http://schemas.microsoft.com/office/drawing/2014/main" xmlns="" id="{F3FB6803-F537-4C7F-97BB-365F268FD01E}"/>
+                <a16:creationId xmlns="" xmlns:a16="http://schemas.microsoft.com/office/drawing/2014/main" id="{F3FB6803-F537-4C7F-97BB-365F268FD01E}"/>
               </a:ext>
             </a:extLst>
           </p:cNvPr>
@@ -11533,14 +11038,14 @@
                 <a:gridCol w="1110511">
                   <a:extLst>
                     <a:ext uri="{9D8B030D-6E8A-4147-A177-3AD203B41FA5}">
-                      <a16:colId xmlns:a16="http://schemas.microsoft.com/office/drawing/2014/main" xmlns="" val="893760345"/>
+                      <a16:colId xmlns="" xmlns:a16="http://schemas.microsoft.com/office/drawing/2014/main" val="893760345"/>
                     </a:ext>
                   </a:extLst>
                 </a:gridCol>
                 <a:gridCol w="1632689">
                   <a:extLst>
                     <a:ext uri="{9D8B030D-6E8A-4147-A177-3AD203B41FA5}">
-                      <a16:colId xmlns:a16="http://schemas.microsoft.com/office/drawing/2014/main" xmlns="" val="1704441690"/>
+                      <a16:colId xmlns="" xmlns:a16="http://schemas.microsoft.com/office/drawing/2014/main" val="1704441690"/>
                     </a:ext>
                   </a:extLst>
                 </a:gridCol>
@@ -11576,7 +11081,7 @@
                 </a:tc>
                 <a:extLst>
                   <a:ext uri="{0D108BD9-81ED-4DB2-BD59-A6C34878D82A}">
-                    <a16:rowId xmlns:a16="http://schemas.microsoft.com/office/drawing/2014/main" xmlns="" val="2471028146"/>
+                    <a16:rowId xmlns="" xmlns:a16="http://schemas.microsoft.com/office/drawing/2014/main" val="2471028146"/>
                   </a:ext>
                 </a:extLst>
               </a:tr>
@@ -11609,7 +11114,7 @@
                 </a:tc>
                 <a:extLst>
                   <a:ext uri="{0D108BD9-81ED-4DB2-BD59-A6C34878D82A}">
-                    <a16:rowId xmlns:a16="http://schemas.microsoft.com/office/drawing/2014/main" xmlns="" val="3395352835"/>
+                    <a16:rowId xmlns="" xmlns:a16="http://schemas.microsoft.com/office/drawing/2014/main" val="3395352835"/>
                   </a:ext>
                 </a:extLst>
               </a:tr>
@@ -11642,7 +11147,7 @@
                 </a:tc>
                 <a:extLst>
                   <a:ext uri="{0D108BD9-81ED-4DB2-BD59-A6C34878D82A}">
-                    <a16:rowId xmlns:a16="http://schemas.microsoft.com/office/drawing/2014/main" xmlns="" val="225341226"/>
+                    <a16:rowId xmlns="" xmlns:a16="http://schemas.microsoft.com/office/drawing/2014/main" val="225341226"/>
                   </a:ext>
                 </a:extLst>
               </a:tr>
@@ -11675,7 +11180,7 @@
                 </a:tc>
                 <a:extLst>
                   <a:ext uri="{0D108BD9-81ED-4DB2-BD59-A6C34878D82A}">
-                    <a16:rowId xmlns:a16="http://schemas.microsoft.com/office/drawing/2014/main" xmlns="" val="2480324669"/>
+                    <a16:rowId xmlns="" xmlns:a16="http://schemas.microsoft.com/office/drawing/2014/main" val="2480324669"/>
                   </a:ext>
                 </a:extLst>
               </a:tr>
@@ -11688,7 +11193,7 @@
           <p:cNvPr id="11" name="TextBox 10">
             <a:extLst>
               <a:ext uri="{FF2B5EF4-FFF2-40B4-BE49-F238E27FC236}">
-                <a16:creationId xmlns:a16="http://schemas.microsoft.com/office/drawing/2014/main" xmlns="" id="{2B65A918-2C03-492C-843F-FB3BEDD3BF4A}"/>
+                <a16:creationId xmlns="" xmlns:a16="http://schemas.microsoft.com/office/drawing/2014/main" id="{2B65A918-2C03-492C-843F-FB3BEDD3BF4A}"/>
               </a:ext>
             </a:extLst>
           </p:cNvPr>
@@ -11723,7 +11228,7 @@
           <p:cNvPr id="13" name="Table 12">
             <a:extLst>
               <a:ext uri="{FF2B5EF4-FFF2-40B4-BE49-F238E27FC236}">
-                <a16:creationId xmlns:a16="http://schemas.microsoft.com/office/drawing/2014/main" xmlns="" id="{2D0EB0BF-CAF0-45C9-A95A-E693E086DE5D}"/>
+                <a16:creationId xmlns="" xmlns:a16="http://schemas.microsoft.com/office/drawing/2014/main" id="{2D0EB0BF-CAF0-45C9-A95A-E693E086DE5D}"/>
               </a:ext>
             </a:extLst>
           </p:cNvPr>
@@ -11752,7 +11257,7 @@
                 <a:gridCol w="1162050">
                   <a:extLst>
                     <a:ext uri="{9D8B030D-6E8A-4147-A177-3AD203B41FA5}">
-                      <a16:colId xmlns:a16="http://schemas.microsoft.com/office/drawing/2014/main" xmlns="" val="27226772"/>
+                      <a16:colId xmlns="" xmlns:a16="http://schemas.microsoft.com/office/drawing/2014/main" val="27226772"/>
                     </a:ext>
                   </a:extLst>
                 </a:gridCol>
@@ -11774,7 +11279,7 @@
                 </a:tc>
                 <a:extLst>
                   <a:ext uri="{0D108BD9-81ED-4DB2-BD59-A6C34878D82A}">
-                    <a16:rowId xmlns:a16="http://schemas.microsoft.com/office/drawing/2014/main" xmlns="" val="1217833171"/>
+                    <a16:rowId xmlns="" xmlns:a16="http://schemas.microsoft.com/office/drawing/2014/main" val="1217833171"/>
                   </a:ext>
                 </a:extLst>
               </a:tr>
@@ -11794,7 +11299,7 @@
                 </a:tc>
                 <a:extLst>
                   <a:ext uri="{0D108BD9-81ED-4DB2-BD59-A6C34878D82A}">
-                    <a16:rowId xmlns:a16="http://schemas.microsoft.com/office/drawing/2014/main" xmlns="" val="2338227765"/>
+                    <a16:rowId xmlns="" xmlns:a16="http://schemas.microsoft.com/office/drawing/2014/main" val="2338227765"/>
                   </a:ext>
                 </a:extLst>
               </a:tr>
@@ -11814,7 +11319,7 @@
                 </a:tc>
                 <a:extLst>
                   <a:ext uri="{0D108BD9-81ED-4DB2-BD59-A6C34878D82A}">
-                    <a16:rowId xmlns:a16="http://schemas.microsoft.com/office/drawing/2014/main" xmlns="" val="3142317106"/>
+                    <a16:rowId xmlns="" xmlns:a16="http://schemas.microsoft.com/office/drawing/2014/main" val="3142317106"/>
                   </a:ext>
                 </a:extLst>
               </a:tr>
@@ -11834,7 +11339,7 @@
                 </a:tc>
                 <a:extLst>
                   <a:ext uri="{0D108BD9-81ED-4DB2-BD59-A6C34878D82A}">
-                    <a16:rowId xmlns:a16="http://schemas.microsoft.com/office/drawing/2014/main" xmlns="" val="745493213"/>
+                    <a16:rowId xmlns="" xmlns:a16="http://schemas.microsoft.com/office/drawing/2014/main" val="745493213"/>
                   </a:ext>
                 </a:extLst>
               </a:tr>
@@ -12112,7 +11617,7 @@
           <p:cNvPr id="2" name="Title 1">
             <a:extLst>
               <a:ext uri="{FF2B5EF4-FFF2-40B4-BE49-F238E27FC236}">
-                <a16:creationId xmlns:a16="http://schemas.microsoft.com/office/drawing/2014/main" xmlns="" id="{B81EE807-F486-4030-802B-E44E99F4D016}"/>
+                <a16:creationId xmlns="" xmlns:a16="http://schemas.microsoft.com/office/drawing/2014/main" id="{B81EE807-F486-4030-802B-E44E99F4D016}"/>
               </a:ext>
             </a:extLst>
           </p:cNvPr>
@@ -12147,7 +11652,7 @@
           <p:cNvPr id="3" name="Content Placeholder 2">
             <a:extLst>
               <a:ext uri="{FF2B5EF4-FFF2-40B4-BE49-F238E27FC236}">
-                <a16:creationId xmlns:a16="http://schemas.microsoft.com/office/drawing/2014/main" xmlns="" id="{BC98F145-89B1-4F15-B443-6863A4DF6925}"/>
+                <a16:creationId xmlns="" xmlns:a16="http://schemas.microsoft.com/office/drawing/2014/main" id="{BC98F145-89B1-4F15-B443-6863A4DF6925}"/>
               </a:ext>
             </a:extLst>
           </p:cNvPr>
@@ -12201,7 +11706,7 @@
           <p:cNvPr id="4" name="Footer Placeholder 3">
             <a:extLst>
               <a:ext uri="{FF2B5EF4-FFF2-40B4-BE49-F238E27FC236}">
-                <a16:creationId xmlns:a16="http://schemas.microsoft.com/office/drawing/2014/main" xmlns="" id="{51C365FA-8263-487B-83D0-8DC716C3E742}"/>
+                <a16:creationId xmlns="" xmlns:a16="http://schemas.microsoft.com/office/drawing/2014/main" id="{51C365FA-8263-487B-83D0-8DC716C3E742}"/>
               </a:ext>
             </a:extLst>
           </p:cNvPr>
@@ -12209,18 +11714,23 @@
             <a:spLocks noGrp="1"/>
           </p:cNvSpPr>
           <p:nvPr>
-            <p:ph type="ftr" sz="quarter" idx="11"/>
+            <p:ph type="ftr" sz="quarter" idx="4294967295"/>
           </p:nvPr>
         </p:nvSpPr>
-        <p:spPr/>
+        <p:spPr>
+          <a:xfrm>
+            <a:off x="1088136" y="6272784"/>
+            <a:ext cx="6327648" cy="365125"/>
+          </a:xfrm>
+          <a:prstGeom prst="rect">
+            <a:avLst/>
+          </a:prstGeom>
+        </p:spPr>
         <p:txBody>
           <a:bodyPr/>
           <a:lstStyle/>
           <a:p>
-            <a:r>
-              <a:rPr lang="en-IN"/>
-              <a:t>LTI</a:t>
-            </a:r>
+            <a:endParaRPr lang="en-IN" dirty="0"/>
           </a:p>
         </p:txBody>
       </p:sp>
@@ -12229,7 +11739,7 @@
           <p:cNvPr id="5" name="Slide Number Placeholder 4">
             <a:extLst>
               <a:ext uri="{FF2B5EF4-FFF2-40B4-BE49-F238E27FC236}">
-                <a16:creationId xmlns:a16="http://schemas.microsoft.com/office/drawing/2014/main" xmlns="" id="{409C92A4-D5BD-4E27-930B-484CEB6C4E51}"/>
+                <a16:creationId xmlns="" xmlns:a16="http://schemas.microsoft.com/office/drawing/2014/main" id="{409C92A4-D5BD-4E27-930B-484CEB6C4E51}"/>
               </a:ext>
             </a:extLst>
           </p:cNvPr>
@@ -12258,7 +11768,7 @@
           <p:cNvPr id="6" name="TextBox 5">
             <a:extLst>
               <a:ext uri="{FF2B5EF4-FFF2-40B4-BE49-F238E27FC236}">
-                <a16:creationId xmlns:a16="http://schemas.microsoft.com/office/drawing/2014/main" xmlns="" id="{93A540B5-1F5D-4E33-AC29-31EA766F1698}"/>
+                <a16:creationId xmlns="" xmlns:a16="http://schemas.microsoft.com/office/drawing/2014/main" id="{93A540B5-1F5D-4E33-AC29-31EA766F1698}"/>
               </a:ext>
             </a:extLst>
           </p:cNvPr>
@@ -12293,7 +11803,7 @@
           <p:cNvPr id="7" name="TextBox 6">
             <a:extLst>
               <a:ext uri="{FF2B5EF4-FFF2-40B4-BE49-F238E27FC236}">
-                <a16:creationId xmlns:a16="http://schemas.microsoft.com/office/drawing/2014/main" xmlns="" id="{9EE0D90F-CD32-4217-B0DE-DC1FED5930D6}"/>
+                <a16:creationId xmlns="" xmlns:a16="http://schemas.microsoft.com/office/drawing/2014/main" id="{9EE0D90F-CD32-4217-B0DE-DC1FED5930D6}"/>
               </a:ext>
             </a:extLst>
           </p:cNvPr>
@@ -12328,7 +11838,7 @@
           <p:cNvPr id="8" name="Table 7">
             <a:extLst>
               <a:ext uri="{FF2B5EF4-FFF2-40B4-BE49-F238E27FC236}">
-                <a16:creationId xmlns:a16="http://schemas.microsoft.com/office/drawing/2014/main" xmlns="" id="{F26F5366-FADF-4060-9CF3-674EA0F61116}"/>
+                <a16:creationId xmlns="" xmlns:a16="http://schemas.microsoft.com/office/drawing/2014/main" id="{F26F5366-FADF-4060-9CF3-674EA0F61116}"/>
               </a:ext>
             </a:extLst>
           </p:cNvPr>
@@ -12357,28 +11867,28 @@
                 <a:gridCol w="680262">
                   <a:extLst>
                     <a:ext uri="{9D8B030D-6E8A-4147-A177-3AD203B41FA5}">
-                      <a16:colId xmlns:a16="http://schemas.microsoft.com/office/drawing/2014/main" xmlns="" val="3078671136"/>
+                      <a16:colId xmlns="" xmlns:a16="http://schemas.microsoft.com/office/drawing/2014/main" val="3078671136"/>
                     </a:ext>
                   </a:extLst>
                 </a:gridCol>
                 <a:gridCol w="956044">
                   <a:extLst>
                     <a:ext uri="{9D8B030D-6E8A-4147-A177-3AD203B41FA5}">
-                      <a16:colId xmlns:a16="http://schemas.microsoft.com/office/drawing/2014/main" xmlns="" val="244839800"/>
+                      <a16:colId xmlns="" xmlns:a16="http://schemas.microsoft.com/office/drawing/2014/main" val="244839800"/>
                     </a:ext>
                   </a:extLst>
                 </a:gridCol>
                 <a:gridCol w="1581150">
                   <a:extLst>
                     <a:ext uri="{9D8B030D-6E8A-4147-A177-3AD203B41FA5}">
-                      <a16:colId xmlns:a16="http://schemas.microsoft.com/office/drawing/2014/main" xmlns="" val="3147350648"/>
+                      <a16:colId xmlns="" xmlns:a16="http://schemas.microsoft.com/office/drawing/2014/main" val="3147350648"/>
                     </a:ext>
                   </a:extLst>
                 </a:gridCol>
                 <a:gridCol w="1489222">
                   <a:extLst>
                     <a:ext uri="{9D8B030D-6E8A-4147-A177-3AD203B41FA5}">
-                      <a16:colId xmlns:a16="http://schemas.microsoft.com/office/drawing/2014/main" xmlns="" val="3950083572"/>
+                      <a16:colId xmlns="" xmlns:a16="http://schemas.microsoft.com/office/drawing/2014/main" val="3950083572"/>
                     </a:ext>
                   </a:extLst>
                 </a:gridCol>
@@ -12438,7 +11948,7 @@
                 </a:tc>
                 <a:extLst>
                   <a:ext uri="{0D108BD9-81ED-4DB2-BD59-A6C34878D82A}">
-                    <a16:rowId xmlns:a16="http://schemas.microsoft.com/office/drawing/2014/main" xmlns="" val="458804008"/>
+                    <a16:rowId xmlns="" xmlns:a16="http://schemas.microsoft.com/office/drawing/2014/main" val="458804008"/>
                   </a:ext>
                 </a:extLst>
               </a:tr>
@@ -12514,7 +12024,7 @@
                 </a:tc>
                 <a:extLst>
                   <a:ext uri="{0D108BD9-81ED-4DB2-BD59-A6C34878D82A}">
-                    <a16:rowId xmlns:a16="http://schemas.microsoft.com/office/drawing/2014/main" xmlns="" val="38760461"/>
+                    <a16:rowId xmlns="" xmlns:a16="http://schemas.microsoft.com/office/drawing/2014/main" val="38760461"/>
                   </a:ext>
                 </a:extLst>
               </a:tr>
@@ -12590,7 +12100,7 @@
                 </a:tc>
                 <a:extLst>
                   <a:ext uri="{0D108BD9-81ED-4DB2-BD59-A6C34878D82A}">
-                    <a16:rowId xmlns:a16="http://schemas.microsoft.com/office/drawing/2014/main" xmlns="" val="3692537047"/>
+                    <a16:rowId xmlns="" xmlns:a16="http://schemas.microsoft.com/office/drawing/2014/main" val="3692537047"/>
                   </a:ext>
                 </a:extLst>
               </a:tr>
@@ -12666,7 +12176,7 @@
                 </a:tc>
                 <a:extLst>
                   <a:ext uri="{0D108BD9-81ED-4DB2-BD59-A6C34878D82A}">
-                    <a16:rowId xmlns:a16="http://schemas.microsoft.com/office/drawing/2014/main" xmlns="" val="1131815966"/>
+                    <a16:rowId xmlns="" xmlns:a16="http://schemas.microsoft.com/office/drawing/2014/main" val="1131815966"/>
                   </a:ext>
                 </a:extLst>
               </a:tr>
@@ -12679,7 +12189,7 @@
           <p:cNvPr id="9" name="Table 8">
             <a:extLst>
               <a:ext uri="{FF2B5EF4-FFF2-40B4-BE49-F238E27FC236}">
-                <a16:creationId xmlns:a16="http://schemas.microsoft.com/office/drawing/2014/main" xmlns="" id="{F90BBFC0-6F78-4B66-88B9-4BB1C3945949}"/>
+                <a16:creationId xmlns="" xmlns:a16="http://schemas.microsoft.com/office/drawing/2014/main" id="{F90BBFC0-6F78-4B66-88B9-4BB1C3945949}"/>
               </a:ext>
             </a:extLst>
           </p:cNvPr>
@@ -12708,7 +12218,7 @@
                 <a:gridCol w="1056766">
                   <a:extLst>
                     <a:ext uri="{9D8B030D-6E8A-4147-A177-3AD203B41FA5}">
-                      <a16:colId xmlns:a16="http://schemas.microsoft.com/office/drawing/2014/main" xmlns="" val="27226772"/>
+                      <a16:colId xmlns="" xmlns:a16="http://schemas.microsoft.com/office/drawing/2014/main" val="27226772"/>
                     </a:ext>
                   </a:extLst>
                 </a:gridCol>
@@ -12730,7 +12240,7 @@
                 </a:tc>
                 <a:extLst>
                   <a:ext uri="{0D108BD9-81ED-4DB2-BD59-A6C34878D82A}">
-                    <a16:rowId xmlns:a16="http://schemas.microsoft.com/office/drawing/2014/main" xmlns="" val="1217833171"/>
+                    <a16:rowId xmlns="" xmlns:a16="http://schemas.microsoft.com/office/drawing/2014/main" val="1217833171"/>
                   </a:ext>
                 </a:extLst>
               </a:tr>
@@ -12750,7 +12260,7 @@
                 </a:tc>
                 <a:extLst>
                   <a:ext uri="{0D108BD9-81ED-4DB2-BD59-A6C34878D82A}">
-                    <a16:rowId xmlns:a16="http://schemas.microsoft.com/office/drawing/2014/main" xmlns="" val="2338227765"/>
+                    <a16:rowId xmlns="" xmlns:a16="http://schemas.microsoft.com/office/drawing/2014/main" val="2338227765"/>
                   </a:ext>
                 </a:extLst>
               </a:tr>
@@ -12770,7 +12280,7 @@
                 </a:tc>
                 <a:extLst>
                   <a:ext uri="{0D108BD9-81ED-4DB2-BD59-A6C34878D82A}">
-                    <a16:rowId xmlns:a16="http://schemas.microsoft.com/office/drawing/2014/main" xmlns="" val="3142317106"/>
+                    <a16:rowId xmlns="" xmlns:a16="http://schemas.microsoft.com/office/drawing/2014/main" val="3142317106"/>
                   </a:ext>
                 </a:extLst>
               </a:tr>
@@ -12790,7 +12300,7 @@
                 </a:tc>
                 <a:extLst>
                   <a:ext uri="{0D108BD9-81ED-4DB2-BD59-A6C34878D82A}">
-                    <a16:rowId xmlns:a16="http://schemas.microsoft.com/office/drawing/2014/main" xmlns="" val="745493213"/>
+                    <a16:rowId xmlns="" xmlns:a16="http://schemas.microsoft.com/office/drawing/2014/main" val="745493213"/>
                   </a:ext>
                 </a:extLst>
               </a:tr>
@@ -12803,7 +12313,7 @@
           <p:cNvPr id="10" name="TextBox 9">
             <a:extLst>
               <a:ext uri="{FF2B5EF4-FFF2-40B4-BE49-F238E27FC236}">
-                <a16:creationId xmlns:a16="http://schemas.microsoft.com/office/drawing/2014/main" xmlns="" id="{3CA01075-6C8C-4C63-BF07-F29D5C7EFF5D}"/>
+                <a16:creationId xmlns="" xmlns:a16="http://schemas.microsoft.com/office/drawing/2014/main" id="{3CA01075-6C8C-4C63-BF07-F29D5C7EFF5D}"/>
               </a:ext>
             </a:extLst>
           </p:cNvPr>
@@ -12843,7 +12353,7 @@
           <p:cNvPr id="11" name="Table 10">
             <a:extLst>
               <a:ext uri="{FF2B5EF4-FFF2-40B4-BE49-F238E27FC236}">
-                <a16:creationId xmlns:a16="http://schemas.microsoft.com/office/drawing/2014/main" xmlns="" id="{523D17F7-53BE-4736-8A17-1C71C92013AC}"/>
+                <a16:creationId xmlns="" xmlns:a16="http://schemas.microsoft.com/office/drawing/2014/main" id="{523D17F7-53BE-4736-8A17-1C71C92013AC}"/>
               </a:ext>
             </a:extLst>
           </p:cNvPr>
@@ -12872,7 +12382,7 @@
                 <a:gridCol w="680262">
                   <a:extLst>
                     <a:ext uri="{9D8B030D-6E8A-4147-A177-3AD203B41FA5}">
-                      <a16:colId xmlns:a16="http://schemas.microsoft.com/office/drawing/2014/main" xmlns="" val="3613294914"/>
+                      <a16:colId xmlns="" xmlns:a16="http://schemas.microsoft.com/office/drawing/2014/main" val="3613294914"/>
                     </a:ext>
                   </a:extLst>
                 </a:gridCol>
@@ -12893,7 +12403,7 @@
                 </a:tc>
                 <a:extLst>
                   <a:ext uri="{0D108BD9-81ED-4DB2-BD59-A6C34878D82A}">
-                    <a16:rowId xmlns:a16="http://schemas.microsoft.com/office/drawing/2014/main" xmlns="" val="1134398805"/>
+                    <a16:rowId xmlns="" xmlns:a16="http://schemas.microsoft.com/office/drawing/2014/main" val="1134398805"/>
                   </a:ext>
                 </a:extLst>
               </a:tr>
@@ -12913,7 +12423,7 @@
                 </a:tc>
                 <a:extLst>
                   <a:ext uri="{0D108BD9-81ED-4DB2-BD59-A6C34878D82A}">
-                    <a16:rowId xmlns:a16="http://schemas.microsoft.com/office/drawing/2014/main" xmlns="" val="2277818748"/>
+                    <a16:rowId xmlns="" xmlns:a16="http://schemas.microsoft.com/office/drawing/2014/main" val="2277818748"/>
                   </a:ext>
                 </a:extLst>
               </a:tr>
@@ -12933,7 +12443,7 @@
                 </a:tc>
                 <a:extLst>
                   <a:ext uri="{0D108BD9-81ED-4DB2-BD59-A6C34878D82A}">
-                    <a16:rowId xmlns:a16="http://schemas.microsoft.com/office/drawing/2014/main" xmlns="" val="470348637"/>
+                    <a16:rowId xmlns="" xmlns:a16="http://schemas.microsoft.com/office/drawing/2014/main" val="470348637"/>
                   </a:ext>
                 </a:extLst>
               </a:tr>
@@ -12953,7 +12463,7 @@
                 </a:tc>
                 <a:extLst>
                   <a:ext uri="{0D108BD9-81ED-4DB2-BD59-A6C34878D82A}">
-                    <a16:rowId xmlns:a16="http://schemas.microsoft.com/office/drawing/2014/main" xmlns="" val="2548377180"/>
+                    <a16:rowId xmlns="" xmlns:a16="http://schemas.microsoft.com/office/drawing/2014/main" val="2548377180"/>
                   </a:ext>
                 </a:extLst>
               </a:tr>
@@ -12966,7 +12476,7 @@
           <p:cNvPr id="12" name="Table 11">
             <a:extLst>
               <a:ext uri="{FF2B5EF4-FFF2-40B4-BE49-F238E27FC236}">
-                <a16:creationId xmlns:a16="http://schemas.microsoft.com/office/drawing/2014/main" xmlns="" id="{96640E25-BE64-4287-A217-1E25FD6A19E7}"/>
+                <a16:creationId xmlns="" xmlns:a16="http://schemas.microsoft.com/office/drawing/2014/main" id="{96640E25-BE64-4287-A217-1E25FD6A19E7}"/>
               </a:ext>
             </a:extLst>
           </p:cNvPr>
@@ -12995,14 +12505,14 @@
                 <a:gridCol w="937659">
                   <a:extLst>
                     <a:ext uri="{9D8B030D-6E8A-4147-A177-3AD203B41FA5}">
-                      <a16:colId xmlns:a16="http://schemas.microsoft.com/office/drawing/2014/main" xmlns="" val="3312699109"/>
+                      <a16:colId xmlns="" xmlns:a16="http://schemas.microsoft.com/office/drawing/2014/main" val="3312699109"/>
                     </a:ext>
                   </a:extLst>
                 </a:gridCol>
                 <a:gridCol w="1089838">
                   <a:extLst>
                     <a:ext uri="{9D8B030D-6E8A-4147-A177-3AD203B41FA5}">
-                      <a16:colId xmlns:a16="http://schemas.microsoft.com/office/drawing/2014/main" xmlns="" val="1283873459"/>
+                      <a16:colId xmlns="" xmlns:a16="http://schemas.microsoft.com/office/drawing/2014/main" val="1283873459"/>
                     </a:ext>
                   </a:extLst>
                 </a:gridCol>
@@ -13042,7 +12552,7 @@
                 </a:tc>
                 <a:extLst>
                   <a:ext uri="{0D108BD9-81ED-4DB2-BD59-A6C34878D82A}">
-                    <a16:rowId xmlns:a16="http://schemas.microsoft.com/office/drawing/2014/main" xmlns="" val="2104964970"/>
+                    <a16:rowId xmlns="" xmlns:a16="http://schemas.microsoft.com/office/drawing/2014/main" val="2104964970"/>
                   </a:ext>
                 </a:extLst>
               </a:tr>
@@ -13075,7 +12585,7 @@
                 </a:tc>
                 <a:extLst>
                   <a:ext uri="{0D108BD9-81ED-4DB2-BD59-A6C34878D82A}">
-                    <a16:rowId xmlns:a16="http://schemas.microsoft.com/office/drawing/2014/main" xmlns="" val="159117469"/>
+                    <a16:rowId xmlns="" xmlns:a16="http://schemas.microsoft.com/office/drawing/2014/main" val="159117469"/>
                   </a:ext>
                 </a:extLst>
               </a:tr>
@@ -13108,7 +12618,7 @@
                 </a:tc>
                 <a:extLst>
                   <a:ext uri="{0D108BD9-81ED-4DB2-BD59-A6C34878D82A}">
-                    <a16:rowId xmlns:a16="http://schemas.microsoft.com/office/drawing/2014/main" xmlns="" val="638107585"/>
+                    <a16:rowId xmlns="" xmlns:a16="http://schemas.microsoft.com/office/drawing/2014/main" val="638107585"/>
                   </a:ext>
                 </a:extLst>
               </a:tr>
@@ -13141,7 +12651,7 @@
                 </a:tc>
                 <a:extLst>
                   <a:ext uri="{0D108BD9-81ED-4DB2-BD59-A6C34878D82A}">
-                    <a16:rowId xmlns:a16="http://schemas.microsoft.com/office/drawing/2014/main" xmlns="" val="716705696"/>
+                    <a16:rowId xmlns="" xmlns:a16="http://schemas.microsoft.com/office/drawing/2014/main" val="716705696"/>
                   </a:ext>
                 </a:extLst>
               </a:tr>
@@ -13464,7 +12974,7 @@
           <p:cNvPr id="2" name="Title 1">
             <a:extLst>
               <a:ext uri="{FF2B5EF4-FFF2-40B4-BE49-F238E27FC236}">
-                <a16:creationId xmlns:a16="http://schemas.microsoft.com/office/drawing/2014/main" xmlns="" id="{72A2B1E2-F8F3-4264-B88E-BF43E2E75B78}"/>
+                <a16:creationId xmlns="" xmlns:a16="http://schemas.microsoft.com/office/drawing/2014/main" id="{72A2B1E2-F8F3-4264-B88E-BF43E2E75B78}"/>
               </a:ext>
             </a:extLst>
           </p:cNvPr>
@@ -13503,7 +13013,7 @@
           <p:cNvPr id="3" name="Subtitle 2">
             <a:extLst>
               <a:ext uri="{FF2B5EF4-FFF2-40B4-BE49-F238E27FC236}">
-                <a16:creationId xmlns:a16="http://schemas.microsoft.com/office/drawing/2014/main" xmlns="" id="{99321703-8F38-418A-BD30-250005D73E73}"/>
+                <a16:creationId xmlns="" xmlns:a16="http://schemas.microsoft.com/office/drawing/2014/main" id="{99321703-8F38-418A-BD30-250005D73E73}"/>
               </a:ext>
             </a:extLst>
           </p:cNvPr>
@@ -13525,46 +13035,10 @@
       </p:sp>
       <p:sp>
         <p:nvSpPr>
-          <p:cNvPr id="4" name="Footer Placeholder 3">
-            <a:extLst>
-              <a:ext uri="{FF2B5EF4-FFF2-40B4-BE49-F238E27FC236}">
-                <a16:creationId xmlns:a16="http://schemas.microsoft.com/office/drawing/2014/main" xmlns="" id="{0720FF1A-2FF3-4792-A23A-7DF7A749C85B}"/>
-              </a:ext>
-            </a:extLst>
-          </p:cNvPr>
-          <p:cNvSpPr>
-            <a:spLocks noGrp="1"/>
-          </p:cNvSpPr>
-          <p:nvPr>
-            <p:ph type="ftr" sz="quarter" idx="4294967295"/>
-          </p:nvPr>
-        </p:nvSpPr>
-        <p:spPr>
-          <a:xfrm>
-            <a:off x="1088136" y="6272784"/>
-            <a:ext cx="6327648" cy="365125"/>
-          </a:xfrm>
-          <a:prstGeom prst="rect">
-            <a:avLst/>
-          </a:prstGeom>
-        </p:spPr>
-        <p:txBody>
-          <a:bodyPr/>
-          <a:lstStyle/>
-          <a:p>
-            <a:r>
-              <a:rPr lang="en-IN"/>
-              <a:t>LTI</a:t>
-            </a:r>
-          </a:p>
-        </p:txBody>
-      </p:sp>
-      <p:sp>
-        <p:nvSpPr>
           <p:cNvPr id="5" name="Slide Number Placeholder 4">
             <a:extLst>
               <a:ext uri="{FF2B5EF4-FFF2-40B4-BE49-F238E27FC236}">
-                <a16:creationId xmlns:a16="http://schemas.microsoft.com/office/drawing/2014/main" xmlns="" id="{794DFD93-0CF4-49A0-B4BD-BF0DAA0636B5}"/>
+                <a16:creationId xmlns="" xmlns:a16="http://schemas.microsoft.com/office/drawing/2014/main" id="{794DFD93-0CF4-49A0-B4BD-BF0DAA0636B5}"/>
               </a:ext>
             </a:extLst>
           </p:cNvPr>
@@ -13630,7 +13104,7 @@
           <p:cNvPr id="2" name="Title 1">
             <a:extLst>
               <a:ext uri="{FF2B5EF4-FFF2-40B4-BE49-F238E27FC236}">
-                <a16:creationId xmlns:a16="http://schemas.microsoft.com/office/drawing/2014/main" xmlns="" id="{B68A0423-F262-4F8F-8A8D-010C38D71257}"/>
+                <a16:creationId xmlns="" xmlns:a16="http://schemas.microsoft.com/office/drawing/2014/main" id="{B68A0423-F262-4F8F-8A8D-010C38D71257}"/>
               </a:ext>
             </a:extLst>
           </p:cNvPr>
@@ -13658,7 +13132,7 @@
           <p:cNvPr id="4" name="Footer Placeholder 3">
             <a:extLst>
               <a:ext uri="{FF2B5EF4-FFF2-40B4-BE49-F238E27FC236}">
-                <a16:creationId xmlns:a16="http://schemas.microsoft.com/office/drawing/2014/main" xmlns="" id="{65ABBBAE-BCCE-486E-A39C-070DBC628D1C}"/>
+                <a16:creationId xmlns="" xmlns:a16="http://schemas.microsoft.com/office/drawing/2014/main" id="{65ABBBAE-BCCE-486E-A39C-070DBC628D1C}"/>
               </a:ext>
             </a:extLst>
           </p:cNvPr>
@@ -13666,18 +13140,23 @@
             <a:spLocks noGrp="1"/>
           </p:cNvSpPr>
           <p:nvPr>
-            <p:ph type="ftr" sz="quarter" idx="11"/>
+            <p:ph type="ftr" sz="quarter" idx="4294967295"/>
           </p:nvPr>
         </p:nvSpPr>
-        <p:spPr/>
+        <p:spPr>
+          <a:xfrm>
+            <a:off x="1088136" y="6272784"/>
+            <a:ext cx="6327648" cy="365125"/>
+          </a:xfrm>
+          <a:prstGeom prst="rect">
+            <a:avLst/>
+          </a:prstGeom>
+        </p:spPr>
         <p:txBody>
           <a:bodyPr/>
           <a:lstStyle/>
           <a:p>
-            <a:r>
-              <a:rPr lang="en-IN"/>
-              <a:t>LTI</a:t>
-            </a:r>
+            <a:endParaRPr lang="en-IN" dirty="0"/>
           </a:p>
         </p:txBody>
       </p:sp>
@@ -13686,7 +13165,7 @@
           <p:cNvPr id="5" name="Slide Number Placeholder 4">
             <a:extLst>
               <a:ext uri="{FF2B5EF4-FFF2-40B4-BE49-F238E27FC236}">
-                <a16:creationId xmlns:a16="http://schemas.microsoft.com/office/drawing/2014/main" xmlns="" id="{83F7C0E0-2D47-43DA-8BED-FE02349241AD}"/>
+                <a16:creationId xmlns="" xmlns:a16="http://schemas.microsoft.com/office/drawing/2014/main" id="{83F7C0E0-2D47-43DA-8BED-FE02349241AD}"/>
               </a:ext>
             </a:extLst>
           </p:cNvPr>
@@ -13715,7 +13194,7 @@
           <p:cNvPr id="7" name="Content Placeholder 6">
             <a:extLst>
               <a:ext uri="{FF2B5EF4-FFF2-40B4-BE49-F238E27FC236}">
-                <a16:creationId xmlns:a16="http://schemas.microsoft.com/office/drawing/2014/main" xmlns="" id="{4FB2CC2D-27F1-45A2-91CD-BB0669200E8F}"/>
+                <a16:creationId xmlns="" xmlns:a16="http://schemas.microsoft.com/office/drawing/2014/main" id="{4FB2CC2D-27F1-45A2-91CD-BB0669200E8F}"/>
               </a:ext>
             </a:extLst>
           </p:cNvPr>
@@ -13740,7 +13219,7 @@
           <p:cNvPr id="8" name="Picture 7">
             <a:extLst>
               <a:ext uri="{FF2B5EF4-FFF2-40B4-BE49-F238E27FC236}">
-                <a16:creationId xmlns:a16="http://schemas.microsoft.com/office/drawing/2014/main" xmlns="" id="{9CDD65A6-0EB3-4033-9F43-9478009F1436}"/>
+                <a16:creationId xmlns="" xmlns:a16="http://schemas.microsoft.com/office/drawing/2014/main" id="{9CDD65A6-0EB3-4033-9F43-9478009F1436}"/>
               </a:ext>
             </a:extLst>
           </p:cNvPr>
@@ -13775,6 +13254,13 @@
   <p:clrMapOvr>
     <a:masterClrMapping/>
   </p:clrMapOvr>
+  <p:timing>
+    <p:tnLst>
+      <p:par>
+        <p:cTn id="1" dur="indefinite" restart="never" nodeType="tmRoot"/>
+      </p:par>
+    </p:tnLst>
+  </p:timing>
 </p:sld>
 </file>
 
@@ -13800,7 +13286,7 @@
           <p:cNvPr id="2" name="Title 1">
             <a:extLst>
               <a:ext uri="{FF2B5EF4-FFF2-40B4-BE49-F238E27FC236}">
-                <a16:creationId xmlns:a16="http://schemas.microsoft.com/office/drawing/2014/main" xmlns="" id="{EDF6CFE5-1A5B-40BC-86A5-8D6519DE57D6}"/>
+                <a16:creationId xmlns="" xmlns:a16="http://schemas.microsoft.com/office/drawing/2014/main" id="{EDF6CFE5-1A5B-40BC-86A5-8D6519DE57D6}"/>
               </a:ext>
             </a:extLst>
           </p:cNvPr>
@@ -13832,7 +13318,7 @@
           <p:cNvPr id="3" name="Content Placeholder 2">
             <a:extLst>
               <a:ext uri="{FF2B5EF4-FFF2-40B4-BE49-F238E27FC236}">
-                <a16:creationId xmlns:a16="http://schemas.microsoft.com/office/drawing/2014/main" xmlns="" id="{5145DCD0-0810-4FCB-BE0A-46AFC61F9790}"/>
+                <a16:creationId xmlns="" xmlns:a16="http://schemas.microsoft.com/office/drawing/2014/main" id="{5145DCD0-0810-4FCB-BE0A-46AFC61F9790}"/>
               </a:ext>
             </a:extLst>
           </p:cNvPr>
@@ -13863,38 +13349,10 @@
       </p:sp>
       <p:sp>
         <p:nvSpPr>
-          <p:cNvPr id="4" name="Footer Placeholder 3">
-            <a:extLst>
-              <a:ext uri="{FF2B5EF4-FFF2-40B4-BE49-F238E27FC236}">
-                <a16:creationId xmlns:a16="http://schemas.microsoft.com/office/drawing/2014/main" xmlns="" id="{AC06CE50-57D0-427E-BB28-2B7BE6D222BC}"/>
-              </a:ext>
-            </a:extLst>
-          </p:cNvPr>
-          <p:cNvSpPr>
-            <a:spLocks noGrp="1"/>
-          </p:cNvSpPr>
-          <p:nvPr>
-            <p:ph type="ftr" sz="quarter" idx="11"/>
-          </p:nvPr>
-        </p:nvSpPr>
-        <p:spPr/>
-        <p:txBody>
-          <a:bodyPr/>
-          <a:lstStyle/>
-          <a:p>
-            <a:r>
-              <a:rPr lang="en-IN"/>
-              <a:t>LTI</a:t>
-            </a:r>
-          </a:p>
-        </p:txBody>
-      </p:sp>
-      <p:sp>
-        <p:nvSpPr>
           <p:cNvPr id="5" name="Slide Number Placeholder 4">
             <a:extLst>
               <a:ext uri="{FF2B5EF4-FFF2-40B4-BE49-F238E27FC236}">
-                <a16:creationId xmlns:a16="http://schemas.microsoft.com/office/drawing/2014/main" xmlns="" id="{A45F55C9-88F9-4AF7-B742-5C2FAF8D3FDF}"/>
+                <a16:creationId xmlns="" xmlns:a16="http://schemas.microsoft.com/office/drawing/2014/main" id="{A45F55C9-88F9-4AF7-B742-5C2FAF8D3FDF}"/>
               </a:ext>
             </a:extLst>
           </p:cNvPr>
@@ -13928,6 +13386,13 @@
   <p:clrMapOvr>
     <a:masterClrMapping/>
   </p:clrMapOvr>
+  <p:timing>
+    <p:tnLst>
+      <p:par>
+        <p:cTn id="1" dur="indefinite" restart="never" nodeType="tmRoot"/>
+      </p:par>
+    </p:tnLst>
+  </p:timing>
 </p:sld>
 </file>
 
@@ -13953,7 +13418,7 @@
           <p:cNvPr id="2" name="Title 1">
             <a:extLst>
               <a:ext uri="{FF2B5EF4-FFF2-40B4-BE49-F238E27FC236}">
-                <a16:creationId xmlns:a16="http://schemas.microsoft.com/office/drawing/2014/main" xmlns="" id="{5A6A7BE6-EA98-439B-9CD3-0463E706EE9F}"/>
+                <a16:creationId xmlns="" xmlns:a16="http://schemas.microsoft.com/office/drawing/2014/main" id="{5A6A7BE6-EA98-439B-9CD3-0463E706EE9F}"/>
               </a:ext>
             </a:extLst>
           </p:cNvPr>
@@ -13985,7 +13450,7 @@
           <p:cNvPr id="3" name="Content Placeholder 2">
             <a:extLst>
               <a:ext uri="{FF2B5EF4-FFF2-40B4-BE49-F238E27FC236}">
-                <a16:creationId xmlns:a16="http://schemas.microsoft.com/office/drawing/2014/main" xmlns="" id="{BFEE5655-B1EA-4F0A-9531-8105C465110B}"/>
+                <a16:creationId xmlns="" xmlns:a16="http://schemas.microsoft.com/office/drawing/2014/main" id="{BFEE5655-B1EA-4F0A-9531-8105C465110B}"/>
               </a:ext>
             </a:extLst>
           </p:cNvPr>
@@ -14007,38 +13472,10 @@
       </p:sp>
       <p:sp>
         <p:nvSpPr>
-          <p:cNvPr id="4" name="Footer Placeholder 3">
-            <a:extLst>
-              <a:ext uri="{FF2B5EF4-FFF2-40B4-BE49-F238E27FC236}">
-                <a16:creationId xmlns:a16="http://schemas.microsoft.com/office/drawing/2014/main" xmlns="" id="{BC2BC88E-5B73-405B-B409-E5D57254E871}"/>
-              </a:ext>
-            </a:extLst>
-          </p:cNvPr>
-          <p:cNvSpPr>
-            <a:spLocks noGrp="1"/>
-          </p:cNvSpPr>
-          <p:nvPr>
-            <p:ph type="ftr" sz="quarter" idx="11"/>
-          </p:nvPr>
-        </p:nvSpPr>
-        <p:spPr/>
-        <p:txBody>
-          <a:bodyPr/>
-          <a:lstStyle/>
-          <a:p>
-            <a:r>
-              <a:rPr lang="en-IN"/>
-              <a:t>LTI</a:t>
-            </a:r>
-          </a:p>
-        </p:txBody>
-      </p:sp>
-      <p:sp>
-        <p:nvSpPr>
           <p:cNvPr id="5" name="Slide Number Placeholder 4">
             <a:extLst>
               <a:ext uri="{FF2B5EF4-FFF2-40B4-BE49-F238E27FC236}">
-                <a16:creationId xmlns:a16="http://schemas.microsoft.com/office/drawing/2014/main" xmlns="" id="{C67A501C-7046-45C8-82FC-E9028CDCC85E}"/>
+                <a16:creationId xmlns="" xmlns:a16="http://schemas.microsoft.com/office/drawing/2014/main" id="{C67A501C-7046-45C8-82FC-E9028CDCC85E}"/>
               </a:ext>
             </a:extLst>
           </p:cNvPr>
@@ -14067,7 +13504,7 @@
           <p:cNvPr id="6" name="Picture 5">
             <a:extLst>
               <a:ext uri="{FF2B5EF4-FFF2-40B4-BE49-F238E27FC236}">
-                <a16:creationId xmlns:a16="http://schemas.microsoft.com/office/drawing/2014/main" xmlns="" id="{7B7B8559-3F5A-46AD-BA38-67041DDBAA0A}"/>
+                <a16:creationId xmlns="" xmlns:a16="http://schemas.microsoft.com/office/drawing/2014/main" id="{7B7B8559-3F5A-46AD-BA38-67041DDBAA0A}"/>
               </a:ext>
             </a:extLst>
           </p:cNvPr>
@@ -14102,6 +13539,13 @@
   <p:clrMapOvr>
     <a:masterClrMapping/>
   </p:clrMapOvr>
+  <p:timing>
+    <p:tnLst>
+      <p:par>
+        <p:cTn id="1" dur="indefinite" restart="never" nodeType="tmRoot"/>
+      </p:par>
+    </p:tnLst>
+  </p:timing>
 </p:sld>
 </file>
 
@@ -14127,7 +13571,7 @@
           <p:cNvPr id="2" name="Title 1">
             <a:extLst>
               <a:ext uri="{FF2B5EF4-FFF2-40B4-BE49-F238E27FC236}">
-                <a16:creationId xmlns:a16="http://schemas.microsoft.com/office/drawing/2014/main" xmlns="" id="{2956EA2C-3865-4913-B0C7-A5AE3FB21184}"/>
+                <a16:creationId xmlns="" xmlns:a16="http://schemas.microsoft.com/office/drawing/2014/main" id="{2956EA2C-3865-4913-B0C7-A5AE3FB21184}"/>
               </a:ext>
             </a:extLst>
           </p:cNvPr>
@@ -14161,7 +13605,7 @@
           <p:cNvPr id="10" name="Content Placeholder 9">
             <a:extLst>
               <a:ext uri="{FF2B5EF4-FFF2-40B4-BE49-F238E27FC236}">
-                <a16:creationId xmlns:a16="http://schemas.microsoft.com/office/drawing/2014/main" xmlns="" id="{1C51AF3E-B072-4952-A87A-11FE38FAF575}"/>
+                <a16:creationId xmlns="" xmlns:a16="http://schemas.microsoft.com/office/drawing/2014/main" id="{1C51AF3E-B072-4952-A87A-11FE38FAF575}"/>
               </a:ext>
             </a:extLst>
           </p:cNvPr>
@@ -14190,38 +13634,10 @@
       </p:pic>
       <p:sp>
         <p:nvSpPr>
-          <p:cNvPr id="4" name="Footer Placeholder 3">
-            <a:extLst>
-              <a:ext uri="{FF2B5EF4-FFF2-40B4-BE49-F238E27FC236}">
-                <a16:creationId xmlns:a16="http://schemas.microsoft.com/office/drawing/2014/main" xmlns="" id="{1D9F98FC-126D-43ED-877E-7DF056A4B17D}"/>
-              </a:ext>
-            </a:extLst>
-          </p:cNvPr>
-          <p:cNvSpPr>
-            <a:spLocks noGrp="1"/>
-          </p:cNvSpPr>
-          <p:nvPr>
-            <p:ph type="ftr" sz="quarter" idx="11"/>
-          </p:nvPr>
-        </p:nvSpPr>
-        <p:spPr/>
-        <p:txBody>
-          <a:bodyPr/>
-          <a:lstStyle/>
-          <a:p>
-            <a:r>
-              <a:rPr lang="en-IN" dirty="0"/>
-              <a:t>LTI</a:t>
-            </a:r>
-          </a:p>
-        </p:txBody>
-      </p:sp>
-      <p:sp>
-        <p:nvSpPr>
           <p:cNvPr id="5" name="Slide Number Placeholder 4">
             <a:extLst>
               <a:ext uri="{FF2B5EF4-FFF2-40B4-BE49-F238E27FC236}">
-                <a16:creationId xmlns:a16="http://schemas.microsoft.com/office/drawing/2014/main" xmlns="" id="{55AE0C58-55E6-4C6D-975E-46A1FC0FF686}"/>
+                <a16:creationId xmlns="" xmlns:a16="http://schemas.microsoft.com/office/drawing/2014/main" id="{55AE0C58-55E6-4C6D-975E-46A1FC0FF686}"/>
               </a:ext>
             </a:extLst>
           </p:cNvPr>
@@ -14250,7 +13666,7 @@
           <p:cNvPr id="8" name="Picture 7">
             <a:extLst>
               <a:ext uri="{FF2B5EF4-FFF2-40B4-BE49-F238E27FC236}">
-                <a16:creationId xmlns:a16="http://schemas.microsoft.com/office/drawing/2014/main" xmlns="" id="{8F518068-5591-433B-B733-29AD16ACE9DC}"/>
+                <a16:creationId xmlns="" xmlns:a16="http://schemas.microsoft.com/office/drawing/2014/main" id="{8F518068-5591-433B-B733-29AD16ACE9DC}"/>
               </a:ext>
             </a:extLst>
           </p:cNvPr>
@@ -14280,7 +13696,7 @@
           <p:cNvPr id="16" name="Picture 15">
             <a:extLst>
               <a:ext uri="{FF2B5EF4-FFF2-40B4-BE49-F238E27FC236}">
-                <a16:creationId xmlns:a16="http://schemas.microsoft.com/office/drawing/2014/main" xmlns="" id="{E172FEC8-D6DC-46DB-B770-1C5CC4D798F9}"/>
+                <a16:creationId xmlns="" xmlns:a16="http://schemas.microsoft.com/office/drawing/2014/main" id="{E172FEC8-D6DC-46DB-B770-1C5CC4D798F9}"/>
               </a:ext>
             </a:extLst>
           </p:cNvPr>
@@ -14310,7 +13726,7 @@
           <p:cNvPr id="17" name="Picture 16">
             <a:extLst>
               <a:ext uri="{FF2B5EF4-FFF2-40B4-BE49-F238E27FC236}">
-                <a16:creationId xmlns:a16="http://schemas.microsoft.com/office/drawing/2014/main" xmlns="" id="{DF7D4E07-7D50-4F61-A47F-105471BD2960}"/>
+                <a16:creationId xmlns="" xmlns:a16="http://schemas.microsoft.com/office/drawing/2014/main" id="{DF7D4E07-7D50-4F61-A47F-105471BD2960}"/>
               </a:ext>
             </a:extLst>
           </p:cNvPr>
@@ -14340,7 +13756,7 @@
           <p:cNvPr id="18" name="Picture 17">
             <a:extLst>
               <a:ext uri="{FF2B5EF4-FFF2-40B4-BE49-F238E27FC236}">
-                <a16:creationId xmlns:a16="http://schemas.microsoft.com/office/drawing/2014/main" xmlns="" id="{776318D6-97E5-494F-8620-833692EEEAF2}"/>
+                <a16:creationId xmlns="" xmlns:a16="http://schemas.microsoft.com/office/drawing/2014/main" id="{776318D6-97E5-494F-8620-833692EEEAF2}"/>
               </a:ext>
             </a:extLst>
           </p:cNvPr>
@@ -14370,7 +13786,7 @@
           <p:cNvPr id="19" name="Picture 18">
             <a:extLst>
               <a:ext uri="{FF2B5EF4-FFF2-40B4-BE49-F238E27FC236}">
-                <a16:creationId xmlns:a16="http://schemas.microsoft.com/office/drawing/2014/main" xmlns="" id="{7F4B8A6A-6041-4AFF-8BBF-B7DBD6721CF5}"/>
+                <a16:creationId xmlns="" xmlns:a16="http://schemas.microsoft.com/office/drawing/2014/main" id="{7F4B8A6A-6041-4AFF-8BBF-B7DBD6721CF5}"/>
               </a:ext>
             </a:extLst>
           </p:cNvPr>
@@ -14400,7 +13816,7 @@
           <p:cNvPr id="20" name="Picture 19">
             <a:extLst>
               <a:ext uri="{FF2B5EF4-FFF2-40B4-BE49-F238E27FC236}">
-                <a16:creationId xmlns:a16="http://schemas.microsoft.com/office/drawing/2014/main" xmlns="" id="{C0069634-BD0C-4256-929F-3C388FF91563}"/>
+                <a16:creationId xmlns="" xmlns:a16="http://schemas.microsoft.com/office/drawing/2014/main" id="{C0069634-BD0C-4256-929F-3C388FF91563}"/>
               </a:ext>
             </a:extLst>
           </p:cNvPr>
@@ -14755,7 +14171,7 @@
           <p:cNvPr id="2" name="Title 1">
             <a:extLst>
               <a:ext uri="{FF2B5EF4-FFF2-40B4-BE49-F238E27FC236}">
-                <a16:creationId xmlns:a16="http://schemas.microsoft.com/office/drawing/2014/main" xmlns="" id="{4495C78C-26BC-4389-9AC2-18DE8587A397}"/>
+                <a16:creationId xmlns="" xmlns:a16="http://schemas.microsoft.com/office/drawing/2014/main" id="{4495C78C-26BC-4389-9AC2-18DE8587A397}"/>
               </a:ext>
             </a:extLst>
           </p:cNvPr>
@@ -14783,7 +14199,7 @@
           <p:cNvPr id="3" name="Content Placeholder 2">
             <a:extLst>
               <a:ext uri="{FF2B5EF4-FFF2-40B4-BE49-F238E27FC236}">
-                <a16:creationId xmlns:a16="http://schemas.microsoft.com/office/drawing/2014/main" xmlns="" id="{5D552E1F-B15E-455F-B8A5-55099EF53E12}"/>
+                <a16:creationId xmlns="" xmlns:a16="http://schemas.microsoft.com/office/drawing/2014/main" id="{5D552E1F-B15E-455F-B8A5-55099EF53E12}"/>
               </a:ext>
             </a:extLst>
           </p:cNvPr>
@@ -14865,38 +14281,10 @@
       </p:sp>
       <p:sp>
         <p:nvSpPr>
-          <p:cNvPr id="4" name="Footer Placeholder 3">
-            <a:extLst>
-              <a:ext uri="{FF2B5EF4-FFF2-40B4-BE49-F238E27FC236}">
-                <a16:creationId xmlns:a16="http://schemas.microsoft.com/office/drawing/2014/main" xmlns="" id="{3482003B-8BCA-4EAA-82AA-2E6CCE4DA68A}"/>
-              </a:ext>
-            </a:extLst>
-          </p:cNvPr>
-          <p:cNvSpPr>
-            <a:spLocks noGrp="1"/>
-          </p:cNvSpPr>
-          <p:nvPr>
-            <p:ph type="ftr" sz="quarter" idx="11"/>
-          </p:nvPr>
-        </p:nvSpPr>
-        <p:spPr/>
-        <p:txBody>
-          <a:bodyPr/>
-          <a:lstStyle/>
-          <a:p>
-            <a:r>
-              <a:rPr lang="en-IN"/>
-              <a:t>LTI</a:t>
-            </a:r>
-          </a:p>
-        </p:txBody>
-      </p:sp>
-      <p:sp>
-        <p:nvSpPr>
           <p:cNvPr id="5" name="Slide Number Placeholder 4">
             <a:extLst>
               <a:ext uri="{FF2B5EF4-FFF2-40B4-BE49-F238E27FC236}">
-                <a16:creationId xmlns:a16="http://schemas.microsoft.com/office/drawing/2014/main" xmlns="" id="{D108598A-BDD0-4251-B306-3DFB3A71D21F}"/>
+                <a16:creationId xmlns="" xmlns:a16="http://schemas.microsoft.com/office/drawing/2014/main" id="{D108598A-BDD0-4251-B306-3DFB3A71D21F}"/>
               </a:ext>
             </a:extLst>
           </p:cNvPr>
@@ -14930,6 +14318,13 @@
   <p:clrMapOvr>
     <a:masterClrMapping/>
   </p:clrMapOvr>
+  <p:timing>
+    <p:tnLst>
+      <p:par>
+        <p:cTn id="1" dur="indefinite" restart="never" nodeType="tmRoot"/>
+      </p:par>
+    </p:tnLst>
+  </p:timing>
 </p:sld>
 </file>
 
@@ -14955,7 +14350,7 @@
           <p:cNvPr id="2" name="Title 1">
             <a:extLst>
               <a:ext uri="{FF2B5EF4-FFF2-40B4-BE49-F238E27FC236}">
-                <a16:creationId xmlns:a16="http://schemas.microsoft.com/office/drawing/2014/main" xmlns="" id="{96E7E3E4-B28F-4D11-88F7-C853F2102BD4}"/>
+                <a16:creationId xmlns="" xmlns:a16="http://schemas.microsoft.com/office/drawing/2014/main" id="{96E7E3E4-B28F-4D11-88F7-C853F2102BD4}"/>
               </a:ext>
             </a:extLst>
           </p:cNvPr>
@@ -14983,7 +14378,7 @@
           <p:cNvPr id="3" name="Content Placeholder 2">
             <a:extLst>
               <a:ext uri="{FF2B5EF4-FFF2-40B4-BE49-F238E27FC236}">
-                <a16:creationId xmlns:a16="http://schemas.microsoft.com/office/drawing/2014/main" xmlns="" id="{6E5D1558-B128-4BA4-A961-993B79F73D29}"/>
+                <a16:creationId xmlns="" xmlns:a16="http://schemas.microsoft.com/office/drawing/2014/main" id="{6E5D1558-B128-4BA4-A961-993B79F73D29}"/>
               </a:ext>
             </a:extLst>
           </p:cNvPr>
@@ -15125,38 +14520,10 @@
       </p:sp>
       <p:sp>
         <p:nvSpPr>
-          <p:cNvPr id="4" name="Footer Placeholder 3">
-            <a:extLst>
-              <a:ext uri="{FF2B5EF4-FFF2-40B4-BE49-F238E27FC236}">
-                <a16:creationId xmlns:a16="http://schemas.microsoft.com/office/drawing/2014/main" xmlns="" id="{06CA2458-145F-4EC1-A438-AFD78CFE4E75}"/>
-              </a:ext>
-            </a:extLst>
-          </p:cNvPr>
-          <p:cNvSpPr>
-            <a:spLocks noGrp="1"/>
-          </p:cNvSpPr>
-          <p:nvPr>
-            <p:ph type="ftr" sz="quarter" idx="11"/>
-          </p:nvPr>
-        </p:nvSpPr>
-        <p:spPr/>
-        <p:txBody>
-          <a:bodyPr/>
-          <a:lstStyle/>
-          <a:p>
-            <a:r>
-              <a:rPr lang="en-IN"/>
-              <a:t>LTI</a:t>
-            </a:r>
-          </a:p>
-        </p:txBody>
-      </p:sp>
-      <p:sp>
-        <p:nvSpPr>
           <p:cNvPr id="5" name="Slide Number Placeholder 4">
             <a:extLst>
               <a:ext uri="{FF2B5EF4-FFF2-40B4-BE49-F238E27FC236}">
-                <a16:creationId xmlns:a16="http://schemas.microsoft.com/office/drawing/2014/main" xmlns="" id="{B243C854-0E82-4214-AFB2-B0D4DA474B1C}"/>
+                <a16:creationId xmlns="" xmlns:a16="http://schemas.microsoft.com/office/drawing/2014/main" id="{B243C854-0E82-4214-AFB2-B0D4DA474B1C}"/>
               </a:ext>
             </a:extLst>
           </p:cNvPr>
@@ -15190,6 +14557,13 @@
   <p:clrMapOvr>
     <a:masterClrMapping/>
   </p:clrMapOvr>
+  <p:timing>
+    <p:tnLst>
+      <p:par>
+        <p:cTn id="1" dur="indefinite" restart="never" nodeType="tmRoot"/>
+      </p:par>
+    </p:tnLst>
+  </p:timing>
 </p:sld>
 </file>
 
@@ -15215,7 +14589,7 @@
           <p:cNvPr id="2" name="Title 1">
             <a:extLst>
               <a:ext uri="{FF2B5EF4-FFF2-40B4-BE49-F238E27FC236}">
-                <a16:creationId xmlns:a16="http://schemas.microsoft.com/office/drawing/2014/main" xmlns="" id="{F7A8DC85-10DD-440D-8398-FA70746F20B7}"/>
+                <a16:creationId xmlns="" xmlns:a16="http://schemas.microsoft.com/office/drawing/2014/main" id="{F7A8DC85-10DD-440D-8398-FA70746F20B7}"/>
               </a:ext>
             </a:extLst>
           </p:cNvPr>
@@ -15243,7 +14617,7 @@
           <p:cNvPr id="3" name="Content Placeholder 2">
             <a:extLst>
               <a:ext uri="{FF2B5EF4-FFF2-40B4-BE49-F238E27FC236}">
-                <a16:creationId xmlns:a16="http://schemas.microsoft.com/office/drawing/2014/main" xmlns="" id="{E68C9EDE-F146-42B1-B6FA-3FA864928670}"/>
+                <a16:creationId xmlns="" xmlns:a16="http://schemas.microsoft.com/office/drawing/2014/main" id="{E68C9EDE-F146-42B1-B6FA-3FA864928670}"/>
               </a:ext>
             </a:extLst>
           </p:cNvPr>
@@ -15309,38 +14683,10 @@
       </p:sp>
       <p:sp>
         <p:nvSpPr>
-          <p:cNvPr id="4" name="Footer Placeholder 3">
-            <a:extLst>
-              <a:ext uri="{FF2B5EF4-FFF2-40B4-BE49-F238E27FC236}">
-                <a16:creationId xmlns:a16="http://schemas.microsoft.com/office/drawing/2014/main" xmlns="" id="{88E72D86-C1A9-4FC7-9EAE-CA824D1B79DA}"/>
-              </a:ext>
-            </a:extLst>
-          </p:cNvPr>
-          <p:cNvSpPr>
-            <a:spLocks noGrp="1"/>
-          </p:cNvSpPr>
-          <p:nvPr>
-            <p:ph type="ftr" sz="quarter" idx="11"/>
-          </p:nvPr>
-        </p:nvSpPr>
-        <p:spPr/>
-        <p:txBody>
-          <a:bodyPr/>
-          <a:lstStyle/>
-          <a:p>
-            <a:r>
-              <a:rPr lang="en-IN"/>
-              <a:t>LTI</a:t>
-            </a:r>
-          </a:p>
-        </p:txBody>
-      </p:sp>
-      <p:sp>
-        <p:nvSpPr>
           <p:cNvPr id="5" name="Slide Number Placeholder 4">
             <a:extLst>
               <a:ext uri="{FF2B5EF4-FFF2-40B4-BE49-F238E27FC236}">
-                <a16:creationId xmlns:a16="http://schemas.microsoft.com/office/drawing/2014/main" xmlns="" id="{47E44FCE-0581-4374-893C-C1F8D1CC7A8F}"/>
+                <a16:creationId xmlns="" xmlns:a16="http://schemas.microsoft.com/office/drawing/2014/main" id="{47E44FCE-0581-4374-893C-C1F8D1CC7A8F}"/>
               </a:ext>
             </a:extLst>
           </p:cNvPr>
@@ -15374,6 +14720,13 @@
   <p:clrMapOvr>
     <a:masterClrMapping/>
   </p:clrMapOvr>
+  <p:timing>
+    <p:tnLst>
+      <p:par>
+        <p:cTn id="1" dur="indefinite" restart="never" nodeType="tmRoot"/>
+      </p:par>
+    </p:tnLst>
+  </p:timing>
 </p:sld>
 </file>
 
@@ -15399,7 +14752,7 @@
           <p:cNvPr id="2" name="Title 1">
             <a:extLst>
               <a:ext uri="{FF2B5EF4-FFF2-40B4-BE49-F238E27FC236}">
-                <a16:creationId xmlns:a16="http://schemas.microsoft.com/office/drawing/2014/main" xmlns="" id="{1EABC006-6598-4E26-89B5-5D5842716D0F}"/>
+                <a16:creationId xmlns="" xmlns:a16="http://schemas.microsoft.com/office/drawing/2014/main" id="{1EABC006-6598-4E26-89B5-5D5842716D0F}"/>
               </a:ext>
             </a:extLst>
           </p:cNvPr>
@@ -15424,38 +14777,10 @@
       </p:sp>
       <p:sp>
         <p:nvSpPr>
-          <p:cNvPr id="4" name="Footer Placeholder 3">
-            <a:extLst>
-              <a:ext uri="{FF2B5EF4-FFF2-40B4-BE49-F238E27FC236}">
-                <a16:creationId xmlns:a16="http://schemas.microsoft.com/office/drawing/2014/main" xmlns="" id="{E5251967-73A0-4496-A39A-4C05D48D1617}"/>
-              </a:ext>
-            </a:extLst>
-          </p:cNvPr>
-          <p:cNvSpPr>
-            <a:spLocks noGrp="1"/>
-          </p:cNvSpPr>
-          <p:nvPr>
-            <p:ph type="ftr" sz="quarter" idx="11"/>
-          </p:nvPr>
-        </p:nvSpPr>
-        <p:spPr/>
-        <p:txBody>
-          <a:bodyPr/>
-          <a:lstStyle/>
-          <a:p>
-            <a:r>
-              <a:rPr lang="en-IN"/>
-              <a:t>LTI</a:t>
-            </a:r>
-          </a:p>
-        </p:txBody>
-      </p:sp>
-      <p:sp>
-        <p:nvSpPr>
           <p:cNvPr id="5" name="Slide Number Placeholder 4">
             <a:extLst>
               <a:ext uri="{FF2B5EF4-FFF2-40B4-BE49-F238E27FC236}">
-                <a16:creationId xmlns:a16="http://schemas.microsoft.com/office/drawing/2014/main" xmlns="" id="{1BB38BC7-47DA-4382-A9C0-529D013B8613}"/>
+                <a16:creationId xmlns="" xmlns:a16="http://schemas.microsoft.com/office/drawing/2014/main" id="{1BB38BC7-47DA-4382-A9C0-529D013B8613}"/>
               </a:ext>
             </a:extLst>
           </p:cNvPr>
@@ -15484,7 +14809,7 @@
           <p:cNvPr id="6" name="Content Placeholder 5">
             <a:extLst>
               <a:ext uri="{FF2B5EF4-FFF2-40B4-BE49-F238E27FC236}">
-                <a16:creationId xmlns:a16="http://schemas.microsoft.com/office/drawing/2014/main" xmlns="" id="{4D7FAA91-4F80-44A5-9231-CDB05A2D5E4C}"/>
+                <a16:creationId xmlns="" xmlns:a16="http://schemas.microsoft.com/office/drawing/2014/main" id="{4D7FAA91-4F80-44A5-9231-CDB05A2D5E4C}"/>
               </a:ext>
             </a:extLst>
           </p:cNvPr>
@@ -15599,6 +14924,13 @@
   <p:clrMapOvr>
     <a:masterClrMapping/>
   </p:clrMapOvr>
+  <p:timing>
+    <p:tnLst>
+      <p:par>
+        <p:cTn id="1" dur="indefinite" restart="never" nodeType="tmRoot"/>
+      </p:par>
+    </p:tnLst>
+  </p:timing>
 </p:sld>
 </file>
 
@@ -15624,7 +14956,7 @@
           <p:cNvPr id="2" name="Title 1">
             <a:extLst>
               <a:ext uri="{FF2B5EF4-FFF2-40B4-BE49-F238E27FC236}">
-                <a16:creationId xmlns:a16="http://schemas.microsoft.com/office/drawing/2014/main" xmlns="" id="{646C8A7A-EE96-4B65-868D-1CDCD4F0BEA3}"/>
+                <a16:creationId xmlns="" xmlns:a16="http://schemas.microsoft.com/office/drawing/2014/main" id="{646C8A7A-EE96-4B65-868D-1CDCD4F0BEA3}"/>
               </a:ext>
             </a:extLst>
           </p:cNvPr>
@@ -15659,7 +14991,7 @@
           <p:cNvPr id="8" name="Content Placeholder 7">
             <a:extLst>
               <a:ext uri="{FF2B5EF4-FFF2-40B4-BE49-F238E27FC236}">
-                <a16:creationId xmlns:a16="http://schemas.microsoft.com/office/drawing/2014/main" xmlns="" id="{2FCB1B2C-6634-4FAA-955A-00A7B15ED5CA}"/>
+                <a16:creationId xmlns="" xmlns:a16="http://schemas.microsoft.com/office/drawing/2014/main" id="{2FCB1B2C-6634-4FAA-955A-00A7B15ED5CA}"/>
               </a:ext>
             </a:extLst>
           </p:cNvPr>
@@ -15688,38 +15020,10 @@
       </p:pic>
       <p:sp>
         <p:nvSpPr>
-          <p:cNvPr id="4" name="Footer Placeholder 3">
-            <a:extLst>
-              <a:ext uri="{FF2B5EF4-FFF2-40B4-BE49-F238E27FC236}">
-                <a16:creationId xmlns:a16="http://schemas.microsoft.com/office/drawing/2014/main" xmlns="" id="{5A6C9653-63CB-4277-B7CC-ECE973261492}"/>
-              </a:ext>
-            </a:extLst>
-          </p:cNvPr>
-          <p:cNvSpPr>
-            <a:spLocks noGrp="1"/>
-          </p:cNvSpPr>
-          <p:nvPr>
-            <p:ph type="ftr" sz="quarter" idx="11"/>
-          </p:nvPr>
-        </p:nvSpPr>
-        <p:spPr/>
-        <p:txBody>
-          <a:bodyPr/>
-          <a:lstStyle/>
-          <a:p>
-            <a:r>
-              <a:rPr lang="en-IN"/>
-              <a:t>LTI</a:t>
-            </a:r>
-          </a:p>
-        </p:txBody>
-      </p:sp>
-      <p:sp>
-        <p:nvSpPr>
           <p:cNvPr id="5" name="Slide Number Placeholder 4">
             <a:extLst>
               <a:ext uri="{FF2B5EF4-FFF2-40B4-BE49-F238E27FC236}">
-                <a16:creationId xmlns:a16="http://schemas.microsoft.com/office/drawing/2014/main" xmlns="" id="{C51C62A7-B11B-44B3-834A-9857CEF1914E}"/>
+                <a16:creationId xmlns="" xmlns:a16="http://schemas.microsoft.com/office/drawing/2014/main" id="{C51C62A7-B11B-44B3-834A-9857CEF1914E}"/>
               </a:ext>
             </a:extLst>
           </p:cNvPr>
@@ -15748,7 +15052,7 @@
           <p:cNvPr id="6" name="Picture 5">
             <a:extLst>
               <a:ext uri="{FF2B5EF4-FFF2-40B4-BE49-F238E27FC236}">
-                <a16:creationId xmlns:a16="http://schemas.microsoft.com/office/drawing/2014/main" xmlns="" id="{AE8F96BC-A9DD-4F4B-A69A-957C1B830D65}"/>
+                <a16:creationId xmlns="" xmlns:a16="http://schemas.microsoft.com/office/drawing/2014/main" id="{AE8F96BC-A9DD-4F4B-A69A-957C1B830D65}"/>
               </a:ext>
             </a:extLst>
           </p:cNvPr>
@@ -15778,7 +15082,7 @@
           <p:cNvPr id="7" name="Picture 6">
             <a:extLst>
               <a:ext uri="{FF2B5EF4-FFF2-40B4-BE49-F238E27FC236}">
-                <a16:creationId xmlns:a16="http://schemas.microsoft.com/office/drawing/2014/main" xmlns="" id="{E9A061E8-1FF0-4154-8D19-7A25E1DF019D}"/>
+                <a16:creationId xmlns="" xmlns:a16="http://schemas.microsoft.com/office/drawing/2014/main" id="{E9A061E8-1FF0-4154-8D19-7A25E1DF019D}"/>
               </a:ext>
             </a:extLst>
           </p:cNvPr>
@@ -15808,7 +15112,7 @@
           <p:cNvPr id="9" name="Picture 8">
             <a:extLst>
               <a:ext uri="{FF2B5EF4-FFF2-40B4-BE49-F238E27FC236}">
-                <a16:creationId xmlns:a16="http://schemas.microsoft.com/office/drawing/2014/main" xmlns="" id="{D72BF53B-395F-4F64-933F-C869D81541E2}"/>
+                <a16:creationId xmlns="" xmlns:a16="http://schemas.microsoft.com/office/drawing/2014/main" id="{D72BF53B-395F-4F64-933F-C869D81541E2}"/>
               </a:ext>
             </a:extLst>
           </p:cNvPr>
@@ -16078,7 +15382,7 @@
           <p:cNvPr id="2" name="Title 1">
             <a:extLst>
               <a:ext uri="{FF2B5EF4-FFF2-40B4-BE49-F238E27FC236}">
-                <a16:creationId xmlns:a16="http://schemas.microsoft.com/office/drawing/2014/main" xmlns="" id="{1635FC41-8808-42B2-92D5-FB6409637194}"/>
+                <a16:creationId xmlns="" xmlns:a16="http://schemas.microsoft.com/office/drawing/2014/main" id="{1635FC41-8808-42B2-92D5-FB6409637194}"/>
               </a:ext>
             </a:extLst>
           </p:cNvPr>
@@ -16106,7 +15410,7 @@
           <p:cNvPr id="3" name="Content Placeholder 2">
             <a:extLst>
               <a:ext uri="{FF2B5EF4-FFF2-40B4-BE49-F238E27FC236}">
-                <a16:creationId xmlns:a16="http://schemas.microsoft.com/office/drawing/2014/main" xmlns="" id="{6FF27AB7-96D6-440B-9791-8F5136140C5F}"/>
+                <a16:creationId xmlns="" xmlns:a16="http://schemas.microsoft.com/office/drawing/2014/main" id="{6FF27AB7-96D6-440B-9791-8F5136140C5F}"/>
               </a:ext>
             </a:extLst>
           </p:cNvPr>
@@ -16128,38 +15432,10 @@
       </p:sp>
       <p:sp>
         <p:nvSpPr>
-          <p:cNvPr id="4" name="Footer Placeholder 3">
-            <a:extLst>
-              <a:ext uri="{FF2B5EF4-FFF2-40B4-BE49-F238E27FC236}">
-                <a16:creationId xmlns:a16="http://schemas.microsoft.com/office/drawing/2014/main" xmlns="" id="{A21C9271-5DC2-4B34-A150-2CB13E42BC44}"/>
-              </a:ext>
-            </a:extLst>
-          </p:cNvPr>
-          <p:cNvSpPr>
-            <a:spLocks noGrp="1"/>
-          </p:cNvSpPr>
-          <p:nvPr>
-            <p:ph type="ftr" sz="quarter" idx="11"/>
-          </p:nvPr>
-        </p:nvSpPr>
-        <p:spPr/>
-        <p:txBody>
-          <a:bodyPr/>
-          <a:lstStyle/>
-          <a:p>
-            <a:r>
-              <a:rPr lang="en-IN"/>
-              <a:t>LTI</a:t>
-            </a:r>
-          </a:p>
-        </p:txBody>
-      </p:sp>
-      <p:sp>
-        <p:nvSpPr>
           <p:cNvPr id="5" name="Slide Number Placeholder 4">
             <a:extLst>
               <a:ext uri="{FF2B5EF4-FFF2-40B4-BE49-F238E27FC236}">
-                <a16:creationId xmlns:a16="http://schemas.microsoft.com/office/drawing/2014/main" xmlns="" id="{AE3C7FB6-6E50-4701-8039-24431E6A85FA}"/>
+                <a16:creationId xmlns="" xmlns:a16="http://schemas.microsoft.com/office/drawing/2014/main" id="{AE3C7FB6-6E50-4701-8039-24431E6A85FA}"/>
               </a:ext>
             </a:extLst>
           </p:cNvPr>
@@ -16188,7 +15464,7 @@
           <p:cNvPr id="6" name="Picture 5">
             <a:extLst>
               <a:ext uri="{FF2B5EF4-FFF2-40B4-BE49-F238E27FC236}">
-                <a16:creationId xmlns:a16="http://schemas.microsoft.com/office/drawing/2014/main" xmlns="" id="{62014C83-2576-4538-A3A3-42708B1BB6DB}"/>
+                <a16:creationId xmlns="" xmlns:a16="http://schemas.microsoft.com/office/drawing/2014/main" id="{62014C83-2576-4538-A3A3-42708B1BB6DB}"/>
               </a:ext>
             </a:extLst>
           </p:cNvPr>
@@ -16218,7 +15494,7 @@
           <p:cNvPr id="7" name="Picture 6">
             <a:extLst>
               <a:ext uri="{FF2B5EF4-FFF2-40B4-BE49-F238E27FC236}">
-                <a16:creationId xmlns:a16="http://schemas.microsoft.com/office/drawing/2014/main" xmlns="" id="{21574FE8-F6CC-4625-B13E-B45D8FBC9F80}"/>
+                <a16:creationId xmlns="" xmlns:a16="http://schemas.microsoft.com/office/drawing/2014/main" id="{21574FE8-F6CC-4625-B13E-B45D8FBC9F80}"/>
               </a:ext>
             </a:extLst>
           </p:cNvPr>
@@ -16361,7 +15637,7 @@
           <p:cNvPr id="2" name="Title 1">
             <a:extLst>
               <a:ext uri="{FF2B5EF4-FFF2-40B4-BE49-F238E27FC236}">
-                <a16:creationId xmlns:a16="http://schemas.microsoft.com/office/drawing/2014/main" xmlns="" id="{4FC6EAA3-48B0-4353-9357-ECC1479F4E6B}"/>
+                <a16:creationId xmlns="" xmlns:a16="http://schemas.microsoft.com/office/drawing/2014/main" id="{4FC6EAA3-48B0-4353-9357-ECC1479F4E6B}"/>
               </a:ext>
             </a:extLst>
           </p:cNvPr>
@@ -16383,38 +15659,10 @@
       </p:sp>
       <p:sp>
         <p:nvSpPr>
-          <p:cNvPr id="4" name="Footer Placeholder 3">
-            <a:extLst>
-              <a:ext uri="{FF2B5EF4-FFF2-40B4-BE49-F238E27FC236}">
-                <a16:creationId xmlns:a16="http://schemas.microsoft.com/office/drawing/2014/main" xmlns="" id="{C77A7400-92CF-499D-BA0F-334C0B0EC903}"/>
-              </a:ext>
-            </a:extLst>
-          </p:cNvPr>
-          <p:cNvSpPr>
-            <a:spLocks noGrp="1"/>
-          </p:cNvSpPr>
-          <p:nvPr>
-            <p:ph type="ftr" sz="quarter" idx="11"/>
-          </p:nvPr>
-        </p:nvSpPr>
-        <p:spPr/>
-        <p:txBody>
-          <a:bodyPr/>
-          <a:lstStyle/>
-          <a:p>
-            <a:r>
-              <a:rPr lang="en-IN"/>
-              <a:t>LTI</a:t>
-            </a:r>
-          </a:p>
-        </p:txBody>
-      </p:sp>
-      <p:sp>
-        <p:nvSpPr>
           <p:cNvPr id="5" name="Slide Number Placeholder 4">
             <a:extLst>
               <a:ext uri="{FF2B5EF4-FFF2-40B4-BE49-F238E27FC236}">
-                <a16:creationId xmlns:a16="http://schemas.microsoft.com/office/drawing/2014/main" xmlns="" id="{0C494297-279B-41B8-B873-864BB3F56777}"/>
+                <a16:creationId xmlns="" xmlns:a16="http://schemas.microsoft.com/office/drawing/2014/main" id="{0C494297-279B-41B8-B873-864BB3F56777}"/>
               </a:ext>
             </a:extLst>
           </p:cNvPr>
@@ -16443,7 +15691,7 @@
           <p:cNvPr id="6" name="Picture 5">
             <a:extLst>
               <a:ext uri="{FF2B5EF4-FFF2-40B4-BE49-F238E27FC236}">
-                <a16:creationId xmlns:a16="http://schemas.microsoft.com/office/drawing/2014/main" xmlns="" id="{B2BDFF50-D9DB-4178-8515-94707DA6662F}"/>
+                <a16:creationId xmlns="" xmlns:a16="http://schemas.microsoft.com/office/drawing/2014/main" id="{B2BDFF50-D9DB-4178-8515-94707DA6662F}"/>
               </a:ext>
             </a:extLst>
           </p:cNvPr>
@@ -16473,7 +15721,7 @@
           <p:cNvPr id="3" name="Picture 2">
             <a:extLst>
               <a:ext uri="{FF2B5EF4-FFF2-40B4-BE49-F238E27FC236}">
-                <a16:creationId xmlns:a16="http://schemas.microsoft.com/office/drawing/2014/main" xmlns="" id="{A099DF6C-3F0E-445B-8051-7F852AEA72D4}"/>
+                <a16:creationId xmlns="" xmlns:a16="http://schemas.microsoft.com/office/drawing/2014/main" id="{A099DF6C-3F0E-445B-8051-7F852AEA72D4}"/>
               </a:ext>
             </a:extLst>
           </p:cNvPr>
@@ -16503,7 +15751,7 @@
           <p:cNvPr id="9" name="Picture 8">
             <a:extLst>
               <a:ext uri="{FF2B5EF4-FFF2-40B4-BE49-F238E27FC236}">
-                <a16:creationId xmlns:a16="http://schemas.microsoft.com/office/drawing/2014/main" xmlns="" id="{EEC3F871-FA3E-41E1-8076-2B2E8C1622C2}"/>
+                <a16:creationId xmlns="" xmlns:a16="http://schemas.microsoft.com/office/drawing/2014/main" id="{EEC3F871-FA3E-41E1-8076-2B2E8C1622C2}"/>
               </a:ext>
             </a:extLst>
           </p:cNvPr>
@@ -16533,7 +15781,7 @@
           <p:cNvPr id="11" name="Picture 10">
             <a:extLst>
               <a:ext uri="{FF2B5EF4-FFF2-40B4-BE49-F238E27FC236}">
-                <a16:creationId xmlns:a16="http://schemas.microsoft.com/office/drawing/2014/main" xmlns="" id="{1CA95E3C-D020-4307-BC59-1C60707A584D}"/>
+                <a16:creationId xmlns="" xmlns:a16="http://schemas.microsoft.com/office/drawing/2014/main" id="{1CA95E3C-D020-4307-BC59-1C60707A584D}"/>
               </a:ext>
             </a:extLst>
           </p:cNvPr>
@@ -16563,7 +15811,7 @@
           <p:cNvPr id="13" name="Picture 12">
             <a:extLst>
               <a:ext uri="{FF2B5EF4-FFF2-40B4-BE49-F238E27FC236}">
-                <a16:creationId xmlns:a16="http://schemas.microsoft.com/office/drawing/2014/main" xmlns="" id="{CFE5D25E-FF9E-4C7C-A297-555F95950DEF}"/>
+                <a16:creationId xmlns="" xmlns:a16="http://schemas.microsoft.com/office/drawing/2014/main" id="{CFE5D25E-FF9E-4C7C-A297-555F95950DEF}"/>
               </a:ext>
             </a:extLst>
           </p:cNvPr>
@@ -16593,7 +15841,7 @@
           <p:cNvPr id="15" name="Content Placeholder 14">
             <a:extLst>
               <a:ext uri="{FF2B5EF4-FFF2-40B4-BE49-F238E27FC236}">
-                <a16:creationId xmlns:a16="http://schemas.microsoft.com/office/drawing/2014/main" xmlns="" id="{30571F88-5E30-4119-A621-2E5A666F9C20}"/>
+                <a16:creationId xmlns="" xmlns:a16="http://schemas.microsoft.com/office/drawing/2014/main" id="{30571F88-5E30-4119-A621-2E5A666F9C20}"/>
               </a:ext>
             </a:extLst>
           </p:cNvPr>
@@ -16618,7 +15866,7 @@
           <p:cNvPr id="16" name="Content Placeholder 7">
             <a:extLst>
               <a:ext uri="{FF2B5EF4-FFF2-40B4-BE49-F238E27FC236}">
-                <a16:creationId xmlns:a16="http://schemas.microsoft.com/office/drawing/2014/main" xmlns="" id="{E9540489-CDA0-462E-84FA-BD0EA1B11632}"/>
+                <a16:creationId xmlns="" xmlns:a16="http://schemas.microsoft.com/office/drawing/2014/main" id="{E9540489-CDA0-462E-84FA-BD0EA1B11632}"/>
               </a:ext>
             </a:extLst>
           </p:cNvPr>
@@ -17026,7 +16274,7 @@
           <p:cNvPr id="2" name="Title 1">
             <a:extLst>
               <a:ext uri="{FF2B5EF4-FFF2-40B4-BE49-F238E27FC236}">
-                <a16:creationId xmlns:a16="http://schemas.microsoft.com/office/drawing/2014/main" xmlns="" id="{7A8E930A-E999-4BF6-BF6D-2C5CCAEA56C7}"/>
+                <a16:creationId xmlns="" xmlns:a16="http://schemas.microsoft.com/office/drawing/2014/main" id="{7A8E930A-E999-4BF6-BF6D-2C5CCAEA56C7}"/>
               </a:ext>
             </a:extLst>
           </p:cNvPr>
@@ -17054,7 +16302,7 @@
           <p:cNvPr id="3" name="Content Placeholder 2">
             <a:extLst>
               <a:ext uri="{FF2B5EF4-FFF2-40B4-BE49-F238E27FC236}">
-                <a16:creationId xmlns:a16="http://schemas.microsoft.com/office/drawing/2014/main" xmlns="" id="{96B648A0-81EE-4F4D-A74D-5F73C7DEEE5F}"/>
+                <a16:creationId xmlns="" xmlns:a16="http://schemas.microsoft.com/office/drawing/2014/main" id="{96B648A0-81EE-4F4D-A74D-5F73C7DEEE5F}"/>
               </a:ext>
             </a:extLst>
           </p:cNvPr>
@@ -17076,38 +16324,10 @@
       </p:sp>
       <p:sp>
         <p:nvSpPr>
-          <p:cNvPr id="4" name="Footer Placeholder 3">
-            <a:extLst>
-              <a:ext uri="{FF2B5EF4-FFF2-40B4-BE49-F238E27FC236}">
-                <a16:creationId xmlns:a16="http://schemas.microsoft.com/office/drawing/2014/main" xmlns="" id="{F441819D-F46A-4EA8-87C7-052FFB4D1D54}"/>
-              </a:ext>
-            </a:extLst>
-          </p:cNvPr>
-          <p:cNvSpPr>
-            <a:spLocks noGrp="1"/>
-          </p:cNvSpPr>
-          <p:nvPr>
-            <p:ph type="ftr" sz="quarter" idx="11"/>
-          </p:nvPr>
-        </p:nvSpPr>
-        <p:spPr/>
-        <p:txBody>
-          <a:bodyPr/>
-          <a:lstStyle/>
-          <a:p>
-            <a:r>
-              <a:rPr lang="en-IN"/>
-              <a:t>LTI</a:t>
-            </a:r>
-          </a:p>
-        </p:txBody>
-      </p:sp>
-      <p:sp>
-        <p:nvSpPr>
           <p:cNvPr id="5" name="Slide Number Placeholder 4">
             <a:extLst>
               <a:ext uri="{FF2B5EF4-FFF2-40B4-BE49-F238E27FC236}">
-                <a16:creationId xmlns:a16="http://schemas.microsoft.com/office/drawing/2014/main" xmlns="" id="{950B602C-28AF-425C-B95F-2ADBEF72E12D}"/>
+                <a16:creationId xmlns="" xmlns:a16="http://schemas.microsoft.com/office/drawing/2014/main" id="{950B602C-28AF-425C-B95F-2ADBEF72E12D}"/>
               </a:ext>
             </a:extLst>
           </p:cNvPr>
@@ -17136,7 +16356,7 @@
           <p:cNvPr id="6" name="Picture 5">
             <a:extLst>
               <a:ext uri="{FF2B5EF4-FFF2-40B4-BE49-F238E27FC236}">
-                <a16:creationId xmlns:a16="http://schemas.microsoft.com/office/drawing/2014/main" xmlns="" id="{4626EB91-90AF-4728-96E2-DF1324F90C75}"/>
+                <a16:creationId xmlns="" xmlns:a16="http://schemas.microsoft.com/office/drawing/2014/main" id="{4626EB91-90AF-4728-96E2-DF1324F90C75}"/>
               </a:ext>
             </a:extLst>
           </p:cNvPr>
@@ -17166,7 +16386,7 @@
           <p:cNvPr id="7" name="Picture 6">
             <a:extLst>
               <a:ext uri="{FF2B5EF4-FFF2-40B4-BE49-F238E27FC236}">
-                <a16:creationId xmlns:a16="http://schemas.microsoft.com/office/drawing/2014/main" xmlns="" id="{3E431FCB-99C1-451B-B715-E172C042E21A}"/>
+                <a16:creationId xmlns="" xmlns:a16="http://schemas.microsoft.com/office/drawing/2014/main" id="{3E431FCB-99C1-451B-B715-E172C042E21A}"/>
               </a:ext>
             </a:extLst>
           </p:cNvPr>
@@ -17309,7 +16529,7 @@
           <p:cNvPr id="2" name="Title 1">
             <a:extLst>
               <a:ext uri="{FF2B5EF4-FFF2-40B4-BE49-F238E27FC236}">
-                <a16:creationId xmlns:a16="http://schemas.microsoft.com/office/drawing/2014/main" xmlns="" id="{D7F43274-1A71-490A-977C-B06BE6BCB088}"/>
+                <a16:creationId xmlns="" xmlns:a16="http://schemas.microsoft.com/office/drawing/2014/main" id="{D7F43274-1A71-490A-977C-B06BE6BCB088}"/>
               </a:ext>
             </a:extLst>
           </p:cNvPr>
@@ -17337,7 +16557,7 @@
           <p:cNvPr id="3" name="Content Placeholder 2">
             <a:extLst>
               <a:ext uri="{FF2B5EF4-FFF2-40B4-BE49-F238E27FC236}">
-                <a16:creationId xmlns:a16="http://schemas.microsoft.com/office/drawing/2014/main" xmlns="" id="{FE3A29D0-3121-4F91-AD00-ED10D7C8F342}"/>
+                <a16:creationId xmlns="" xmlns:a16="http://schemas.microsoft.com/office/drawing/2014/main" id="{FE3A29D0-3121-4F91-AD00-ED10D7C8F342}"/>
               </a:ext>
             </a:extLst>
           </p:cNvPr>
@@ -17403,38 +16623,10 @@
       </p:sp>
       <p:sp>
         <p:nvSpPr>
-          <p:cNvPr id="4" name="Footer Placeholder 3">
-            <a:extLst>
-              <a:ext uri="{FF2B5EF4-FFF2-40B4-BE49-F238E27FC236}">
-                <a16:creationId xmlns:a16="http://schemas.microsoft.com/office/drawing/2014/main" xmlns="" id="{AC4BFF8E-5536-4BA0-A033-9ACEBC5B8811}"/>
-              </a:ext>
-            </a:extLst>
-          </p:cNvPr>
-          <p:cNvSpPr>
-            <a:spLocks noGrp="1"/>
-          </p:cNvSpPr>
-          <p:nvPr>
-            <p:ph type="ftr" sz="quarter" idx="11"/>
-          </p:nvPr>
-        </p:nvSpPr>
-        <p:spPr/>
-        <p:txBody>
-          <a:bodyPr/>
-          <a:lstStyle/>
-          <a:p>
-            <a:r>
-              <a:rPr lang="en-IN"/>
-              <a:t>LTI</a:t>
-            </a:r>
-          </a:p>
-        </p:txBody>
-      </p:sp>
-      <p:sp>
-        <p:nvSpPr>
           <p:cNvPr id="5" name="Slide Number Placeholder 4">
             <a:extLst>
               <a:ext uri="{FF2B5EF4-FFF2-40B4-BE49-F238E27FC236}">
-                <a16:creationId xmlns:a16="http://schemas.microsoft.com/office/drawing/2014/main" xmlns="" id="{ACE7E7B0-55C4-4AD5-9616-7379F23ABE40}"/>
+                <a16:creationId xmlns="" xmlns:a16="http://schemas.microsoft.com/office/drawing/2014/main" id="{ACE7E7B0-55C4-4AD5-9616-7379F23ABE40}"/>
               </a:ext>
             </a:extLst>
           </p:cNvPr>
@@ -17468,6 +16660,13 @@
   <p:clrMapOvr>
     <a:masterClrMapping/>
   </p:clrMapOvr>
+  <p:timing>
+    <p:tnLst>
+      <p:par>
+        <p:cTn id="1" dur="indefinite" restart="never" nodeType="tmRoot"/>
+      </p:par>
+    </p:tnLst>
+  </p:timing>
 </p:sld>
 </file>
 
@@ -17493,7 +16692,7 @@
           <p:cNvPr id="2" name="Title 1">
             <a:extLst>
               <a:ext uri="{FF2B5EF4-FFF2-40B4-BE49-F238E27FC236}">
-                <a16:creationId xmlns:a16="http://schemas.microsoft.com/office/drawing/2014/main" xmlns="" id="{60B90D5A-86F5-4E73-AEDD-2E55FC12CA4F}"/>
+                <a16:creationId xmlns="" xmlns:a16="http://schemas.microsoft.com/office/drawing/2014/main" id="{60B90D5A-86F5-4E73-AEDD-2E55FC12CA4F}"/>
               </a:ext>
             </a:extLst>
           </p:cNvPr>
@@ -17521,7 +16720,7 @@
           <p:cNvPr id="3" name="Content Placeholder 2">
             <a:extLst>
               <a:ext uri="{FF2B5EF4-FFF2-40B4-BE49-F238E27FC236}">
-                <a16:creationId xmlns:a16="http://schemas.microsoft.com/office/drawing/2014/main" xmlns="" id="{26A93F00-4EB1-47AF-A6D5-AF01FA0D574F}"/>
+                <a16:creationId xmlns="" xmlns:a16="http://schemas.microsoft.com/office/drawing/2014/main" id="{26A93F00-4EB1-47AF-A6D5-AF01FA0D574F}"/>
               </a:ext>
             </a:extLst>
           </p:cNvPr>
@@ -17601,38 +16800,10 @@
       </p:sp>
       <p:sp>
         <p:nvSpPr>
-          <p:cNvPr id="4" name="Footer Placeholder 3">
-            <a:extLst>
-              <a:ext uri="{FF2B5EF4-FFF2-40B4-BE49-F238E27FC236}">
-                <a16:creationId xmlns:a16="http://schemas.microsoft.com/office/drawing/2014/main" xmlns="" id="{066DA1C2-702F-4512-BF2F-E3D117F3A940}"/>
-              </a:ext>
-            </a:extLst>
-          </p:cNvPr>
-          <p:cNvSpPr>
-            <a:spLocks noGrp="1"/>
-          </p:cNvSpPr>
-          <p:nvPr>
-            <p:ph type="ftr" sz="quarter" idx="11"/>
-          </p:nvPr>
-        </p:nvSpPr>
-        <p:spPr/>
-        <p:txBody>
-          <a:bodyPr/>
-          <a:lstStyle/>
-          <a:p>
-            <a:r>
-              <a:rPr lang="en-IN"/>
-              <a:t>LTI</a:t>
-            </a:r>
-          </a:p>
-        </p:txBody>
-      </p:sp>
-      <p:sp>
-        <p:nvSpPr>
           <p:cNvPr id="5" name="Slide Number Placeholder 4">
             <a:extLst>
               <a:ext uri="{FF2B5EF4-FFF2-40B4-BE49-F238E27FC236}">
-                <a16:creationId xmlns:a16="http://schemas.microsoft.com/office/drawing/2014/main" xmlns="" id="{0CD84B4E-D476-448C-A91B-BE42DBF5CCDB}"/>
+                <a16:creationId xmlns="" xmlns:a16="http://schemas.microsoft.com/office/drawing/2014/main" id="{0CD84B4E-D476-448C-A91B-BE42DBF5CCDB}"/>
               </a:ext>
             </a:extLst>
           </p:cNvPr>
@@ -17666,6 +16837,13 @@
   <p:clrMapOvr>
     <a:masterClrMapping/>
   </p:clrMapOvr>
+  <p:timing>
+    <p:tnLst>
+      <p:par>
+        <p:cTn id="1" dur="indefinite" restart="never" nodeType="tmRoot"/>
+      </p:par>
+    </p:tnLst>
+  </p:timing>
 </p:sld>
 </file>
 
@@ -17691,7 +16869,7 @@
           <p:cNvPr id="2" name="Title 1">
             <a:extLst>
               <a:ext uri="{FF2B5EF4-FFF2-40B4-BE49-F238E27FC236}">
-                <a16:creationId xmlns:a16="http://schemas.microsoft.com/office/drawing/2014/main" xmlns="" id="{29AB408D-4F6D-4955-9DD3-AB3A35A66BC0}"/>
+                <a16:creationId xmlns="" xmlns:a16="http://schemas.microsoft.com/office/drawing/2014/main" id="{29AB408D-4F6D-4955-9DD3-AB3A35A66BC0}"/>
               </a:ext>
             </a:extLst>
           </p:cNvPr>
@@ -17719,7 +16897,7 @@
           <p:cNvPr id="3" name="Content Placeholder 2">
             <a:extLst>
               <a:ext uri="{FF2B5EF4-FFF2-40B4-BE49-F238E27FC236}">
-                <a16:creationId xmlns:a16="http://schemas.microsoft.com/office/drawing/2014/main" xmlns="" id="{6455EE5C-7A74-42D3-97E6-A0ECD4B54EAE}"/>
+                <a16:creationId xmlns="" xmlns:a16="http://schemas.microsoft.com/office/drawing/2014/main" id="{6455EE5C-7A74-42D3-97E6-A0ECD4B54EAE}"/>
               </a:ext>
             </a:extLst>
           </p:cNvPr>
@@ -17748,38 +16926,10 @@
       </p:sp>
       <p:sp>
         <p:nvSpPr>
-          <p:cNvPr id="4" name="Footer Placeholder 3">
-            <a:extLst>
-              <a:ext uri="{FF2B5EF4-FFF2-40B4-BE49-F238E27FC236}">
-                <a16:creationId xmlns:a16="http://schemas.microsoft.com/office/drawing/2014/main" xmlns="" id="{19C89BA2-D326-45BE-B535-FC08B592D641}"/>
-              </a:ext>
-            </a:extLst>
-          </p:cNvPr>
-          <p:cNvSpPr>
-            <a:spLocks noGrp="1"/>
-          </p:cNvSpPr>
-          <p:nvPr>
-            <p:ph type="ftr" sz="quarter" idx="11"/>
-          </p:nvPr>
-        </p:nvSpPr>
-        <p:spPr/>
-        <p:txBody>
-          <a:bodyPr/>
-          <a:lstStyle/>
-          <a:p>
-            <a:r>
-              <a:rPr lang="en-IN"/>
-              <a:t>LTI</a:t>
-            </a:r>
-          </a:p>
-        </p:txBody>
-      </p:sp>
-      <p:sp>
-        <p:nvSpPr>
           <p:cNvPr id="5" name="Slide Number Placeholder 4">
             <a:extLst>
               <a:ext uri="{FF2B5EF4-FFF2-40B4-BE49-F238E27FC236}">
-                <a16:creationId xmlns:a16="http://schemas.microsoft.com/office/drawing/2014/main" xmlns="" id="{8546BEE8-E37D-4895-AD4C-33000C8D5058}"/>
+                <a16:creationId xmlns="" xmlns:a16="http://schemas.microsoft.com/office/drawing/2014/main" id="{8546BEE8-E37D-4895-AD4C-33000C8D5058}"/>
               </a:ext>
             </a:extLst>
           </p:cNvPr>
@@ -17813,6 +16963,13 @@
   <p:clrMapOvr>
     <a:masterClrMapping/>
   </p:clrMapOvr>
+  <p:timing>
+    <p:tnLst>
+      <p:par>
+        <p:cTn id="1" dur="indefinite" restart="never" nodeType="tmRoot"/>
+      </p:par>
+    </p:tnLst>
+  </p:timing>
 </p:sld>
 </file>
 
@@ -17838,7 +16995,7 @@
           <p:cNvPr id="2" name="Title 1">
             <a:extLst>
               <a:ext uri="{FF2B5EF4-FFF2-40B4-BE49-F238E27FC236}">
-                <a16:creationId xmlns:a16="http://schemas.microsoft.com/office/drawing/2014/main" xmlns="" id="{CC6A88CA-5CE4-4327-BC3B-8C5580513707}"/>
+                <a16:creationId xmlns="" xmlns:a16="http://schemas.microsoft.com/office/drawing/2014/main" id="{CC6A88CA-5CE4-4327-BC3B-8C5580513707}"/>
               </a:ext>
             </a:extLst>
           </p:cNvPr>
@@ -17866,7 +17023,7 @@
           <p:cNvPr id="3" name="Content Placeholder 2">
             <a:extLst>
               <a:ext uri="{FF2B5EF4-FFF2-40B4-BE49-F238E27FC236}">
-                <a16:creationId xmlns:a16="http://schemas.microsoft.com/office/drawing/2014/main" xmlns="" id="{608D53B4-933C-4613-9EF4-39A10E63B423}"/>
+                <a16:creationId xmlns="" xmlns:a16="http://schemas.microsoft.com/office/drawing/2014/main" id="{608D53B4-933C-4613-9EF4-39A10E63B423}"/>
               </a:ext>
             </a:extLst>
           </p:cNvPr>
@@ -17924,38 +17081,10 @@
       </p:sp>
       <p:sp>
         <p:nvSpPr>
-          <p:cNvPr id="4" name="Footer Placeholder 3">
-            <a:extLst>
-              <a:ext uri="{FF2B5EF4-FFF2-40B4-BE49-F238E27FC236}">
-                <a16:creationId xmlns:a16="http://schemas.microsoft.com/office/drawing/2014/main" xmlns="" id="{43D3FA54-1A6F-4AC0-A612-CCF9181D100C}"/>
-              </a:ext>
-            </a:extLst>
-          </p:cNvPr>
-          <p:cNvSpPr>
-            <a:spLocks noGrp="1"/>
-          </p:cNvSpPr>
-          <p:nvPr>
-            <p:ph type="ftr" sz="quarter" idx="11"/>
-          </p:nvPr>
-        </p:nvSpPr>
-        <p:spPr/>
-        <p:txBody>
-          <a:bodyPr/>
-          <a:lstStyle/>
-          <a:p>
-            <a:r>
-              <a:rPr lang="en-IN"/>
-              <a:t>LTI</a:t>
-            </a:r>
-          </a:p>
-        </p:txBody>
-      </p:sp>
-      <p:sp>
-        <p:nvSpPr>
           <p:cNvPr id="5" name="Slide Number Placeholder 4">
             <a:extLst>
               <a:ext uri="{FF2B5EF4-FFF2-40B4-BE49-F238E27FC236}">
-                <a16:creationId xmlns:a16="http://schemas.microsoft.com/office/drawing/2014/main" xmlns="" id="{C646AB72-5A7C-4DF1-9C94-DA7A171BB559}"/>
+                <a16:creationId xmlns="" xmlns:a16="http://schemas.microsoft.com/office/drawing/2014/main" id="{C646AB72-5A7C-4DF1-9C94-DA7A171BB559}"/>
               </a:ext>
             </a:extLst>
           </p:cNvPr>
@@ -17989,6 +17118,13 @@
   <p:clrMapOvr>
     <a:masterClrMapping/>
   </p:clrMapOvr>
+  <p:timing>
+    <p:tnLst>
+      <p:par>
+        <p:cTn id="1" dur="indefinite" restart="never" nodeType="tmRoot"/>
+      </p:par>
+    </p:tnLst>
+  </p:timing>
 </p:sld>
 </file>
 
@@ -18014,7 +17150,7 @@
           <p:cNvPr id="2" name="Title 1">
             <a:extLst>
               <a:ext uri="{FF2B5EF4-FFF2-40B4-BE49-F238E27FC236}">
-                <a16:creationId xmlns:a16="http://schemas.microsoft.com/office/drawing/2014/main" xmlns="" id="{E17DFB4E-60F5-400E-87E4-5FEE9A308BC7}"/>
+                <a16:creationId xmlns="" xmlns:a16="http://schemas.microsoft.com/office/drawing/2014/main" id="{E17DFB4E-60F5-400E-87E4-5FEE9A308BC7}"/>
               </a:ext>
             </a:extLst>
           </p:cNvPr>
@@ -18039,38 +17175,10 @@
       </p:sp>
       <p:sp>
         <p:nvSpPr>
-          <p:cNvPr id="4" name="Footer Placeholder 3">
-            <a:extLst>
-              <a:ext uri="{FF2B5EF4-FFF2-40B4-BE49-F238E27FC236}">
-                <a16:creationId xmlns:a16="http://schemas.microsoft.com/office/drawing/2014/main" xmlns="" id="{10564F98-2780-4AC5-83C0-A2F5A3E201E1}"/>
-              </a:ext>
-            </a:extLst>
-          </p:cNvPr>
-          <p:cNvSpPr>
-            <a:spLocks noGrp="1"/>
-          </p:cNvSpPr>
-          <p:nvPr>
-            <p:ph type="ftr" sz="quarter" idx="11"/>
-          </p:nvPr>
-        </p:nvSpPr>
-        <p:spPr/>
-        <p:txBody>
-          <a:bodyPr/>
-          <a:lstStyle/>
-          <a:p>
-            <a:r>
-              <a:rPr lang="en-IN"/>
-              <a:t>LTI</a:t>
-            </a:r>
-          </a:p>
-        </p:txBody>
-      </p:sp>
-      <p:sp>
-        <p:nvSpPr>
           <p:cNvPr id="5" name="Slide Number Placeholder 4">
             <a:extLst>
               <a:ext uri="{FF2B5EF4-FFF2-40B4-BE49-F238E27FC236}">
-                <a16:creationId xmlns:a16="http://schemas.microsoft.com/office/drawing/2014/main" xmlns="" id="{486885D6-9033-4A89-8BC6-69CB55CD9283}"/>
+                <a16:creationId xmlns="" xmlns:a16="http://schemas.microsoft.com/office/drawing/2014/main" id="{486885D6-9033-4A89-8BC6-69CB55CD9283}"/>
               </a:ext>
             </a:extLst>
           </p:cNvPr>
@@ -18099,7 +17207,7 @@
           <p:cNvPr id="8" name="Content Placeholder 7">
             <a:extLst>
               <a:ext uri="{FF2B5EF4-FFF2-40B4-BE49-F238E27FC236}">
-                <a16:creationId xmlns:a16="http://schemas.microsoft.com/office/drawing/2014/main" xmlns="" id="{F0E0ABF3-02AC-4B5D-8635-F47B1297C19B}"/>
+                <a16:creationId xmlns="" xmlns:a16="http://schemas.microsoft.com/office/drawing/2014/main" id="{F0E0ABF3-02AC-4B5D-8635-F47B1297C19B}"/>
               </a:ext>
             </a:extLst>
           </p:cNvPr>
@@ -18154,7 +17262,7 @@
           <p:cNvPr id="2" name="Title 1">
             <a:extLst>
               <a:ext uri="{FF2B5EF4-FFF2-40B4-BE49-F238E27FC236}">
-                <a16:creationId xmlns:a16="http://schemas.microsoft.com/office/drawing/2014/main" xmlns="" id="{77C1281B-495F-4B3B-9679-37B0477F1EA8}"/>
+                <a16:creationId xmlns="" xmlns:a16="http://schemas.microsoft.com/office/drawing/2014/main" id="{77C1281B-495F-4B3B-9679-37B0477F1EA8}"/>
               </a:ext>
             </a:extLst>
           </p:cNvPr>
@@ -18187,7 +17295,7 @@
           <p:cNvPr id="3" name="Content Placeholder 2">
             <a:extLst>
               <a:ext uri="{FF2B5EF4-FFF2-40B4-BE49-F238E27FC236}">
-                <a16:creationId xmlns:a16="http://schemas.microsoft.com/office/drawing/2014/main" xmlns="" id="{0A8F03B9-829E-4BB5-971B-237FFE3B2260}"/>
+                <a16:creationId xmlns="" xmlns:a16="http://schemas.microsoft.com/office/drawing/2014/main" id="{0A8F03B9-829E-4BB5-971B-237FFE3B2260}"/>
               </a:ext>
             </a:extLst>
           </p:cNvPr>
@@ -18214,38 +17322,10 @@
       </p:sp>
       <p:sp>
         <p:nvSpPr>
-          <p:cNvPr id="4" name="Footer Placeholder 3">
-            <a:extLst>
-              <a:ext uri="{FF2B5EF4-FFF2-40B4-BE49-F238E27FC236}">
-                <a16:creationId xmlns:a16="http://schemas.microsoft.com/office/drawing/2014/main" xmlns="" id="{516CFA85-0F6C-4B9C-9418-3E509380B24A}"/>
-              </a:ext>
-            </a:extLst>
-          </p:cNvPr>
-          <p:cNvSpPr>
-            <a:spLocks noGrp="1"/>
-          </p:cNvSpPr>
-          <p:nvPr>
-            <p:ph type="ftr" sz="quarter" idx="11"/>
-          </p:nvPr>
-        </p:nvSpPr>
-        <p:spPr/>
-        <p:txBody>
-          <a:bodyPr/>
-          <a:lstStyle/>
-          <a:p>
-            <a:r>
-              <a:rPr lang="en-IN"/>
-              <a:t>LTI</a:t>
-            </a:r>
-          </a:p>
-        </p:txBody>
-      </p:sp>
-      <p:sp>
-        <p:nvSpPr>
           <p:cNvPr id="5" name="Slide Number Placeholder 4">
             <a:extLst>
               <a:ext uri="{FF2B5EF4-FFF2-40B4-BE49-F238E27FC236}">
-                <a16:creationId xmlns:a16="http://schemas.microsoft.com/office/drawing/2014/main" xmlns="" id="{186F99B5-9BF7-46DD-8AAD-E5508673B241}"/>
+                <a16:creationId xmlns="" xmlns:a16="http://schemas.microsoft.com/office/drawing/2014/main" id="{186F99B5-9BF7-46DD-8AAD-E5508673B241}"/>
               </a:ext>
             </a:extLst>
           </p:cNvPr>
@@ -18274,7 +17354,7 @@
           <p:cNvPr id="6" name="Picture 5">
             <a:extLst>
               <a:ext uri="{FF2B5EF4-FFF2-40B4-BE49-F238E27FC236}">
-                <a16:creationId xmlns:a16="http://schemas.microsoft.com/office/drawing/2014/main" xmlns="" id="{A8F6148E-798C-472E-94AE-F162A7D27295}"/>
+                <a16:creationId xmlns="" xmlns:a16="http://schemas.microsoft.com/office/drawing/2014/main" id="{A8F6148E-798C-472E-94AE-F162A7D27295}"/>
               </a:ext>
             </a:extLst>
           </p:cNvPr>
@@ -18304,7 +17384,7 @@
           <p:cNvPr id="7" name="TextBox 6">
             <a:extLst>
               <a:ext uri="{FF2B5EF4-FFF2-40B4-BE49-F238E27FC236}">
-                <a16:creationId xmlns:a16="http://schemas.microsoft.com/office/drawing/2014/main" xmlns="" id="{1D7170E0-0FF2-4A7E-AA92-82B8CA2749BA}"/>
+                <a16:creationId xmlns="" xmlns:a16="http://schemas.microsoft.com/office/drawing/2014/main" id="{1D7170E0-0FF2-4A7E-AA92-82B8CA2749BA}"/>
               </a:ext>
             </a:extLst>
           </p:cNvPr>
@@ -18339,7 +17419,7 @@
           <p:cNvPr id="8" name="Picture 7">
             <a:extLst>
               <a:ext uri="{FF2B5EF4-FFF2-40B4-BE49-F238E27FC236}">
-                <a16:creationId xmlns:a16="http://schemas.microsoft.com/office/drawing/2014/main" xmlns="" id="{6F2C3DF2-9B69-472B-8AAC-EF35530EA967}"/>
+                <a16:creationId xmlns="" xmlns:a16="http://schemas.microsoft.com/office/drawing/2014/main" id="{6F2C3DF2-9B69-472B-8AAC-EF35530EA967}"/>
               </a:ext>
             </a:extLst>
           </p:cNvPr>
@@ -18369,7 +17449,7 @@
           <p:cNvPr id="9" name="TextBox 8">
             <a:extLst>
               <a:ext uri="{FF2B5EF4-FFF2-40B4-BE49-F238E27FC236}">
-                <a16:creationId xmlns:a16="http://schemas.microsoft.com/office/drawing/2014/main" xmlns="" id="{C31AAEF5-C4F6-48EF-89F1-3B230E6F2ECA}"/>
+                <a16:creationId xmlns="" xmlns:a16="http://schemas.microsoft.com/office/drawing/2014/main" id="{C31AAEF5-C4F6-48EF-89F1-3B230E6F2ECA}"/>
               </a:ext>
             </a:extLst>
           </p:cNvPr>
@@ -18404,7 +17484,7 @@
           <p:cNvPr id="10" name="Picture 9">
             <a:extLst>
               <a:ext uri="{FF2B5EF4-FFF2-40B4-BE49-F238E27FC236}">
-                <a16:creationId xmlns:a16="http://schemas.microsoft.com/office/drawing/2014/main" xmlns="" id="{830FDA75-D2EE-4DF8-92B3-A629DB839E8C}"/>
+                <a16:creationId xmlns="" xmlns:a16="http://schemas.microsoft.com/office/drawing/2014/main" id="{830FDA75-D2EE-4DF8-92B3-A629DB839E8C}"/>
               </a:ext>
             </a:extLst>
           </p:cNvPr>
@@ -18434,7 +17514,7 @@
           <p:cNvPr id="11" name="TextBox 10">
             <a:extLst>
               <a:ext uri="{FF2B5EF4-FFF2-40B4-BE49-F238E27FC236}">
-                <a16:creationId xmlns:a16="http://schemas.microsoft.com/office/drawing/2014/main" xmlns="" id="{4554E320-8CBC-4337-9D5D-4CDF79E77B1A}"/>
+                <a16:creationId xmlns="" xmlns:a16="http://schemas.microsoft.com/office/drawing/2014/main" id="{4554E320-8CBC-4337-9D5D-4CDF79E77B1A}"/>
               </a:ext>
             </a:extLst>
           </p:cNvPr>
@@ -18469,7 +17549,7 @@
           <p:cNvPr id="12" name="Rectangle: Rounded Corners 11">
             <a:extLst>
               <a:ext uri="{FF2B5EF4-FFF2-40B4-BE49-F238E27FC236}">
-                <a16:creationId xmlns:a16="http://schemas.microsoft.com/office/drawing/2014/main" xmlns="" id="{86078A36-F83F-433A-A958-534B90B050EA}"/>
+                <a16:creationId xmlns="" xmlns:a16="http://schemas.microsoft.com/office/drawing/2014/main" id="{86078A36-F83F-433A-A958-534B90B050EA}"/>
               </a:ext>
             </a:extLst>
           </p:cNvPr>
@@ -18516,7 +17596,7 @@
           <p:cNvPr id="13" name="Rectangle: Rounded Corners 12">
             <a:extLst>
               <a:ext uri="{FF2B5EF4-FFF2-40B4-BE49-F238E27FC236}">
-                <a16:creationId xmlns:a16="http://schemas.microsoft.com/office/drawing/2014/main" xmlns="" id="{CAF996AF-F5B1-495C-9A44-5D89EA56A6DB}"/>
+                <a16:creationId xmlns="" xmlns:a16="http://schemas.microsoft.com/office/drawing/2014/main" id="{CAF996AF-F5B1-495C-9A44-5D89EA56A6DB}"/>
               </a:ext>
             </a:extLst>
           </p:cNvPr>
@@ -18563,7 +17643,7 @@
           <p:cNvPr id="14" name="Rectangle: Rounded Corners 13">
             <a:extLst>
               <a:ext uri="{FF2B5EF4-FFF2-40B4-BE49-F238E27FC236}">
-                <a16:creationId xmlns:a16="http://schemas.microsoft.com/office/drawing/2014/main" xmlns="" id="{76B75C5B-143E-40DB-9120-F1B4E9773ECF}"/>
+                <a16:creationId xmlns="" xmlns:a16="http://schemas.microsoft.com/office/drawing/2014/main" id="{76B75C5B-143E-40DB-9120-F1B4E9773ECF}"/>
               </a:ext>
             </a:extLst>
           </p:cNvPr>
@@ -18610,7 +17690,7 @@
           <p:cNvPr id="16" name="Straight Arrow Connector 15">
             <a:extLst>
               <a:ext uri="{FF2B5EF4-FFF2-40B4-BE49-F238E27FC236}">
-                <a16:creationId xmlns:a16="http://schemas.microsoft.com/office/drawing/2014/main" xmlns="" id="{1F87172F-A57F-46B8-ADFC-ADDD29961556}"/>
+                <a16:creationId xmlns="" xmlns:a16="http://schemas.microsoft.com/office/drawing/2014/main" id="{1F87172F-A57F-46B8-ADFC-ADDD29961556}"/>
               </a:ext>
             </a:extLst>
           </p:cNvPr>
@@ -18658,7 +17738,7 @@
           <p:cNvPr id="18" name="Straight Arrow Connector 17">
             <a:extLst>
               <a:ext uri="{FF2B5EF4-FFF2-40B4-BE49-F238E27FC236}">
-                <a16:creationId xmlns:a16="http://schemas.microsoft.com/office/drawing/2014/main" xmlns="" id="{1F80C7EA-7262-4E8C-A442-DED264F7CE96}"/>
+                <a16:creationId xmlns="" xmlns:a16="http://schemas.microsoft.com/office/drawing/2014/main" id="{1F80C7EA-7262-4E8C-A442-DED264F7CE96}"/>
               </a:ext>
             </a:extLst>
           </p:cNvPr>
@@ -18703,7 +17783,7 @@
           <p:cNvPr id="19" name="Straight Arrow Connector 18">
             <a:extLst>
               <a:ext uri="{FF2B5EF4-FFF2-40B4-BE49-F238E27FC236}">
-                <a16:creationId xmlns:a16="http://schemas.microsoft.com/office/drawing/2014/main" xmlns="" id="{ECC2A8D4-1759-4C62-B775-45C73F8D7C35}"/>
+                <a16:creationId xmlns="" xmlns:a16="http://schemas.microsoft.com/office/drawing/2014/main" id="{ECC2A8D4-1759-4C62-B775-45C73F8D7C35}"/>
               </a:ext>
             </a:extLst>
           </p:cNvPr>
@@ -18748,7 +17828,7 @@
           <p:cNvPr id="20" name="TextBox 19">
             <a:extLst>
               <a:ext uri="{FF2B5EF4-FFF2-40B4-BE49-F238E27FC236}">
-                <a16:creationId xmlns:a16="http://schemas.microsoft.com/office/drawing/2014/main" xmlns="" id="{887DCB15-D205-4EB2-BE00-BF750FF66585}"/>
+                <a16:creationId xmlns="" xmlns:a16="http://schemas.microsoft.com/office/drawing/2014/main" id="{887DCB15-D205-4EB2-BE00-BF750FF66585}"/>
               </a:ext>
             </a:extLst>
           </p:cNvPr>
@@ -18784,7 +17864,7 @@
           <p:cNvPr id="21" name="TextBox 20">
             <a:extLst>
               <a:ext uri="{FF2B5EF4-FFF2-40B4-BE49-F238E27FC236}">
-                <a16:creationId xmlns:a16="http://schemas.microsoft.com/office/drawing/2014/main" xmlns="" id="{EBCF153D-4843-42F4-B31C-15A5804BD5FB}"/>
+                <a16:creationId xmlns="" xmlns:a16="http://schemas.microsoft.com/office/drawing/2014/main" id="{EBCF153D-4843-42F4-B31C-15A5804BD5FB}"/>
               </a:ext>
             </a:extLst>
           </p:cNvPr>
@@ -18831,7 +17911,7 @@
           <p:cNvPr id="22" name="TextBox 21">
             <a:extLst>
               <a:ext uri="{FF2B5EF4-FFF2-40B4-BE49-F238E27FC236}">
-                <a16:creationId xmlns:a16="http://schemas.microsoft.com/office/drawing/2014/main" xmlns="" id="{9D5A6EDA-CF61-4357-8F9B-76ED0DF0B21E}"/>
+                <a16:creationId xmlns="" xmlns:a16="http://schemas.microsoft.com/office/drawing/2014/main" id="{9D5A6EDA-CF61-4357-8F9B-76ED0DF0B21E}"/>
               </a:ext>
             </a:extLst>
           </p:cNvPr>
@@ -18904,7 +17984,7 @@
           <p:cNvPr id="2" name="Title 1">
             <a:extLst>
               <a:ext uri="{FF2B5EF4-FFF2-40B4-BE49-F238E27FC236}">
-                <a16:creationId xmlns:a16="http://schemas.microsoft.com/office/drawing/2014/main" xmlns="" id="{C57B3E22-4369-4A44-AD47-393340BAAF6D}"/>
+                <a16:creationId xmlns="" xmlns:a16="http://schemas.microsoft.com/office/drawing/2014/main" id="{C57B3E22-4369-4A44-AD47-393340BAAF6D}"/>
               </a:ext>
             </a:extLst>
           </p:cNvPr>
@@ -18932,7 +18012,7 @@
           <p:cNvPr id="3" name="Content Placeholder 2">
             <a:extLst>
               <a:ext uri="{FF2B5EF4-FFF2-40B4-BE49-F238E27FC236}">
-                <a16:creationId xmlns:a16="http://schemas.microsoft.com/office/drawing/2014/main" xmlns="" id="{9980DCFB-0F42-4EE6-8E6E-5202550756EC}"/>
+                <a16:creationId xmlns="" xmlns:a16="http://schemas.microsoft.com/office/drawing/2014/main" id="{9980DCFB-0F42-4EE6-8E6E-5202550756EC}"/>
               </a:ext>
             </a:extLst>
           </p:cNvPr>
@@ -19032,38 +18112,10 @@
       </p:sp>
       <p:sp>
         <p:nvSpPr>
-          <p:cNvPr id="4" name="Footer Placeholder 3">
-            <a:extLst>
-              <a:ext uri="{FF2B5EF4-FFF2-40B4-BE49-F238E27FC236}">
-                <a16:creationId xmlns:a16="http://schemas.microsoft.com/office/drawing/2014/main" xmlns="" id="{6CC681E1-7277-46CA-9FAC-B0599F3C06C1}"/>
-              </a:ext>
-            </a:extLst>
-          </p:cNvPr>
-          <p:cNvSpPr>
-            <a:spLocks noGrp="1"/>
-          </p:cNvSpPr>
-          <p:nvPr>
-            <p:ph type="ftr" sz="quarter" idx="11"/>
-          </p:nvPr>
-        </p:nvSpPr>
-        <p:spPr/>
-        <p:txBody>
-          <a:bodyPr/>
-          <a:lstStyle/>
-          <a:p>
-            <a:r>
-              <a:rPr lang="en-IN"/>
-              <a:t>LTI</a:t>
-            </a:r>
-          </a:p>
-        </p:txBody>
-      </p:sp>
-      <p:sp>
-        <p:nvSpPr>
           <p:cNvPr id="5" name="Slide Number Placeholder 4">
             <a:extLst>
               <a:ext uri="{FF2B5EF4-FFF2-40B4-BE49-F238E27FC236}">
-                <a16:creationId xmlns:a16="http://schemas.microsoft.com/office/drawing/2014/main" xmlns="" id="{A92AF081-8DF4-41DA-AAAF-914FC578DBB1}"/>
+                <a16:creationId xmlns="" xmlns:a16="http://schemas.microsoft.com/office/drawing/2014/main" id="{A92AF081-8DF4-41DA-AAAF-914FC578DBB1}"/>
               </a:ext>
             </a:extLst>
           </p:cNvPr>
@@ -19129,7 +18181,7 @@
           <p:cNvPr id="2" name="Title 1">
             <a:extLst>
               <a:ext uri="{FF2B5EF4-FFF2-40B4-BE49-F238E27FC236}">
-                <a16:creationId xmlns:a16="http://schemas.microsoft.com/office/drawing/2014/main" xmlns="" id="{1ACBB8E7-49A8-45E3-A04B-B2DFFC1CF310}"/>
+                <a16:creationId xmlns="" xmlns:a16="http://schemas.microsoft.com/office/drawing/2014/main" id="{1ACBB8E7-49A8-45E3-A04B-B2DFFC1CF310}"/>
               </a:ext>
             </a:extLst>
           </p:cNvPr>
@@ -19157,7 +18209,7 @@
           <p:cNvPr id="3" name="Content Placeholder 2">
             <a:extLst>
               <a:ext uri="{FF2B5EF4-FFF2-40B4-BE49-F238E27FC236}">
-                <a16:creationId xmlns:a16="http://schemas.microsoft.com/office/drawing/2014/main" xmlns="" id="{0A9EAF7A-96AB-45E0-8504-6C5FB8C18013}"/>
+                <a16:creationId xmlns="" xmlns:a16="http://schemas.microsoft.com/office/drawing/2014/main" id="{0A9EAF7A-96AB-45E0-8504-6C5FB8C18013}"/>
               </a:ext>
             </a:extLst>
           </p:cNvPr>
@@ -19188,38 +18240,10 @@
       </p:sp>
       <p:sp>
         <p:nvSpPr>
-          <p:cNvPr id="4" name="Footer Placeholder 3">
-            <a:extLst>
-              <a:ext uri="{FF2B5EF4-FFF2-40B4-BE49-F238E27FC236}">
-                <a16:creationId xmlns:a16="http://schemas.microsoft.com/office/drawing/2014/main" xmlns="" id="{E775EFCD-DD17-4D33-BC71-4E69D3E56805}"/>
-              </a:ext>
-            </a:extLst>
-          </p:cNvPr>
-          <p:cNvSpPr>
-            <a:spLocks noGrp="1"/>
-          </p:cNvSpPr>
-          <p:nvPr>
-            <p:ph type="ftr" sz="quarter" idx="11"/>
-          </p:nvPr>
-        </p:nvSpPr>
-        <p:spPr/>
-        <p:txBody>
-          <a:bodyPr/>
-          <a:lstStyle/>
-          <a:p>
-            <a:r>
-              <a:rPr lang="en-IN"/>
-              <a:t>LTI</a:t>
-            </a:r>
-          </a:p>
-        </p:txBody>
-      </p:sp>
-      <p:sp>
-        <p:nvSpPr>
           <p:cNvPr id="5" name="Slide Number Placeholder 4">
             <a:extLst>
               <a:ext uri="{FF2B5EF4-FFF2-40B4-BE49-F238E27FC236}">
-                <a16:creationId xmlns:a16="http://schemas.microsoft.com/office/drawing/2014/main" xmlns="" id="{8361B425-033D-4830-8208-C24C9A4F3B1C}"/>
+                <a16:creationId xmlns="" xmlns:a16="http://schemas.microsoft.com/office/drawing/2014/main" id="{8361B425-033D-4830-8208-C24C9A4F3B1C}"/>
               </a:ext>
             </a:extLst>
           </p:cNvPr>
@@ -19248,7 +18272,7 @@
           <p:cNvPr id="7" name="Picture 6">
             <a:extLst>
               <a:ext uri="{FF2B5EF4-FFF2-40B4-BE49-F238E27FC236}">
-                <a16:creationId xmlns:a16="http://schemas.microsoft.com/office/drawing/2014/main" xmlns="" id="{A2BE95F4-19F5-4635-B1FF-167AF6436230}"/>
+                <a16:creationId xmlns="" xmlns:a16="http://schemas.microsoft.com/office/drawing/2014/main" id="{A2BE95F4-19F5-4635-B1FF-167AF6436230}"/>
               </a:ext>
             </a:extLst>
           </p:cNvPr>
@@ -19278,7 +18302,7 @@
           <p:cNvPr id="6" name="Picture 5">
             <a:extLst>
               <a:ext uri="{FF2B5EF4-FFF2-40B4-BE49-F238E27FC236}">
-                <a16:creationId xmlns:a16="http://schemas.microsoft.com/office/drawing/2014/main" xmlns="" id="{DCD1C8A3-2B9B-40FE-9CA1-814CA7F402C5}"/>
+                <a16:creationId xmlns="" xmlns:a16="http://schemas.microsoft.com/office/drawing/2014/main" id="{DCD1C8A3-2B9B-40FE-9CA1-814CA7F402C5}"/>
               </a:ext>
             </a:extLst>
           </p:cNvPr>
@@ -19421,7 +18445,7 @@
           <p:cNvPr id="2" name="Title 1">
             <a:extLst>
               <a:ext uri="{FF2B5EF4-FFF2-40B4-BE49-F238E27FC236}">
-                <a16:creationId xmlns:a16="http://schemas.microsoft.com/office/drawing/2014/main" xmlns="" id="{01A5A7C9-237A-4DF5-853B-722A1486C292}"/>
+                <a16:creationId xmlns="" xmlns:a16="http://schemas.microsoft.com/office/drawing/2014/main" id="{01A5A7C9-237A-4DF5-853B-722A1486C292}"/>
               </a:ext>
             </a:extLst>
           </p:cNvPr>
@@ -19446,38 +18470,10 @@
       </p:sp>
       <p:sp>
         <p:nvSpPr>
-          <p:cNvPr id="4" name="Footer Placeholder 3">
-            <a:extLst>
-              <a:ext uri="{FF2B5EF4-FFF2-40B4-BE49-F238E27FC236}">
-                <a16:creationId xmlns:a16="http://schemas.microsoft.com/office/drawing/2014/main" xmlns="" id="{B8DAEC72-7304-406C-A66D-86F29B83709D}"/>
-              </a:ext>
-            </a:extLst>
-          </p:cNvPr>
-          <p:cNvSpPr>
-            <a:spLocks noGrp="1"/>
-          </p:cNvSpPr>
-          <p:nvPr>
-            <p:ph type="ftr" sz="quarter" idx="11"/>
-          </p:nvPr>
-        </p:nvSpPr>
-        <p:spPr/>
-        <p:txBody>
-          <a:bodyPr/>
-          <a:lstStyle/>
-          <a:p>
-            <a:r>
-              <a:rPr lang="en-IN"/>
-              <a:t>LTI</a:t>
-            </a:r>
-          </a:p>
-        </p:txBody>
-      </p:sp>
-      <p:sp>
-        <p:nvSpPr>
           <p:cNvPr id="5" name="Slide Number Placeholder 4">
             <a:extLst>
               <a:ext uri="{FF2B5EF4-FFF2-40B4-BE49-F238E27FC236}">
-                <a16:creationId xmlns:a16="http://schemas.microsoft.com/office/drawing/2014/main" xmlns="" id="{FFD92AB1-3E67-4F61-8739-0E51747355D8}"/>
+                <a16:creationId xmlns="" xmlns:a16="http://schemas.microsoft.com/office/drawing/2014/main" id="{FFD92AB1-3E67-4F61-8739-0E51747355D8}"/>
               </a:ext>
             </a:extLst>
           </p:cNvPr>
@@ -19506,7 +18502,7 @@
           <p:cNvPr id="11" name="Content Placeholder 10">
             <a:extLst>
               <a:ext uri="{FF2B5EF4-FFF2-40B4-BE49-F238E27FC236}">
-                <a16:creationId xmlns:a16="http://schemas.microsoft.com/office/drawing/2014/main" xmlns="" id="{F8F1C70B-244D-441F-A617-E0554A754BD8}"/>
+                <a16:creationId xmlns="" xmlns:a16="http://schemas.microsoft.com/office/drawing/2014/main" id="{F8F1C70B-244D-441F-A617-E0554A754BD8}"/>
               </a:ext>
             </a:extLst>
           </p:cNvPr>
@@ -19613,7 +18609,7 @@
           <p:cNvPr id="2" name="Title 1">
             <a:extLst>
               <a:ext uri="{FF2B5EF4-FFF2-40B4-BE49-F238E27FC236}">
-                <a16:creationId xmlns:a16="http://schemas.microsoft.com/office/drawing/2014/main" xmlns="" id="{D796376F-4687-48E3-BA2E-3DD82FAA6BDC}"/>
+                <a16:creationId xmlns="" xmlns:a16="http://schemas.microsoft.com/office/drawing/2014/main" id="{D796376F-4687-48E3-BA2E-3DD82FAA6BDC}"/>
               </a:ext>
             </a:extLst>
           </p:cNvPr>
@@ -19641,7 +18637,7 @@
           <p:cNvPr id="3" name="Content Placeholder 2">
             <a:extLst>
               <a:ext uri="{FF2B5EF4-FFF2-40B4-BE49-F238E27FC236}">
-                <a16:creationId xmlns:a16="http://schemas.microsoft.com/office/drawing/2014/main" xmlns="" id="{C8A365D0-4214-4DA7-870C-1A97DE617B21}"/>
+                <a16:creationId xmlns="" xmlns:a16="http://schemas.microsoft.com/office/drawing/2014/main" id="{C8A365D0-4214-4DA7-870C-1A97DE617B21}"/>
               </a:ext>
             </a:extLst>
           </p:cNvPr>
@@ -19666,38 +18662,10 @@
       </p:sp>
       <p:sp>
         <p:nvSpPr>
-          <p:cNvPr id="4" name="Footer Placeholder 3">
-            <a:extLst>
-              <a:ext uri="{FF2B5EF4-FFF2-40B4-BE49-F238E27FC236}">
-                <a16:creationId xmlns:a16="http://schemas.microsoft.com/office/drawing/2014/main" xmlns="" id="{3CAB4EA7-25E1-422D-A980-7AD7279EDF1D}"/>
-              </a:ext>
-            </a:extLst>
-          </p:cNvPr>
-          <p:cNvSpPr>
-            <a:spLocks noGrp="1"/>
-          </p:cNvSpPr>
-          <p:nvPr>
-            <p:ph type="ftr" sz="quarter" idx="11"/>
-          </p:nvPr>
-        </p:nvSpPr>
-        <p:spPr/>
-        <p:txBody>
-          <a:bodyPr/>
-          <a:lstStyle/>
-          <a:p>
-            <a:r>
-              <a:rPr lang="en-IN"/>
-              <a:t>LTI</a:t>
-            </a:r>
-          </a:p>
-        </p:txBody>
-      </p:sp>
-      <p:sp>
-        <p:nvSpPr>
           <p:cNvPr id="5" name="Slide Number Placeholder 4">
             <a:extLst>
               <a:ext uri="{FF2B5EF4-FFF2-40B4-BE49-F238E27FC236}">
-                <a16:creationId xmlns:a16="http://schemas.microsoft.com/office/drawing/2014/main" xmlns="" id="{47E1634A-88F4-4B2D-B8FD-3ECFD2C82560}"/>
+                <a16:creationId xmlns="" xmlns:a16="http://schemas.microsoft.com/office/drawing/2014/main" id="{47E1634A-88F4-4B2D-B8FD-3ECFD2C82560}"/>
               </a:ext>
             </a:extLst>
           </p:cNvPr>
@@ -19726,7 +18694,7 @@
           <p:cNvPr id="6" name="Rectangle 5">
             <a:extLst>
               <a:ext uri="{FF2B5EF4-FFF2-40B4-BE49-F238E27FC236}">
-                <a16:creationId xmlns:a16="http://schemas.microsoft.com/office/drawing/2014/main" xmlns="" id="{CE1D8BD3-3A24-4972-A81E-F70DCB9B92E2}"/>
+                <a16:creationId xmlns="" xmlns:a16="http://schemas.microsoft.com/office/drawing/2014/main" id="{CE1D8BD3-3A24-4972-A81E-F70DCB9B92E2}"/>
               </a:ext>
             </a:extLst>
           </p:cNvPr>
@@ -19773,7 +18741,7 @@
           <p:cNvPr id="8" name="Rectangle 7">
             <a:extLst>
               <a:ext uri="{FF2B5EF4-FFF2-40B4-BE49-F238E27FC236}">
-                <a16:creationId xmlns:a16="http://schemas.microsoft.com/office/drawing/2014/main" xmlns="" id="{C85BDD75-609D-4BA0-8CDA-3493B4EC2D42}"/>
+                <a16:creationId xmlns="" xmlns:a16="http://schemas.microsoft.com/office/drawing/2014/main" id="{C85BDD75-609D-4BA0-8CDA-3493B4EC2D42}"/>
               </a:ext>
             </a:extLst>
           </p:cNvPr>
@@ -19836,7 +18804,7 @@
           <p:cNvPr id="9" name="Rectangle 8">
             <a:extLst>
               <a:ext uri="{FF2B5EF4-FFF2-40B4-BE49-F238E27FC236}">
-                <a16:creationId xmlns:a16="http://schemas.microsoft.com/office/drawing/2014/main" xmlns="" id="{E69830F1-1B60-4E0F-B0D8-D5B787C3E5E1}"/>
+                <a16:creationId xmlns="" xmlns:a16="http://schemas.microsoft.com/office/drawing/2014/main" id="{E69830F1-1B60-4E0F-B0D8-D5B787C3E5E1}"/>
               </a:ext>
             </a:extLst>
           </p:cNvPr>
@@ -19899,7 +18867,7 @@
           <p:cNvPr id="10" name="Rectangle 9">
             <a:extLst>
               <a:ext uri="{FF2B5EF4-FFF2-40B4-BE49-F238E27FC236}">
-                <a16:creationId xmlns:a16="http://schemas.microsoft.com/office/drawing/2014/main" xmlns="" id="{4FFDE7B9-5315-42BA-80BC-CF7F1B67E291}"/>
+                <a16:creationId xmlns="" xmlns:a16="http://schemas.microsoft.com/office/drawing/2014/main" id="{4FFDE7B9-5315-42BA-80BC-CF7F1B67E291}"/>
               </a:ext>
             </a:extLst>
           </p:cNvPr>
@@ -19962,7 +18930,7 @@
           <p:cNvPr id="12" name="TextBox 11">
             <a:extLst>
               <a:ext uri="{FF2B5EF4-FFF2-40B4-BE49-F238E27FC236}">
-                <a16:creationId xmlns:a16="http://schemas.microsoft.com/office/drawing/2014/main" xmlns="" id="{4DCB2546-250E-4196-88D9-3D10F4C00E1E}"/>
+                <a16:creationId xmlns="" xmlns:a16="http://schemas.microsoft.com/office/drawing/2014/main" id="{4DCB2546-250E-4196-88D9-3D10F4C00E1E}"/>
               </a:ext>
             </a:extLst>
           </p:cNvPr>
@@ -19997,7 +18965,7 @@
           <p:cNvPr id="13" name="TextBox 12">
             <a:extLst>
               <a:ext uri="{FF2B5EF4-FFF2-40B4-BE49-F238E27FC236}">
-                <a16:creationId xmlns:a16="http://schemas.microsoft.com/office/drawing/2014/main" xmlns="" id="{867A4B67-A50B-45FB-9457-290DB3DD59C9}"/>
+                <a16:creationId xmlns="" xmlns:a16="http://schemas.microsoft.com/office/drawing/2014/main" id="{867A4B67-A50B-45FB-9457-290DB3DD59C9}"/>
               </a:ext>
             </a:extLst>
           </p:cNvPr>
@@ -20032,7 +19000,7 @@
           <p:cNvPr id="14" name="TextBox 13">
             <a:extLst>
               <a:ext uri="{FF2B5EF4-FFF2-40B4-BE49-F238E27FC236}">
-                <a16:creationId xmlns:a16="http://schemas.microsoft.com/office/drawing/2014/main" xmlns="" id="{702C938F-C917-4BE0-8CE3-C09A77C46C5E}"/>
+                <a16:creationId xmlns="" xmlns:a16="http://schemas.microsoft.com/office/drawing/2014/main" id="{702C938F-C917-4BE0-8CE3-C09A77C46C5E}"/>
               </a:ext>
             </a:extLst>
           </p:cNvPr>
@@ -20067,7 +19035,7 @@
           <p:cNvPr id="15" name="TextBox 14">
             <a:extLst>
               <a:ext uri="{FF2B5EF4-FFF2-40B4-BE49-F238E27FC236}">
-                <a16:creationId xmlns:a16="http://schemas.microsoft.com/office/drawing/2014/main" xmlns="" id="{660A347D-90E3-4E1C-9206-ADD8A93303E0}"/>
+                <a16:creationId xmlns="" xmlns:a16="http://schemas.microsoft.com/office/drawing/2014/main" id="{660A347D-90E3-4E1C-9206-ADD8A93303E0}"/>
               </a:ext>
             </a:extLst>
           </p:cNvPr>
@@ -20524,7 +19492,7 @@
           <p:cNvPr id="2" name="Title 1">
             <a:extLst>
               <a:ext uri="{FF2B5EF4-FFF2-40B4-BE49-F238E27FC236}">
-                <a16:creationId xmlns:a16="http://schemas.microsoft.com/office/drawing/2014/main" xmlns="" id="{DBB49F65-DED1-4070-B3FC-DA0EF66D796A}"/>
+                <a16:creationId xmlns="" xmlns:a16="http://schemas.microsoft.com/office/drawing/2014/main" id="{DBB49F65-DED1-4070-B3FC-DA0EF66D796A}"/>
               </a:ext>
             </a:extLst>
           </p:cNvPr>
@@ -20549,38 +19517,10 @@
       </p:sp>
       <p:sp>
         <p:nvSpPr>
-          <p:cNvPr id="4" name="Footer Placeholder 3">
-            <a:extLst>
-              <a:ext uri="{FF2B5EF4-FFF2-40B4-BE49-F238E27FC236}">
-                <a16:creationId xmlns:a16="http://schemas.microsoft.com/office/drawing/2014/main" xmlns="" id="{B497F7D8-DECB-4644-9BA7-12D8E868BA0A}"/>
-              </a:ext>
-            </a:extLst>
-          </p:cNvPr>
-          <p:cNvSpPr>
-            <a:spLocks noGrp="1"/>
-          </p:cNvSpPr>
-          <p:nvPr>
-            <p:ph type="ftr" sz="quarter" idx="11"/>
-          </p:nvPr>
-        </p:nvSpPr>
-        <p:spPr/>
-        <p:txBody>
-          <a:bodyPr/>
-          <a:lstStyle/>
-          <a:p>
-            <a:r>
-              <a:rPr lang="en-IN" dirty="0"/>
-              <a:t>LTI</a:t>
-            </a:r>
-          </a:p>
-        </p:txBody>
-      </p:sp>
-      <p:sp>
-        <p:nvSpPr>
           <p:cNvPr id="5" name="Slide Number Placeholder 4">
             <a:extLst>
               <a:ext uri="{FF2B5EF4-FFF2-40B4-BE49-F238E27FC236}">
-                <a16:creationId xmlns:a16="http://schemas.microsoft.com/office/drawing/2014/main" xmlns="" id="{48685074-3D9E-49D5-9858-7746C0CB9FF2}"/>
+                <a16:creationId xmlns="" xmlns:a16="http://schemas.microsoft.com/office/drawing/2014/main" id="{48685074-3D9E-49D5-9858-7746C0CB9FF2}"/>
               </a:ext>
             </a:extLst>
           </p:cNvPr>
@@ -20609,7 +19549,7 @@
           <p:cNvPr id="3" name="Picture 2">
             <a:extLst>
               <a:ext uri="{FF2B5EF4-FFF2-40B4-BE49-F238E27FC236}">
-                <a16:creationId xmlns:a16="http://schemas.microsoft.com/office/drawing/2014/main" xmlns="" id="{55F004AD-3075-45C8-AF3B-8739311C8FCF}"/>
+                <a16:creationId xmlns="" xmlns:a16="http://schemas.microsoft.com/office/drawing/2014/main" id="{55F004AD-3075-45C8-AF3B-8739311C8FCF}"/>
               </a:ext>
             </a:extLst>
           </p:cNvPr>
@@ -20639,7 +19579,7 @@
           <p:cNvPr id="7" name="Table 10">
             <a:extLst>
               <a:ext uri="{FF2B5EF4-FFF2-40B4-BE49-F238E27FC236}">
-                <a16:creationId xmlns:a16="http://schemas.microsoft.com/office/drawing/2014/main" xmlns="" id="{48AD8422-D930-4DE1-A32F-2E5C7B98DEED}"/>
+                <a16:creationId xmlns="" xmlns:a16="http://schemas.microsoft.com/office/drawing/2014/main" id="{48AD8422-D930-4DE1-A32F-2E5C7B98DEED}"/>
               </a:ext>
             </a:extLst>
           </p:cNvPr>
@@ -20669,28 +19609,28 @@
                 <a:gridCol w="713968">
                   <a:extLst>
                     <a:ext uri="{9D8B030D-6E8A-4147-A177-3AD203B41FA5}">
-                      <a16:colId xmlns:a16="http://schemas.microsoft.com/office/drawing/2014/main" xmlns="" val="3179031498"/>
+                      <a16:colId xmlns="" xmlns:a16="http://schemas.microsoft.com/office/drawing/2014/main" val="3179031498"/>
                     </a:ext>
                   </a:extLst>
                 </a:gridCol>
                 <a:gridCol w="697952">
                   <a:extLst>
                     <a:ext uri="{9D8B030D-6E8A-4147-A177-3AD203B41FA5}">
-                      <a16:colId xmlns:a16="http://schemas.microsoft.com/office/drawing/2014/main" xmlns="" val="1932818365"/>
+                      <a16:colId xmlns="" xmlns:a16="http://schemas.microsoft.com/office/drawing/2014/main" val="1932818365"/>
                     </a:ext>
                   </a:extLst>
                 </a:gridCol>
                 <a:gridCol w="705960">
                   <a:extLst>
                     <a:ext uri="{9D8B030D-6E8A-4147-A177-3AD203B41FA5}">
-                      <a16:colId xmlns:a16="http://schemas.microsoft.com/office/drawing/2014/main" xmlns="" val="193457344"/>
+                      <a16:colId xmlns="" xmlns:a16="http://schemas.microsoft.com/office/drawing/2014/main" val="193457344"/>
                     </a:ext>
                   </a:extLst>
                 </a:gridCol>
                 <a:gridCol w="705960">
                   <a:extLst>
                     <a:ext uri="{9D8B030D-6E8A-4147-A177-3AD203B41FA5}">
-                      <a16:colId xmlns:a16="http://schemas.microsoft.com/office/drawing/2014/main" xmlns="" val="2589794549"/>
+                      <a16:colId xmlns="" xmlns:a16="http://schemas.microsoft.com/office/drawing/2014/main" val="2589794549"/>
                     </a:ext>
                   </a:extLst>
                 </a:gridCol>
@@ -20755,7 +19695,7 @@
                 </a:tc>
                 <a:extLst>
                   <a:ext uri="{0D108BD9-81ED-4DB2-BD59-A6C34878D82A}">
-                    <a16:rowId xmlns:a16="http://schemas.microsoft.com/office/drawing/2014/main" xmlns="" val="2274041546"/>
+                    <a16:rowId xmlns="" xmlns:a16="http://schemas.microsoft.com/office/drawing/2014/main" val="2274041546"/>
                   </a:ext>
                 </a:extLst>
               </a:tr>
@@ -20818,7 +19758,7 @@
                 </a:tc>
                 <a:extLst>
                   <a:ext uri="{0D108BD9-81ED-4DB2-BD59-A6C34878D82A}">
-                    <a16:rowId xmlns:a16="http://schemas.microsoft.com/office/drawing/2014/main" xmlns="" val="2983195640"/>
+                    <a16:rowId xmlns="" xmlns:a16="http://schemas.microsoft.com/office/drawing/2014/main" val="2983195640"/>
                   </a:ext>
                 </a:extLst>
               </a:tr>
@@ -20881,7 +19821,7 @@
                 </a:tc>
                 <a:extLst>
                   <a:ext uri="{0D108BD9-81ED-4DB2-BD59-A6C34878D82A}">
-                    <a16:rowId xmlns:a16="http://schemas.microsoft.com/office/drawing/2014/main" xmlns="" val="1512601061"/>
+                    <a16:rowId xmlns="" xmlns:a16="http://schemas.microsoft.com/office/drawing/2014/main" val="1512601061"/>
                   </a:ext>
                 </a:extLst>
               </a:tr>
@@ -20928,7 +19868,7 @@
                 </a:tc>
                 <a:extLst>
                   <a:ext uri="{0D108BD9-81ED-4DB2-BD59-A6C34878D82A}">
-                    <a16:rowId xmlns:a16="http://schemas.microsoft.com/office/drawing/2014/main" xmlns="" val="1260710047"/>
+                    <a16:rowId xmlns="" xmlns:a16="http://schemas.microsoft.com/office/drawing/2014/main" val="1260710047"/>
                   </a:ext>
                 </a:extLst>
               </a:tr>
@@ -20941,7 +19881,7 @@
           <p:cNvPr id="6" name="Picture 5">
             <a:extLst>
               <a:ext uri="{FF2B5EF4-FFF2-40B4-BE49-F238E27FC236}">
-                <a16:creationId xmlns:a16="http://schemas.microsoft.com/office/drawing/2014/main" xmlns="" id="{93A30CE4-B4B6-4463-A45D-0135BF358D9B}"/>
+                <a16:creationId xmlns="" xmlns:a16="http://schemas.microsoft.com/office/drawing/2014/main" id="{93A30CE4-B4B6-4463-A45D-0135BF358D9B}"/>
               </a:ext>
             </a:extLst>
           </p:cNvPr>
@@ -20971,7 +19911,7 @@
           <p:cNvPr id="12" name="Picture 11">
             <a:extLst>
               <a:ext uri="{FF2B5EF4-FFF2-40B4-BE49-F238E27FC236}">
-                <a16:creationId xmlns:a16="http://schemas.microsoft.com/office/drawing/2014/main" xmlns="" id="{47EF45EB-4AC2-4893-8018-855BE7534C88}"/>
+                <a16:creationId xmlns="" xmlns:a16="http://schemas.microsoft.com/office/drawing/2014/main" id="{47EF45EB-4AC2-4893-8018-855BE7534C88}"/>
               </a:ext>
             </a:extLst>
           </p:cNvPr>
@@ -21001,7 +19941,7 @@
           <p:cNvPr id="13" name="Picture 12">
             <a:extLst>
               <a:ext uri="{FF2B5EF4-FFF2-40B4-BE49-F238E27FC236}">
-                <a16:creationId xmlns:a16="http://schemas.microsoft.com/office/drawing/2014/main" xmlns="" id="{5A63CC9A-1707-40A8-89AC-7F6D46CEDB42}"/>
+                <a16:creationId xmlns="" xmlns:a16="http://schemas.microsoft.com/office/drawing/2014/main" id="{5A63CC9A-1707-40A8-89AC-7F6D46CEDB42}"/>
               </a:ext>
             </a:extLst>
           </p:cNvPr>
@@ -21504,7 +20444,7 @@
   <a:extraClrSchemeLst/>
   <a:extLst>
     <a:ext uri="{05A4C25C-085E-4340-85A3-A5531E510DB2}">
-      <thm15:themeFamily xmlns:thm15="http://schemas.microsoft.com/office/thememl/2012/main" xmlns="" name="Wood Type" id="{7ACABC62-BF99-48CF-A9DC-4DB89C7B13DC}" vid="{142A1326-48AB-42A9-8428-CB14AA30176D}"/>
+      <thm15:themeFamily xmlns="" xmlns:thm15="http://schemas.microsoft.com/office/thememl/2012/main" name="Wood Type" id="{7ACABC62-BF99-48CF-A9DC-4DB89C7B13DC}" vid="{142A1326-48AB-42A9-8428-CB14AA30176D}"/>
     </a:ext>
   </a:extLst>
 </a:theme>
@@ -21799,7 +20739,7 @@
   <a:extraClrSchemeLst/>
   <a:extLst>
     <a:ext uri="{05A4C25C-085E-4340-85A3-A5531E510DB2}">
-      <thm15:themeFamily xmlns:thm15="http://schemas.microsoft.com/office/thememl/2012/main" xmlns="" name="Office Theme" id="{62F939B6-93AF-4DB8-9C6B-D6C7DFDC589F}" vid="{4A3C46E8-61CC-4603-A589-7422A47A8E4A}"/>
+      <thm15:themeFamily xmlns="" xmlns:thm15="http://schemas.microsoft.com/office/thememl/2012/main" name="Office Theme" id="{62F939B6-93AF-4DB8-9C6B-D6C7DFDC589F}" vid="{4A3C46E8-61CC-4603-A589-7422A47A8E4A}"/>
     </a:ext>
   </a:extLst>
 </a:theme>
@@ -22094,7 +21034,7 @@
   <a:extraClrSchemeLst/>
   <a:extLst>
     <a:ext uri="{05A4C25C-085E-4340-85A3-A5531E510DB2}">
-      <thm15:themeFamily xmlns:thm15="http://schemas.microsoft.com/office/thememl/2012/main" xmlns="" name="Office Theme" id="{62F939B6-93AF-4DB8-9C6B-D6C7DFDC589F}" vid="{4A3C46E8-61CC-4603-A589-7422A47A8E4A}"/>
+      <thm15:themeFamily xmlns="" xmlns:thm15="http://schemas.microsoft.com/office/thememl/2012/main" name="Office Theme" id="{62F939B6-93AF-4DB8-9C6B-D6C7DFDC589F}" vid="{4A3C46E8-61CC-4603-A589-7422A47A8E4A}"/>
     </a:ext>
   </a:extLst>
 </a:theme>

</xml_diff>